<commit_message>
update all slides to baseline (correct titles, etc.)
</commit_message>
<xml_diff>
--- a/Slides/M1 Designing.pptx
+++ b/Slides/M1 Designing.pptx
@@ -247,7 +247,7 @@
           <a:p>
             <a:fld id="{312E7B4A-039C-48A2-9B2C-AF16AA3873D8}" type="datetimeFigureOut">
               <a:rPr lang="en-US" smtClean="0"/>
-              <a:t>9/29/2014</a:t>
+              <a:t>10/13/2014</a:t>
             </a:fld>
             <a:endParaRPr lang="en-US"/>
           </a:p>
@@ -412,7 +412,7 @@
           <a:p>
             <a:fld id="{DA005A0C-54D9-45AA-87D4-C551D08DFCE1}" type="datetimeFigureOut">
               <a:rPr lang="en-US" smtClean="0"/>
-              <a:t>9/29/2014</a:t>
+              <a:t>10/13/2014</a:t>
             </a:fld>
             <a:endParaRPr lang="en-US"/>
           </a:p>
@@ -1303,10 +1303,6 @@
           <a:bodyPr/>
           <a:lstStyle/>
           <a:p>
-            <a:r>
-              <a:rPr lang="en-US" dirty="0" err="1" smtClean="0"/>
-              <a:t>jeremy</a:t>
-            </a:r>
             <a:endParaRPr lang="en-US" dirty="0"/>
           </a:p>
         </p:txBody>
@@ -7166,13 +7162,8 @@
           <a:p>
             <a:r>
               <a:rPr lang="en-US" dirty="0" smtClean="0"/>
-              <a:t>Jeremy </a:t>
-            </a:r>
-            <a:r>
-              <a:rPr lang="en-US" dirty="0" smtClean="0"/>
-              <a:t>Foster</a:t>
-            </a:r>
-            <a:endParaRPr lang="en-US" dirty="0" smtClean="0"/>
+              <a:t>Jeremy Foster</a:t>
+            </a:r>
           </a:p>
           <a:p>
             <a:r>
@@ -7620,19 +7611,7 @@
           <a:p>
             <a:r>
               <a:rPr lang="en-US" dirty="0" smtClean="0"/>
-              <a:t>Meet </a:t>
-            </a:r>
-            <a:r>
-              <a:rPr lang="en-US" dirty="0" smtClean="0"/>
-              <a:t>Christopher Harrison </a:t>
-            </a:r>
-            <a:r>
-              <a:rPr lang="en-US" dirty="0" smtClean="0"/>
-              <a:t>| ‏</a:t>
-            </a:r>
-            <a:r>
-              <a:rPr lang="en-US" dirty="0" smtClean="0"/>
-              <a:t>@</a:t>
+              <a:t>Meet Christopher Harrison | ‏@</a:t>
             </a:r>
             <a:r>
               <a:rPr lang="en-US" dirty="0" err="1" smtClean="0"/>
@@ -8304,7 +8283,7 @@
             <p:ph sz="quarter" idx="10"/>
             <p:extLst>
               <p:ext uri="{D42A27DB-BD31-4B8C-83A1-F6EECF244321}">
-                <p14:modId xmlns:p14="http://schemas.microsoft.com/office/powerpoint/2010/main" val="1783521138"/>
+                <p14:modId xmlns:p14="http://schemas.microsoft.com/office/powerpoint/2010/main" val="1637703309"/>
               </p:ext>
             </p:extLst>
           </p:nvPr>
@@ -8323,14 +8302,14 @@
                 <a:gridCol w="5762625">
                   <a:extLst>
                     <a:ext uri="{9D8B030D-6E8A-4147-A177-3AD203B41FA5}">
-                      <a16:colId xmlns:a16="http://schemas.microsoft.com/office/drawing/2014/main" xmlns="" val="1632794655"/>
+                      <a16:colId xmlns="" xmlns:a16="http://schemas.microsoft.com/office/drawing/2014/main" val="1632794655"/>
                     </a:ext>
                   </a:extLst>
                 </a:gridCol>
                 <a:gridCol w="5762625">
                   <a:extLst>
                     <a:ext uri="{9D8B030D-6E8A-4147-A177-3AD203B41FA5}">
-                      <a16:colId xmlns:a16="http://schemas.microsoft.com/office/drawing/2014/main" xmlns="" val="2011313899"/>
+                      <a16:colId xmlns="" xmlns:a16="http://schemas.microsoft.com/office/drawing/2014/main" val="2011313899"/>
                     </a:ext>
                   </a:extLst>
                 </a:gridCol>
@@ -8368,7 +8347,7 @@
                 </a:tc>
                 <a:extLst>
                   <a:ext uri="{0D108BD9-81ED-4DB2-BD59-A6C34878D82A}">
-                    <a16:rowId xmlns:a16="http://schemas.microsoft.com/office/drawing/2014/main" xmlns="" val="1789177411"/>
+                    <a16:rowId xmlns="" xmlns:a16="http://schemas.microsoft.com/office/drawing/2014/main" val="1789177411"/>
                   </a:ext>
                 </a:extLst>
               </a:tr>
@@ -8383,14 +8362,7 @@
                           <a:latin typeface="Segoe UI Light" panose="020B0502040204020203" pitchFamily="34" charset="0"/>
                           <a:cs typeface="Segoe UI Light" panose="020B0502040204020203" pitchFamily="34" charset="0"/>
                         </a:rPr>
-                        <a:t>01 | </a:t>
-                      </a:r>
-                      <a:r>
-                        <a:rPr lang="en-US" sz="2400" dirty="0" smtClean="0">
-                          <a:latin typeface="Segoe UI Light" panose="020B0502040204020203" pitchFamily="34" charset="0"/>
-                          <a:cs typeface="Segoe UI Light" panose="020B0502040204020203" pitchFamily="34" charset="0"/>
-                        </a:rPr>
-                        <a:t>Designing</a:t>
+                        <a:t>01 | Designing</a:t>
                       </a:r>
                       <a:r>
                         <a:rPr lang="en-US" sz="2400" baseline="0" dirty="0" smtClean="0">
@@ -8417,14 +8389,7 @@
                           <a:latin typeface="Segoe UI Light" panose="020B0502040204020203" pitchFamily="34" charset="0"/>
                           <a:cs typeface="Segoe UI Light" panose="020B0502040204020203" pitchFamily="34" charset="0"/>
                         </a:rPr>
-                        <a:t>05 | </a:t>
-                      </a:r>
-                      <a:r>
-                        <a:rPr lang="en-US" sz="2400" dirty="0" smtClean="0">
-                          <a:latin typeface="Segoe UI Light" panose="020B0502040204020203" pitchFamily="34" charset="0"/>
-                          <a:cs typeface="Segoe UI Light" panose="020B0502040204020203" pitchFamily="34" charset="0"/>
-                        </a:rPr>
-                        <a:t>The Mobile</a:t>
+                        <a:t>05 | The Mobile</a:t>
                       </a:r>
                       <a:r>
                         <a:rPr lang="en-US" sz="2400" baseline="0" dirty="0" smtClean="0">
@@ -8443,7 +8408,7 @@
                 </a:tc>
                 <a:extLst>
                   <a:ext uri="{0D108BD9-81ED-4DB2-BD59-A6C34878D82A}">
-                    <a16:rowId xmlns:a16="http://schemas.microsoft.com/office/drawing/2014/main" xmlns="" val="3842815335"/>
+                    <a16:rowId xmlns="" xmlns:a16="http://schemas.microsoft.com/office/drawing/2014/main" val="3842815335"/>
                   </a:ext>
                 </a:extLst>
               </a:tr>
@@ -8458,14 +8423,7 @@
                           <a:latin typeface="Segoe UI Light" panose="020B0502040204020203" pitchFamily="34" charset="0"/>
                           <a:cs typeface="Segoe UI Light" panose="020B0502040204020203" pitchFamily="34" charset="0"/>
                         </a:rPr>
-                        <a:t>02 | </a:t>
-                      </a:r>
-                      <a:r>
-                        <a:rPr lang="en-US" sz="2400" dirty="0" smtClean="0">
-                          <a:latin typeface="Segoe UI Light" panose="020B0502040204020203" pitchFamily="34" charset="0"/>
-                          <a:cs typeface="Segoe UI Light" panose="020B0502040204020203" pitchFamily="34" charset="0"/>
-                        </a:rPr>
-                        <a:t>Mobile UI</a:t>
+                        <a:t>02 | Mobile UI</a:t>
                       </a:r>
                       <a:endParaRPr lang="en-US" sz="2400" dirty="0">
                         <a:latin typeface="Segoe UI Light" panose="020B0502040204020203" pitchFamily="34" charset="0"/>
@@ -8485,14 +8443,7 @@
                           <a:latin typeface="Segoe UI Light" panose="020B0502040204020203" pitchFamily="34" charset="0"/>
                           <a:cs typeface="Segoe UI Light" panose="020B0502040204020203" pitchFamily="34" charset="0"/>
                         </a:rPr>
-                        <a:t>06 | </a:t>
-                      </a:r>
-                      <a:r>
-                        <a:rPr lang="en-US" sz="2400" dirty="0" smtClean="0">
-                          <a:latin typeface="Segoe UI Light" panose="020B0502040204020203" pitchFamily="34" charset="0"/>
-                          <a:cs typeface="Segoe UI Light" panose="020B0502040204020203" pitchFamily="34" charset="0"/>
-                        </a:rPr>
-                        <a:t>Offline Data</a:t>
+                        <a:t>06 | Offline Data</a:t>
                       </a:r>
                       <a:endParaRPr lang="en-US" sz="2400" dirty="0">
                         <a:latin typeface="Segoe UI Light" panose="020B0502040204020203" pitchFamily="34" charset="0"/>
@@ -8504,7 +8455,7 @@
                 </a:tc>
                 <a:extLst>
                   <a:ext uri="{0D108BD9-81ED-4DB2-BD59-A6C34878D82A}">
-                    <a16:rowId xmlns:a16="http://schemas.microsoft.com/office/drawing/2014/main" xmlns="" val="321066646"/>
+                    <a16:rowId xmlns="" xmlns:a16="http://schemas.microsoft.com/office/drawing/2014/main" val="321066646"/>
                   </a:ext>
                 </a:extLst>
               </a:tr>
@@ -8543,14 +8494,7 @@
                           <a:latin typeface="Segoe UI Light" panose="020B0502040204020203" pitchFamily="34" charset="0"/>
                           <a:cs typeface="Segoe UI Light" panose="020B0502040204020203" pitchFamily="34" charset="0"/>
                         </a:rPr>
-                        <a:t> | </a:t>
-                      </a:r>
-                      <a:r>
-                        <a:rPr lang="en-US" sz="2400" baseline="0" dirty="0" smtClean="0">
-                          <a:latin typeface="Segoe UI Light" panose="020B0502040204020203" pitchFamily="34" charset="0"/>
-                          <a:cs typeface="Segoe UI Light" panose="020B0502040204020203" pitchFamily="34" charset="0"/>
-                        </a:rPr>
-                        <a:t>Integrating Touch</a:t>
+                        <a:t> | Integrating Touch</a:t>
                       </a:r>
                       <a:endParaRPr lang="en-US" sz="2400" dirty="0" smtClean="0">
                         <a:latin typeface="Segoe UI Light" panose="020B0502040204020203" pitchFamily="34" charset="0"/>
@@ -8570,14 +8514,7 @@
                           <a:latin typeface="Segoe UI Light" panose="020B0502040204020203" pitchFamily="34" charset="0"/>
                           <a:cs typeface="Segoe UI Light" panose="020B0502040204020203" pitchFamily="34" charset="0"/>
                         </a:rPr>
-                        <a:t>07 | </a:t>
-                      </a:r>
-                      <a:r>
-                        <a:rPr lang="en-US" sz="2400" dirty="0" smtClean="0">
-                          <a:latin typeface="Segoe UI Light" panose="020B0502040204020203" pitchFamily="34" charset="0"/>
-                          <a:cs typeface="Segoe UI Light" panose="020B0502040204020203" pitchFamily="34" charset="0"/>
-                        </a:rPr>
-                        <a:t>Publishing to Azure</a:t>
+                        <a:t>07 | Publishing to Azure</a:t>
                       </a:r>
                       <a:endParaRPr lang="en-US" sz="2400" dirty="0">
                         <a:latin typeface="Segoe UI Light" panose="020B0502040204020203" pitchFamily="34" charset="0"/>
@@ -8589,7 +8526,7 @@
                 </a:tc>
                 <a:extLst>
                   <a:ext uri="{0D108BD9-81ED-4DB2-BD59-A6C34878D82A}">
-                    <a16:rowId xmlns:a16="http://schemas.microsoft.com/office/drawing/2014/main" xmlns="" val="3812060533"/>
+                    <a16:rowId xmlns="" xmlns:a16="http://schemas.microsoft.com/office/drawing/2014/main" val="3812060533"/>
                   </a:ext>
                 </a:extLst>
               </a:tr>
@@ -8621,14 +8558,21 @@
                           <a:latin typeface="Segoe UI Light" panose="020B0502040204020203" pitchFamily="34" charset="0"/>
                           <a:cs typeface="Segoe UI Light" panose="020B0502040204020203" pitchFamily="34" charset="0"/>
                         </a:rPr>
-                        <a:t>04 | </a:t>
+                        <a:t>04 | Setting </a:t>
                       </a:r>
                       <a:r>
                         <a:rPr lang="en-US" sz="2400" dirty="0" smtClean="0">
                           <a:latin typeface="Segoe UI Light" panose="020B0502040204020203" pitchFamily="34" charset="0"/>
                           <a:cs typeface="Segoe UI Light" panose="020B0502040204020203" pitchFamily="34" charset="0"/>
                         </a:rPr>
-                        <a:t>Setting up the</a:t>
+                        <a:t>Up </a:t>
+                      </a:r>
+                      <a:r>
+                        <a:rPr lang="en-US" sz="2400" dirty="0" smtClean="0">
+                          <a:latin typeface="Segoe UI Light" panose="020B0502040204020203" pitchFamily="34" charset="0"/>
+                          <a:cs typeface="Segoe UI Light" panose="020B0502040204020203" pitchFamily="34" charset="0"/>
+                        </a:rPr>
+                        <a:t>the</a:t>
                       </a:r>
                       <a:r>
                         <a:rPr lang="en-US" sz="2400" baseline="0" dirty="0" smtClean="0">
@@ -8733,11 +8677,7 @@
             <a:pPr marL="914400" indent="-914400"/>
             <a:r>
               <a:rPr lang="en-US" dirty="0" smtClean="0"/>
-              <a:t>01 | </a:t>
-            </a:r>
-            <a:r>
-              <a:rPr lang="en-US" dirty="0" smtClean="0"/>
-              <a:t>Designing for Mobile</a:t>
+              <a:t>01 | Designing for Mobile</a:t>
             </a:r>
             <a:endParaRPr lang="en-US" dirty="0"/>
           </a:p>
@@ -8760,7 +8700,11 @@
           <a:p>
             <a:r>
               <a:rPr lang="en-US" dirty="0" smtClean="0"/>
-              <a:t>Christopher Harrison | @</a:t>
+              <a:t>Christopher Harrison | </a:t>
+            </a:r>
+            <a:r>
+              <a:rPr lang="en-US" dirty="0" smtClean="0"/>
+              <a:t>@</a:t>
             </a:r>
             <a:r>
               <a:rPr lang="en-US" dirty="0" err="1" smtClean="0"/>
@@ -8771,15 +8715,7 @@
           <a:p>
             <a:r>
               <a:rPr lang="en-US" dirty="0" smtClean="0"/>
-              <a:t>Jeremy Foster </a:t>
-            </a:r>
-            <a:r>
-              <a:rPr lang="en-US" dirty="0" smtClean="0"/>
-              <a:t>| </a:t>
-            </a:r>
-            <a:r>
-              <a:rPr lang="en-US" dirty="0" smtClean="0"/>
-              <a:t>@codefoster</a:t>
+              <a:t>Jeremy Foster | @codefoster</a:t>
             </a:r>
             <a:endParaRPr lang="en-US" dirty="0"/>
           </a:p>
@@ -10078,12 +10014,6 @@
 </file>
 
 <file path=customXml/item2.xml><?xml version="1.0" encoding="utf-8"?>
-<p:properties xmlns:p="http://schemas.microsoft.com/office/2006/metadata/properties" xmlns:xsi="http://www.w3.org/2001/XMLSchema-instance" xmlns:pc="http://schemas.microsoft.com/office/infopath/2007/PartnerControls">
-  <documentManagement/>
-</p:properties>
-</file>
-
-<file path=customXml/item3.xml><?xml version="1.0" encoding="utf-8"?>
 <ct:contentTypeSchema xmlns:ct="http://schemas.microsoft.com/office/2006/metadata/contentType" xmlns:ma="http://schemas.microsoft.com/office/2006/metadata/properties/metaAttributes" ct:_="" ma:_="" ma:contentTypeName="Document" ma:contentTypeID="0x010100CF3CFFA86DA93345A891C3CCBC738F63" ma:contentTypeVersion="1" ma:contentTypeDescription="Create a new document." ma:contentTypeScope="" ma:versionID="060e45d69093970729cdde03e78aa3cc">
   <xsd:schema xmlns:xsd="http://www.w3.org/2001/XMLSchema" xmlns:xs="http://www.w3.org/2001/XMLSchema" xmlns:p="http://schemas.microsoft.com/office/2006/metadata/properties" xmlns:ns3="ecd1fa32-ae44-48d6-80a1-71a52da60b4a" targetNamespace="http://schemas.microsoft.com/office/2006/metadata/properties" ma:root="true" ma:fieldsID="2fc9741b54117334ed0e10932dac3600" ns3:_="">
     <xsd:import namespace="ecd1fa32-ae44-48d6-80a1-71a52da60b4a"/>
@@ -10223,6 +10153,12 @@
 </ct:contentTypeSchema>
 </file>
 
+<file path=customXml/item3.xml><?xml version="1.0" encoding="utf-8"?>
+<p:properties xmlns:p="http://schemas.microsoft.com/office/2006/metadata/properties" xmlns:xsi="http://www.w3.org/2001/XMLSchema-instance" xmlns:pc="http://schemas.microsoft.com/office/infopath/2007/PartnerControls">
+  <documentManagement/>
+</p:properties>
+</file>
+
 <file path=customXml/itemProps1.xml><?xml version="1.0" encoding="utf-8"?>
 <ds:datastoreItem xmlns:ds="http://schemas.openxmlformats.org/officeDocument/2006/customXml" ds:itemID="{B0CA13EC-1D3C-4D6F-8D1C-E8A452CFC79A}">
   <ds:schemaRefs>
@@ -10232,22 +10168,6 @@
 </file>
 
 <file path=customXml/itemProps2.xml><?xml version="1.0" encoding="utf-8"?>
-<ds:datastoreItem xmlns:ds="http://schemas.openxmlformats.org/officeDocument/2006/customXml" ds:itemID="{7025FDD9-4C58-4084-9F89-0E6ADD6FFF55}">
-  <ds:schemaRefs>
-    <ds:schemaRef ds:uri="http://purl.org/dc/elements/1.1/"/>
-    <ds:schemaRef ds:uri="http://schemas.microsoft.com/office/2006/metadata/properties"/>
-    <ds:schemaRef ds:uri="http://purl.org/dc/terms/"/>
-    <ds:schemaRef ds:uri="http://schemas.openxmlformats.org/package/2006/metadata/core-properties"/>
-    <ds:schemaRef ds:uri="http://schemas.microsoft.com/office/2006/documentManagement/types"/>
-    <ds:schemaRef ds:uri="http://purl.org/dc/dcmitype/"/>
-    <ds:schemaRef ds:uri="http://schemas.microsoft.com/office/infopath/2007/PartnerControls"/>
-    <ds:schemaRef ds:uri="ecd1fa32-ae44-48d6-80a1-71a52da60b4a"/>
-    <ds:schemaRef ds:uri="http://www.w3.org/XML/1998/namespace"/>
-  </ds:schemaRefs>
-</ds:datastoreItem>
-</file>
-
-<file path=customXml/itemProps3.xml><?xml version="1.0" encoding="utf-8"?>
 <ds:datastoreItem xmlns:ds="http://schemas.openxmlformats.org/officeDocument/2006/customXml" ds:itemID="{A545FFDC-6555-4FAD-8A13-72F96FEB882E}">
   <ds:schemaRefs>
     <ds:schemaRef ds:uri="http://schemas.microsoft.com/office/2006/metadata/contentType"/>
@@ -10263,4 +10183,20 @@
     <ds:schemaRef ds:uri="http://schemas.microsoft.com/internal/obd"/>
   </ds:schemaRefs>
 </ds:datastoreItem>
+</file>
+
+<file path=customXml/itemProps3.xml><?xml version="1.0" encoding="utf-8"?>
+<ds:datastoreItem xmlns:ds="http://schemas.openxmlformats.org/officeDocument/2006/customXml" ds:itemID="{7025FDD9-4C58-4084-9F89-0E6ADD6FFF55}">
+  <ds:schemaRefs>
+    <ds:schemaRef ds:uri="http://purl.org/dc/elements/1.1/"/>
+    <ds:schemaRef ds:uri="http://schemas.microsoft.com/office/2006/metadata/properties"/>
+    <ds:schemaRef ds:uri="http://purl.org/dc/terms/"/>
+    <ds:schemaRef ds:uri="http://schemas.openxmlformats.org/package/2006/metadata/core-properties"/>
+    <ds:schemaRef ds:uri="http://schemas.microsoft.com/office/2006/documentManagement/types"/>
+    <ds:schemaRef ds:uri="http://purl.org/dc/dcmitype/"/>
+    <ds:schemaRef ds:uri="http://schemas.microsoft.com/office/infopath/2007/PartnerControls"/>
+    <ds:schemaRef ds:uri="ecd1fa32-ae44-48d6-80a1-71a52da60b4a"/>
+    <ds:schemaRef ds:uri="http://www.w3.org/XML/1998/namespace"/>
+  </ds:schemaRefs>
+</ds:datastoreItem>
 </file>
</xml_diff>

<commit_message>
get knots page working, add angular-hammer, updates to slides
</commit_message>
<xml_diff>
--- a/Slides/M1 Designing.pptx
+++ b/Slides/M1 Designing.pptx
@@ -6,10 +6,10 @@
     <p:sldMasterId id="2147483674" r:id="rId5"/>
   </p:sldMasterIdLst>
   <p:notesMasterIdLst>
-    <p:notesMasterId r:id="rId40"/>
+    <p:notesMasterId r:id="rId43"/>
   </p:notesMasterIdLst>
   <p:handoutMasterIdLst>
-    <p:handoutMasterId r:id="rId41"/>
+    <p:handoutMasterId r:id="rId44"/>
   </p:handoutMasterIdLst>
   <p:sldIdLst>
     <p:sldId id="271" r:id="rId6"/>
@@ -28,24 +28,27 @@
     <p:sldId id="461" r:id="rId19"/>
     <p:sldId id="462" r:id="rId20"/>
     <p:sldId id="447" r:id="rId21"/>
-    <p:sldId id="463" r:id="rId22"/>
-    <p:sldId id="465" r:id="rId23"/>
-    <p:sldId id="468" r:id="rId24"/>
-    <p:sldId id="466" r:id="rId25"/>
-    <p:sldId id="467" r:id="rId26"/>
-    <p:sldId id="473" r:id="rId27"/>
-    <p:sldId id="472" r:id="rId28"/>
-    <p:sldId id="474" r:id="rId29"/>
-    <p:sldId id="470" r:id="rId30"/>
-    <p:sldId id="471" r:id="rId31"/>
-    <p:sldId id="477" r:id="rId32"/>
-    <p:sldId id="478" r:id="rId33"/>
-    <p:sldId id="479" r:id="rId34"/>
-    <p:sldId id="476" r:id="rId35"/>
-    <p:sldId id="416" r:id="rId36"/>
-    <p:sldId id="469" r:id="rId37"/>
-    <p:sldId id="475" r:id="rId38"/>
-    <p:sldId id="269" r:id="rId39"/>
+    <p:sldId id="483" r:id="rId22"/>
+    <p:sldId id="484" r:id="rId23"/>
+    <p:sldId id="485" r:id="rId24"/>
+    <p:sldId id="463" r:id="rId25"/>
+    <p:sldId id="465" r:id="rId26"/>
+    <p:sldId id="468" r:id="rId27"/>
+    <p:sldId id="466" r:id="rId28"/>
+    <p:sldId id="467" r:id="rId29"/>
+    <p:sldId id="473" r:id="rId30"/>
+    <p:sldId id="472" r:id="rId31"/>
+    <p:sldId id="474" r:id="rId32"/>
+    <p:sldId id="470" r:id="rId33"/>
+    <p:sldId id="471" r:id="rId34"/>
+    <p:sldId id="477" r:id="rId35"/>
+    <p:sldId id="478" r:id="rId36"/>
+    <p:sldId id="479" r:id="rId37"/>
+    <p:sldId id="476" r:id="rId38"/>
+    <p:sldId id="416" r:id="rId39"/>
+    <p:sldId id="469" r:id="rId40"/>
+    <p:sldId id="475" r:id="rId41"/>
+    <p:sldId id="269" r:id="rId42"/>
   </p:sldIdLst>
   <p:sldSz cx="12192000" cy="6858000"/>
   <p:notesSz cx="6858000" cy="9144000"/>
@@ -169,6 +172,9 @@
             <p14:sldId id="461"/>
             <p14:sldId id="462"/>
             <p14:sldId id="447"/>
+            <p14:sldId id="483"/>
+            <p14:sldId id="484"/>
+            <p14:sldId id="485"/>
             <p14:sldId id="463"/>
             <p14:sldId id="465"/>
             <p14:sldId id="468"/>
@@ -287,7 +293,7 @@
           <a:p>
             <a:fld id="{312E7B4A-039C-48A2-9B2C-AF16AA3873D8}" type="datetimeFigureOut">
               <a:rPr lang="en-US" smtClean="0"/>
-              <a:t>10/13/2014</a:t>
+              <a:t>10/20/2014</a:t>
             </a:fld>
             <a:endParaRPr lang="en-US"/>
           </a:p>
@@ -452,7 +458,7 @@
           <a:p>
             <a:fld id="{DA005A0C-54D9-45AA-87D4-C551D08DFCE1}" type="datetimeFigureOut">
               <a:rPr lang="en-US" smtClean="0"/>
-              <a:t>10/13/2014</a:t>
+              <a:t>10/20/2014</a:t>
             </a:fld>
             <a:endParaRPr lang="en-US"/>
           </a:p>
@@ -810,6 +816,98 @@
 </p:notes>
 </file>
 
+<file path=ppt/notesSlides/notesSlide10.xml><?xml version="1.0" encoding="utf-8"?>
+<p:notes xmlns:a="http://schemas.openxmlformats.org/drawingml/2006/main" xmlns:r="http://schemas.openxmlformats.org/officeDocument/2006/relationships" xmlns:p="http://schemas.openxmlformats.org/presentationml/2006/main">
+  <p:cSld>
+    <p:spTree>
+      <p:nvGrpSpPr>
+        <p:cNvPr id="1" name=""/>
+        <p:cNvGrpSpPr/>
+        <p:nvPr/>
+      </p:nvGrpSpPr>
+      <p:grpSpPr>
+        <a:xfrm>
+          <a:off x="0" y="0"/>
+          <a:ext cx="0" cy="0"/>
+          <a:chOff x="0" y="0"/>
+          <a:chExt cx="0" cy="0"/>
+        </a:xfrm>
+      </p:grpSpPr>
+      <p:sp>
+        <p:nvSpPr>
+          <p:cNvPr id="2" name="Slide Image Placeholder 1"/>
+          <p:cNvSpPr>
+            <a:spLocks noGrp="1" noRot="1" noChangeAspect="1"/>
+          </p:cNvSpPr>
+          <p:nvPr>
+            <p:ph type="sldImg"/>
+          </p:nvPr>
+        </p:nvSpPr>
+        <p:spPr/>
+      </p:sp>
+      <p:sp>
+        <p:nvSpPr>
+          <p:cNvPr id="3" name="Notes Placeholder 2"/>
+          <p:cNvSpPr>
+            <a:spLocks noGrp="1"/>
+          </p:cNvSpPr>
+          <p:nvPr>
+            <p:ph type="body" idx="1"/>
+          </p:nvPr>
+        </p:nvSpPr>
+        <p:spPr/>
+        <p:txBody>
+          <a:bodyPr>
+            <a:noAutofit/>
+          </a:bodyPr>
+          <a:lstStyle/>
+          <a:p>
+            <a:endParaRPr lang="en-GB" dirty="0">
+              <a:solidFill>
+                <a:schemeClr val="tx2"/>
+              </a:solidFill>
+              <a:latin typeface="Segoe" pitchFamily="34" charset="0"/>
+            </a:endParaRPr>
+          </a:p>
+        </p:txBody>
+      </p:sp>
+      <p:sp>
+        <p:nvSpPr>
+          <p:cNvPr id="4" name="Slide Number Placeholder 3"/>
+          <p:cNvSpPr>
+            <a:spLocks noGrp="1"/>
+          </p:cNvSpPr>
+          <p:nvPr>
+            <p:ph type="sldNum" sz="quarter" idx="10"/>
+          </p:nvPr>
+        </p:nvSpPr>
+        <p:spPr/>
+        <p:txBody>
+          <a:bodyPr/>
+          <a:lstStyle/>
+          <a:p>
+            <a:fld id="{13F0F35F-DD44-4607-AEC1-49D7A4BC4066}" type="slidenum">
+              <a:rPr lang="en-US" smtClean="0"/>
+              <a:pPr/>
+              <a:t>19</a:t>
+            </a:fld>
+            <a:endParaRPr lang="en-US" dirty="0"/>
+          </a:p>
+        </p:txBody>
+      </p:sp>
+    </p:spTree>
+    <p:extLst>
+      <p:ext uri="{BB962C8B-B14F-4D97-AF65-F5344CB8AC3E}">
+        <p14:creationId xmlns:p14="http://schemas.microsoft.com/office/powerpoint/2010/main" val="1078644173"/>
+      </p:ext>
+    </p:extLst>
+  </p:cSld>
+  <p:clrMapOvr>
+    <a:masterClrMapping/>
+  </p:clrMapOvr>
+</p:notes>
+</file>
+
 <file path=ppt/notesSlides/notesSlide2.xml><?xml version="1.0" encoding="utf-8"?>
 <p:notes xmlns:a="http://schemas.openxmlformats.org/drawingml/2006/main" xmlns:r="http://schemas.openxmlformats.org/officeDocument/2006/relationships" xmlns:p="http://schemas.openxmlformats.org/presentationml/2006/main">
   <p:cSld>
@@ -1204,6 +1302,16 @@
           <a:bodyPr/>
           <a:lstStyle/>
           <a:p>
+            <a:r>
+              <a:rPr lang="en-US" baseline="0" dirty="0" smtClean="0"/>
+              <a:t>Christopher 1,2,3,6</a:t>
+            </a:r>
+          </a:p>
+          <a:p>
+            <a:r>
+              <a:rPr lang="en-US" baseline="0" dirty="0" smtClean="0"/>
+              <a:t>Jeremy 4,5,7</a:t>
+            </a:r>
             <a:endParaRPr lang="en-US" dirty="0"/>
           </a:p>
         </p:txBody>
@@ -1473,6 +1581,132 @@
     <p:extLst>
       <p:ext uri="{BB962C8B-B14F-4D97-AF65-F5344CB8AC3E}">
         <p14:creationId xmlns:p14="http://schemas.microsoft.com/office/powerpoint/2010/main" val="3809712098"/>
+      </p:ext>
+    </p:extLst>
+  </p:cSld>
+  <p:clrMapOvr>
+    <a:masterClrMapping/>
+  </p:clrMapOvr>
+</p:notes>
+</file>
+
+<file path=ppt/notesSlides/notesSlide9.xml><?xml version="1.0" encoding="utf-8"?>
+<p:notes xmlns:a="http://schemas.openxmlformats.org/drawingml/2006/main" xmlns:r="http://schemas.openxmlformats.org/officeDocument/2006/relationships" xmlns:p="http://schemas.openxmlformats.org/presentationml/2006/main">
+  <p:cSld>
+    <p:spTree>
+      <p:nvGrpSpPr>
+        <p:cNvPr id="1" name=""/>
+        <p:cNvGrpSpPr/>
+        <p:nvPr/>
+      </p:nvGrpSpPr>
+      <p:grpSpPr>
+        <a:xfrm>
+          <a:off x="0" y="0"/>
+          <a:ext cx="0" cy="0"/>
+          <a:chOff x="0" y="0"/>
+          <a:chExt cx="0" cy="0"/>
+        </a:xfrm>
+      </p:grpSpPr>
+      <p:sp>
+        <p:nvSpPr>
+          <p:cNvPr id="2" name="Slide Image Placeholder 1"/>
+          <p:cNvSpPr>
+            <a:spLocks noGrp="1" noRot="1" noChangeAspect="1"/>
+          </p:cNvSpPr>
+          <p:nvPr>
+            <p:ph type="sldImg"/>
+          </p:nvPr>
+        </p:nvSpPr>
+        <p:spPr/>
+      </p:sp>
+      <p:sp>
+        <p:nvSpPr>
+          <p:cNvPr id="3" name="Notes Placeholder 2"/>
+          <p:cNvSpPr>
+            <a:spLocks noGrp="1"/>
+          </p:cNvSpPr>
+          <p:nvPr>
+            <p:ph type="body" idx="1"/>
+          </p:nvPr>
+        </p:nvSpPr>
+        <p:spPr/>
+        <p:txBody>
+          <a:bodyPr/>
+          <a:lstStyle/>
+          <a:p>
+            <a:r>
+              <a:rPr lang="en-US" dirty="0" smtClean="0"/>
+              <a:t>Compare…</a:t>
+            </a:r>
+          </a:p>
+          <a:p>
+            <a:r>
+              <a:rPr lang="en-US" dirty="0" smtClean="0"/>
+              <a:t>http://services.odata.org/V</a:t>
+            </a:r>
+            <a:r>
+              <a:rPr lang="en-US" b="0" dirty="0" smtClean="0"/>
+              <a:t>3</a:t>
+            </a:r>
+            <a:r>
+              <a:rPr lang="en-US" dirty="0" smtClean="0"/>
+              <a:t>/OData/OData.svc/Products?$top=10</a:t>
+            </a:r>
+          </a:p>
+          <a:p>
+            <a:r>
+              <a:rPr lang="en-US" dirty="0" smtClean="0"/>
+              <a:t>http://services.odata.org/V</a:t>
+            </a:r>
+            <a:r>
+              <a:rPr lang="en-US" b="1" dirty="0" smtClean="0"/>
+              <a:t>4</a:t>
+            </a:r>
+            <a:r>
+              <a:rPr lang="en-US" dirty="0" smtClean="0"/>
+              <a:t>/OData/OData.svc/Products?$top=10</a:t>
+            </a:r>
+          </a:p>
+          <a:p>
+            <a:r>
+              <a:rPr lang="en-US" dirty="0" smtClean="0"/>
+              <a:t>http://services.odata.org/V4/OData/OData.svc/Products?$top=10</a:t>
+            </a:r>
+            <a:r>
+              <a:rPr lang="en-US" b="1" dirty="0" smtClean="0"/>
+              <a:t>&amp;$select=Name</a:t>
+            </a:r>
+            <a:endParaRPr lang="en-US" b="1" dirty="0"/>
+          </a:p>
+        </p:txBody>
+      </p:sp>
+      <p:sp>
+        <p:nvSpPr>
+          <p:cNvPr id="4" name="Slide Number Placeholder 3"/>
+          <p:cNvSpPr>
+            <a:spLocks noGrp="1"/>
+          </p:cNvSpPr>
+          <p:nvPr>
+            <p:ph type="sldNum" sz="quarter" idx="10"/>
+          </p:nvPr>
+        </p:nvSpPr>
+        <p:spPr/>
+        <p:txBody>
+          <a:bodyPr/>
+          <a:lstStyle/>
+          <a:p>
+            <a:fld id="{4CFD207A-07DF-40AD-A916-9872E089CE7A}" type="slidenum">
+              <a:rPr lang="en-US" smtClean="0"/>
+              <a:t>18</a:t>
+            </a:fld>
+            <a:endParaRPr lang="en-US"/>
+          </a:p>
+        </p:txBody>
+      </p:sp>
+    </p:spTree>
+    <p:extLst>
+      <p:ext uri="{BB962C8B-B14F-4D97-AF65-F5344CB8AC3E}">
+        <p14:creationId xmlns:p14="http://schemas.microsoft.com/office/powerpoint/2010/main" val="3282534490"/>
       </p:ext>
     </p:extLst>
   </p:cSld>
@@ -7704,6 +7938,484 @@
       </p:grpSpPr>
       <p:sp>
         <p:nvSpPr>
+          <p:cNvPr id="2" name="Title 1"/>
+          <p:cNvSpPr>
+            <a:spLocks noGrp="1"/>
+          </p:cNvSpPr>
+          <p:nvPr>
+            <p:ph type="title"/>
+          </p:nvPr>
+        </p:nvSpPr>
+        <p:spPr/>
+        <p:txBody>
+          <a:bodyPr/>
+          <a:lstStyle/>
+          <a:p>
+            <a:r>
+              <a:rPr lang="en-US" dirty="0" smtClean="0"/>
+              <a:t>Things to think about…</a:t>
+            </a:r>
+            <a:endParaRPr lang="en-US" dirty="0"/>
+          </a:p>
+        </p:txBody>
+      </p:sp>
+      <p:sp>
+        <p:nvSpPr>
+          <p:cNvPr id="3" name="Content Placeholder 2"/>
+          <p:cNvSpPr>
+            <a:spLocks noGrp="1"/>
+          </p:cNvSpPr>
+          <p:nvPr>
+            <p:ph sz="quarter" idx="10"/>
+          </p:nvPr>
+        </p:nvSpPr>
+        <p:spPr/>
+        <p:txBody>
+          <a:bodyPr/>
+          <a:lstStyle/>
+          <a:p>
+            <a:r>
+              <a:rPr lang="en-US" dirty="0" smtClean="0"/>
+              <a:t>Redirect to an m-dot</a:t>
+            </a:r>
+          </a:p>
+          <a:p>
+            <a:pPr lvl="1"/>
+            <a:r>
+              <a:rPr lang="en-US" dirty="0" smtClean="0"/>
+              <a:t>Not good for SEO</a:t>
+            </a:r>
+          </a:p>
+          <a:p>
+            <a:pPr lvl="1"/>
+            <a:r>
+              <a:rPr lang="en-US" dirty="0" smtClean="0"/>
+              <a:t>Takes time</a:t>
+            </a:r>
+          </a:p>
+          <a:p>
+            <a:pPr lvl="1"/>
+            <a:r>
+              <a:rPr lang="en-US" dirty="0" smtClean="0"/>
+              <a:t>Bad links when users share content</a:t>
+            </a:r>
+          </a:p>
+          <a:p>
+            <a:r>
+              <a:rPr lang="en-US" dirty="0" smtClean="0"/>
+              <a:t>Message size</a:t>
+            </a:r>
+          </a:p>
+          <a:p>
+            <a:pPr lvl="1"/>
+            <a:r>
+              <a:rPr lang="en-US" dirty="0" smtClean="0"/>
+              <a:t>Choose JSON</a:t>
+            </a:r>
+          </a:p>
+          <a:p>
+            <a:pPr lvl="1"/>
+            <a:r>
+              <a:rPr lang="en-US" dirty="0" smtClean="0"/>
+              <a:t>Consider OData</a:t>
+            </a:r>
+            <a:endParaRPr lang="en-US" dirty="0"/>
+          </a:p>
+        </p:txBody>
+      </p:sp>
+    </p:spTree>
+    <p:extLst>
+      <p:ext uri="{BB962C8B-B14F-4D97-AF65-F5344CB8AC3E}">
+        <p14:creationId xmlns:p14="http://schemas.microsoft.com/office/powerpoint/2010/main" val="3601339423"/>
+      </p:ext>
+    </p:extLst>
+  </p:cSld>
+  <p:clrMapOvr>
+    <a:masterClrMapping/>
+  </p:clrMapOvr>
+  <mc:AlternateContent xmlns:mc="http://schemas.openxmlformats.org/markup-compatibility/2006">
+    <mc:Choice xmlns:p14="http://schemas.microsoft.com/office/powerpoint/2010/main" Requires="p14">
+      <p:transition spd="slow" p14:dur="2000"/>
+    </mc:Choice>
+    <mc:Fallback>
+      <p:transition spd="slow"/>
+    </mc:Fallback>
+  </mc:AlternateContent>
+</p:sld>
+</file>
+
+<file path=ppt/slides/slide18.xml><?xml version="1.0" encoding="utf-8"?>
+<p:sld xmlns:a="http://schemas.openxmlformats.org/drawingml/2006/main" xmlns:r="http://schemas.openxmlformats.org/officeDocument/2006/relationships" xmlns:p="http://schemas.openxmlformats.org/presentationml/2006/main">
+  <p:cSld>
+    <p:spTree>
+      <p:nvGrpSpPr>
+        <p:cNvPr id="1" name=""/>
+        <p:cNvGrpSpPr/>
+        <p:nvPr/>
+      </p:nvGrpSpPr>
+      <p:grpSpPr>
+        <a:xfrm>
+          <a:off x="0" y="0"/>
+          <a:ext cx="0" cy="0"/>
+          <a:chOff x="0" y="0"/>
+          <a:chExt cx="0" cy="0"/>
+        </a:xfrm>
+      </p:grpSpPr>
+      <p:sp>
+        <p:nvSpPr>
+          <p:cNvPr id="2" name="Title 1"/>
+          <p:cNvSpPr>
+            <a:spLocks noGrp="1"/>
+          </p:cNvSpPr>
+          <p:nvPr>
+            <p:ph type="title"/>
+          </p:nvPr>
+        </p:nvSpPr>
+        <p:spPr/>
+        <p:txBody>
+          <a:bodyPr/>
+          <a:lstStyle/>
+          <a:p>
+            <a:r>
+              <a:rPr lang="en-US" dirty="0" smtClean="0"/>
+              <a:t>Benefits of JSON and OData</a:t>
+            </a:r>
+            <a:endParaRPr lang="en-US" dirty="0"/>
+          </a:p>
+        </p:txBody>
+      </p:sp>
+    </p:spTree>
+    <p:extLst>
+      <p:ext uri="{BB962C8B-B14F-4D97-AF65-F5344CB8AC3E}">
+        <p14:creationId xmlns:p14="http://schemas.microsoft.com/office/powerpoint/2010/main" val="899386939"/>
+      </p:ext>
+    </p:extLst>
+  </p:cSld>
+  <p:clrMapOvr>
+    <a:masterClrMapping/>
+  </p:clrMapOvr>
+</p:sld>
+</file>
+
+<file path=ppt/slides/slide19.xml><?xml version="1.0" encoding="utf-8"?>
+<p:sld xmlns:a="http://schemas.openxmlformats.org/drawingml/2006/main" xmlns:r="http://schemas.openxmlformats.org/officeDocument/2006/relationships" xmlns:p="http://schemas.openxmlformats.org/presentationml/2006/main">
+  <p:cSld>
+    <p:spTree>
+      <p:nvGrpSpPr>
+        <p:cNvPr id="1" name=""/>
+        <p:cNvGrpSpPr/>
+        <p:nvPr/>
+      </p:nvGrpSpPr>
+      <p:grpSpPr>
+        <a:xfrm>
+          <a:off x="0" y="0"/>
+          <a:ext cx="0" cy="0"/>
+          <a:chOff x="0" y="0"/>
+          <a:chExt cx="0" cy="0"/>
+        </a:xfrm>
+      </p:grpSpPr>
+      <p:sp>
+        <p:nvSpPr>
+          <p:cNvPr id="7" name="Content Placeholder 6"/>
+          <p:cNvSpPr>
+            <a:spLocks noGrp="1"/>
+          </p:cNvSpPr>
+          <p:nvPr>
+            <p:ph sz="quarter" idx="10"/>
+          </p:nvPr>
+        </p:nvSpPr>
+        <p:spPr/>
+        <p:txBody>
+          <a:bodyPr>
+            <a:normAutofit/>
+          </a:bodyPr>
+          <a:lstStyle/>
+          <a:p>
+            <a:r>
+              <a:rPr lang="en-GB" dirty="0" smtClean="0"/>
+              <a:t>azure.microsoft.com/</a:t>
+            </a:r>
+            <a:r>
+              <a:rPr lang="en-GB" dirty="0" err="1" smtClean="0"/>
+              <a:t>en</a:t>
+            </a:r>
+            <a:r>
+              <a:rPr lang="en-GB" dirty="0" smtClean="0"/>
+              <a:t>-us/develop/mobile/reference</a:t>
+            </a:r>
+          </a:p>
+          <a:p>
+            <a:r>
+              <a:rPr lang="en-GB" dirty="0" smtClean="0"/>
+              <a:t>odata.org</a:t>
+            </a:r>
+            <a:endParaRPr lang="en-GB" dirty="0"/>
+          </a:p>
+        </p:txBody>
+      </p:sp>
+      <p:sp>
+        <p:nvSpPr>
+          <p:cNvPr id="2" name="Title 1"/>
+          <p:cNvSpPr>
+            <a:spLocks noGrp="1"/>
+          </p:cNvSpPr>
+          <p:nvPr>
+            <p:ph type="title"/>
+          </p:nvPr>
+        </p:nvSpPr>
+        <p:spPr/>
+        <p:txBody>
+          <a:bodyPr/>
+          <a:lstStyle/>
+          <a:p>
+            <a:r>
+              <a:rPr lang="en-US" dirty="0" smtClean="0"/>
+              <a:t>Resources</a:t>
+            </a:r>
+            <a:endParaRPr lang="en-US" dirty="0"/>
+          </a:p>
+        </p:txBody>
+      </p:sp>
+    </p:spTree>
+    <p:extLst>
+      <p:ext uri="{BB962C8B-B14F-4D97-AF65-F5344CB8AC3E}">
+        <p14:creationId xmlns:p14="http://schemas.microsoft.com/office/powerpoint/2010/main" val="568915478"/>
+      </p:ext>
+    </p:extLst>
+  </p:cSld>
+  <p:clrMapOvr>
+    <a:masterClrMapping/>
+  </p:clrMapOvr>
+  <p:timing>
+    <p:tnLst>
+      <p:par>
+        <p:cTn id="1" dur="indefinite" restart="never" nodeType="tmRoot"/>
+      </p:par>
+    </p:tnLst>
+  </p:timing>
+</p:sld>
+</file>
+
+<file path=ppt/slides/slide2.xml><?xml version="1.0" encoding="utf-8"?>
+<p:sld xmlns:a="http://schemas.openxmlformats.org/drawingml/2006/main" xmlns:r="http://schemas.openxmlformats.org/officeDocument/2006/relationships" xmlns:p="http://schemas.openxmlformats.org/presentationml/2006/main">
+  <p:cSld>
+    <p:spTree>
+      <p:nvGrpSpPr>
+        <p:cNvPr id="1" name=""/>
+        <p:cNvGrpSpPr/>
+        <p:nvPr/>
+      </p:nvGrpSpPr>
+      <p:grpSpPr>
+        <a:xfrm>
+          <a:off x="0" y="0"/>
+          <a:ext cx="0" cy="0"/>
+          <a:chOff x="0" y="0"/>
+          <a:chExt cx="0" cy="0"/>
+        </a:xfrm>
+      </p:grpSpPr>
+      <p:sp>
+        <p:nvSpPr>
+          <p:cNvPr id="2" name="Title 1"/>
+          <p:cNvSpPr>
+            <a:spLocks noGrp="1"/>
+          </p:cNvSpPr>
+          <p:nvPr>
+            <p:ph type="title"/>
+          </p:nvPr>
+        </p:nvSpPr>
+        <p:spPr/>
+        <p:txBody>
+          <a:bodyPr/>
+          <a:lstStyle/>
+          <a:p>
+            <a:r>
+              <a:rPr lang="en-US" sz="4000" dirty="0" smtClean="0"/>
+              <a:t>Meet Christopher Harrison | ‏@</a:t>
+            </a:r>
+            <a:r>
+              <a:rPr lang="en-US" sz="4000" dirty="0" err="1" smtClean="0"/>
+              <a:t>geektrainer</a:t>
+            </a:r>
+            <a:r>
+              <a:rPr lang="en-US" dirty="0" smtClean="0"/>
+              <a:t> </a:t>
+            </a:r>
+            <a:endParaRPr lang="en-US" dirty="0"/>
+          </a:p>
+        </p:txBody>
+      </p:sp>
+      <p:sp>
+        <p:nvSpPr>
+          <p:cNvPr id="7" name="Content Placeholder 6"/>
+          <p:cNvSpPr>
+            <a:spLocks noGrp="1"/>
+          </p:cNvSpPr>
+          <p:nvPr>
+            <p:ph idx="10"/>
+          </p:nvPr>
+        </p:nvSpPr>
+        <p:spPr/>
+        <p:txBody>
+          <a:bodyPr/>
+          <a:lstStyle/>
+          <a:p>
+            <a:pPr marL="0" indent="0">
+              <a:buNone/>
+            </a:pPr>
+            <a:r>
+              <a:rPr lang="en-US" dirty="0" smtClean="0"/>
+              <a:t>Content Developer, Microsoft</a:t>
+            </a:r>
+          </a:p>
+          <a:p>
+            <a:pPr marL="457046" lvl="1" indent="0">
+              <a:buNone/>
+            </a:pPr>
+            <a:r>
+              <a:rPr lang="en-US" dirty="0" smtClean="0"/>
+              <a:t>Focused on web and Office 365 development</a:t>
+            </a:r>
+          </a:p>
+          <a:p>
+            <a:pPr marL="457046" lvl="1" indent="0">
+              <a:buNone/>
+            </a:pPr>
+            <a:r>
+              <a:rPr lang="en-US" dirty="0" smtClean="0"/>
+              <a:t>Microsoft Certified Trainer</a:t>
+            </a:r>
+          </a:p>
+          <a:p>
+            <a:pPr marL="457046" lvl="1" indent="0">
+              <a:buNone/>
+            </a:pPr>
+            <a:r>
+              <a:rPr lang="en-US" dirty="0" smtClean="0"/>
+              <a:t>Still misses his Commodore 64</a:t>
+            </a:r>
+          </a:p>
+          <a:p>
+            <a:pPr marL="0" indent="0">
+              <a:buNone/>
+            </a:pPr>
+            <a:r>
+              <a:rPr lang="en-US" dirty="0" smtClean="0"/>
+              <a:t>Long time geek</a:t>
+            </a:r>
+          </a:p>
+          <a:p>
+            <a:pPr marL="457046" lvl="1" indent="0">
+              <a:buNone/>
+            </a:pPr>
+            <a:r>
+              <a:rPr lang="en-US" dirty="0" smtClean="0"/>
+              <a:t>Regular presenter at TechEd</a:t>
+            </a:r>
+          </a:p>
+          <a:p>
+            <a:pPr marL="457046" lvl="1" indent="0">
+              <a:buNone/>
+            </a:pPr>
+            <a:r>
+              <a:rPr lang="en-US" dirty="0" smtClean="0"/>
+              <a:t>Periodic blogger at </a:t>
+            </a:r>
+            <a:r>
+              <a:rPr lang="en-US" dirty="0" smtClean="0">
+                <a:hlinkClick r:id="rId3"/>
+              </a:rPr>
+              <a:t>http://blog.geektrainer.com</a:t>
+            </a:r>
+            <a:endParaRPr lang="en-US" dirty="0" smtClean="0"/>
+          </a:p>
+          <a:p>
+            <a:pPr marL="457046" lvl="1" indent="0">
+              <a:buNone/>
+            </a:pPr>
+            <a:r>
+              <a:rPr lang="en-US" dirty="0" smtClean="0"/>
+              <a:t>Marathoner, husband, father of one four legged child</a:t>
+            </a:r>
+          </a:p>
+        </p:txBody>
+      </p:sp>
+      <p:pic>
+        <p:nvPicPr>
+          <p:cNvPr id="3" name="Picture 2"/>
+          <p:cNvPicPr>
+            <a:picLocks noChangeAspect="1"/>
+          </p:cNvPicPr>
+          <p:nvPr/>
+        </p:nvPicPr>
+        <p:blipFill>
+          <a:blip r:embed="rId4" cstate="print">
+            <a:extLst>
+              <a:ext uri="{28A0092B-C50C-407E-A947-70E740481C1C}">
+                <a14:useLocalDpi xmlns:a14="http://schemas.microsoft.com/office/drawing/2010/main" val="0"/>
+              </a:ext>
+            </a:extLst>
+          </a:blip>
+          <a:stretch>
+            <a:fillRect/>
+          </a:stretch>
+        </p:blipFill>
+        <p:spPr>
+          <a:xfrm>
+            <a:off x="9462977" y="0"/>
+            <a:ext cx="2729023" cy="2729023"/>
+          </a:xfrm>
+          <a:prstGeom prst="rect">
+            <a:avLst/>
+          </a:prstGeom>
+        </p:spPr>
+      </p:pic>
+    </p:spTree>
+    <p:extLst>
+      <p:ext uri="{BB962C8B-B14F-4D97-AF65-F5344CB8AC3E}">
+        <p14:creationId xmlns:p14="http://schemas.microsoft.com/office/powerpoint/2010/main" val="34619393"/>
+      </p:ext>
+    </p:extLst>
+  </p:cSld>
+  <p:clrMapOvr>
+    <a:masterClrMapping/>
+  </p:clrMapOvr>
+  <mc:AlternateContent xmlns:mc="http://schemas.openxmlformats.org/markup-compatibility/2006" xmlns:p14="http://schemas.microsoft.com/office/powerpoint/2010/main">
+    <mc:Choice Requires="p14">
+      <p:transition spd="slow" p14:dur="2000"/>
+    </mc:Choice>
+    <mc:Fallback xmlns="">
+      <p:transition spd="slow"/>
+    </mc:Fallback>
+  </mc:AlternateContent>
+  <p:timing>
+    <p:tnLst>
+      <p:par>
+        <p:cTn id="1" dur="indefinite" restart="never" nodeType="tmRoot"/>
+      </p:par>
+    </p:tnLst>
+  </p:timing>
+</p:sld>
+</file>
+
+<file path=ppt/slides/slide20.xml><?xml version="1.0" encoding="utf-8"?>
+<p:sld xmlns:a="http://schemas.openxmlformats.org/drawingml/2006/main" xmlns:r="http://schemas.openxmlformats.org/officeDocument/2006/relationships" xmlns:p="http://schemas.openxmlformats.org/presentationml/2006/main">
+  <p:cSld>
+    <p:spTree>
+      <p:nvGrpSpPr>
+        <p:cNvPr id="1" name=""/>
+        <p:cNvGrpSpPr/>
+        <p:nvPr/>
+      </p:nvGrpSpPr>
+      <p:grpSpPr>
+        <a:xfrm>
+          <a:off x="0" y="0"/>
+          <a:ext cx="0" cy="0"/>
+          <a:chOff x="0" y="0"/>
+          <a:chExt cx="0" cy="0"/>
+        </a:xfrm>
+      </p:grpSpPr>
+      <p:sp>
+        <p:nvSpPr>
           <p:cNvPr id="4" name="Title 3"/>
           <p:cNvSpPr>
             <a:spLocks noGrp="1"/>
@@ -8066,7 +8778,7 @@
 </p:sld>
 </file>
 
-<file path=ppt/slides/slide18.xml><?xml version="1.0" encoding="utf-8"?>
+<file path=ppt/slides/slide21.xml><?xml version="1.0" encoding="utf-8"?>
 <p:sld xmlns:a="http://schemas.openxmlformats.org/drawingml/2006/main" xmlns:r="http://schemas.openxmlformats.org/officeDocument/2006/relationships" xmlns:p="http://schemas.openxmlformats.org/presentationml/2006/main">
   <p:cSld>
     <p:spTree>
@@ -8414,7 +9126,7 @@
 </p:sld>
 </file>
 
-<file path=ppt/slides/slide19.xml><?xml version="1.0" encoding="utf-8"?>
+<file path=ppt/slides/slide22.xml><?xml version="1.0" encoding="utf-8"?>
 <p:sld xmlns:a="http://schemas.openxmlformats.org/drawingml/2006/main" xmlns:r="http://schemas.openxmlformats.org/officeDocument/2006/relationships" xmlns:p="http://schemas.openxmlformats.org/presentationml/2006/main">
   <p:cSld>
     <p:spTree>
@@ -8699,208 +9411,7 @@
 </p:sld>
 </file>
 
-<file path=ppt/slides/slide2.xml><?xml version="1.0" encoding="utf-8"?>
-<p:sld xmlns:a="http://schemas.openxmlformats.org/drawingml/2006/main" xmlns:r="http://schemas.openxmlformats.org/officeDocument/2006/relationships" xmlns:p="http://schemas.openxmlformats.org/presentationml/2006/main">
-  <p:cSld>
-    <p:spTree>
-      <p:nvGrpSpPr>
-        <p:cNvPr id="1" name=""/>
-        <p:cNvGrpSpPr/>
-        <p:nvPr/>
-      </p:nvGrpSpPr>
-      <p:grpSpPr>
-        <a:xfrm>
-          <a:off x="0" y="0"/>
-          <a:ext cx="0" cy="0"/>
-          <a:chOff x="0" y="0"/>
-          <a:chExt cx="0" cy="0"/>
-        </a:xfrm>
-      </p:grpSpPr>
-      <p:sp>
-        <p:nvSpPr>
-          <p:cNvPr id="2" name="Title 1"/>
-          <p:cNvSpPr>
-            <a:spLocks noGrp="1"/>
-          </p:cNvSpPr>
-          <p:nvPr>
-            <p:ph type="title"/>
-          </p:nvPr>
-        </p:nvSpPr>
-        <p:spPr/>
-        <p:txBody>
-          <a:bodyPr/>
-          <a:lstStyle/>
-          <a:p>
-            <a:r>
-              <a:rPr lang="en-US" sz="4000" dirty="0" smtClean="0"/>
-              <a:t>Meet Christopher Harrison | ‏@</a:t>
-            </a:r>
-            <a:r>
-              <a:rPr lang="en-US" sz="4000" dirty="0" err="1" smtClean="0"/>
-              <a:t>geektrainer</a:t>
-            </a:r>
-            <a:r>
-              <a:rPr lang="en-US" dirty="0" smtClean="0"/>
-              <a:t> </a:t>
-            </a:r>
-            <a:endParaRPr lang="en-US" dirty="0"/>
-          </a:p>
-        </p:txBody>
-      </p:sp>
-      <p:sp>
-        <p:nvSpPr>
-          <p:cNvPr id="7" name="Content Placeholder 6"/>
-          <p:cNvSpPr>
-            <a:spLocks noGrp="1"/>
-          </p:cNvSpPr>
-          <p:nvPr>
-            <p:ph idx="10"/>
-          </p:nvPr>
-        </p:nvSpPr>
-        <p:spPr/>
-        <p:txBody>
-          <a:bodyPr/>
-          <a:lstStyle/>
-          <a:p>
-            <a:pPr marL="0" indent="0">
-              <a:buNone/>
-            </a:pPr>
-            <a:r>
-              <a:rPr lang="en-US" dirty="0" smtClean="0"/>
-              <a:t>Content Developer, Microsoft</a:t>
-            </a:r>
-          </a:p>
-          <a:p>
-            <a:pPr marL="457046" lvl="1" indent="0">
-              <a:buNone/>
-            </a:pPr>
-            <a:r>
-              <a:rPr lang="en-US" dirty="0" smtClean="0"/>
-              <a:t>Focused on web and Office 365 development</a:t>
-            </a:r>
-          </a:p>
-          <a:p>
-            <a:pPr marL="457046" lvl="1" indent="0">
-              <a:buNone/>
-            </a:pPr>
-            <a:r>
-              <a:rPr lang="en-US" dirty="0" smtClean="0"/>
-              <a:t>Microsoft Certified Trainer</a:t>
-            </a:r>
-          </a:p>
-          <a:p>
-            <a:pPr marL="457046" lvl="1" indent="0">
-              <a:buNone/>
-            </a:pPr>
-            <a:r>
-              <a:rPr lang="en-US" dirty="0" smtClean="0"/>
-              <a:t>Still misses his Commodore 64</a:t>
-            </a:r>
-          </a:p>
-          <a:p>
-            <a:pPr marL="0" indent="0">
-              <a:buNone/>
-            </a:pPr>
-            <a:r>
-              <a:rPr lang="en-US" dirty="0" smtClean="0"/>
-              <a:t>Long time geek</a:t>
-            </a:r>
-          </a:p>
-          <a:p>
-            <a:pPr marL="457046" lvl="1" indent="0">
-              <a:buNone/>
-            </a:pPr>
-            <a:r>
-              <a:rPr lang="en-US" dirty="0" smtClean="0"/>
-              <a:t>Regular presenter at TechEd</a:t>
-            </a:r>
-          </a:p>
-          <a:p>
-            <a:pPr marL="457046" lvl="1" indent="0">
-              <a:buNone/>
-            </a:pPr>
-            <a:r>
-              <a:rPr lang="en-US" dirty="0" smtClean="0"/>
-              <a:t>Periodic blogger at </a:t>
-            </a:r>
-            <a:r>
-              <a:rPr lang="en-US" dirty="0" smtClean="0">
-                <a:hlinkClick r:id="rId3"/>
-              </a:rPr>
-              <a:t>http://blog.geektrainer.com</a:t>
-            </a:r>
-            <a:endParaRPr lang="en-US" dirty="0" smtClean="0"/>
-          </a:p>
-          <a:p>
-            <a:pPr marL="457046" lvl="1" indent="0">
-              <a:buNone/>
-            </a:pPr>
-            <a:r>
-              <a:rPr lang="en-US" dirty="0" smtClean="0"/>
-              <a:t>Marathoner, husband, father of one four legged child</a:t>
-            </a:r>
-          </a:p>
-        </p:txBody>
-      </p:sp>
-      <p:pic>
-        <p:nvPicPr>
-          <p:cNvPr id="3" name="Picture 2"/>
-          <p:cNvPicPr>
-            <a:picLocks noChangeAspect="1"/>
-          </p:cNvPicPr>
-          <p:nvPr/>
-        </p:nvPicPr>
-        <p:blipFill>
-          <a:blip r:embed="rId4" cstate="print">
-            <a:extLst>
-              <a:ext uri="{28A0092B-C50C-407E-A947-70E740481C1C}">
-                <a14:useLocalDpi xmlns:a14="http://schemas.microsoft.com/office/drawing/2010/main" val="0"/>
-              </a:ext>
-            </a:extLst>
-          </a:blip>
-          <a:stretch>
-            <a:fillRect/>
-          </a:stretch>
-        </p:blipFill>
-        <p:spPr>
-          <a:xfrm>
-            <a:off x="9462977" y="0"/>
-            <a:ext cx="2729023" cy="2729023"/>
-          </a:xfrm>
-          <a:prstGeom prst="rect">
-            <a:avLst/>
-          </a:prstGeom>
-        </p:spPr>
-      </p:pic>
-    </p:spTree>
-    <p:extLst>
-      <p:ext uri="{BB962C8B-B14F-4D97-AF65-F5344CB8AC3E}">
-        <p14:creationId xmlns:p14="http://schemas.microsoft.com/office/powerpoint/2010/main" val="34619393"/>
-      </p:ext>
-    </p:extLst>
-  </p:cSld>
-  <p:clrMapOvr>
-    <a:masterClrMapping/>
-  </p:clrMapOvr>
-  <mc:AlternateContent xmlns:mc="http://schemas.openxmlformats.org/markup-compatibility/2006" xmlns:p14="http://schemas.microsoft.com/office/powerpoint/2010/main">
-    <mc:Choice Requires="p14">
-      <p:transition spd="slow" p14:dur="2000"/>
-    </mc:Choice>
-    <mc:Fallback xmlns="">
-      <p:transition spd="slow"/>
-    </mc:Fallback>
-  </mc:AlternateContent>
-  <p:timing>
-    <p:tnLst>
-      <p:par>
-        <p:cTn id="1" dur="indefinite" restart="never" nodeType="tmRoot"/>
-      </p:par>
-    </p:tnLst>
-  </p:timing>
-</p:sld>
-</file>
-
-<file path=ppt/slides/slide20.xml><?xml version="1.0" encoding="utf-8"?>
+<file path=ppt/slides/slide23.xml><?xml version="1.0" encoding="utf-8"?>
 <p:sld xmlns:a="http://schemas.openxmlformats.org/drawingml/2006/main" xmlns:r="http://schemas.openxmlformats.org/officeDocument/2006/relationships" xmlns:p="http://schemas.openxmlformats.org/presentationml/2006/main">
   <p:cSld>
     <p:spTree>
@@ -9016,7 +9527,7 @@
 </p:sld>
 </file>
 
-<file path=ppt/slides/slide21.xml><?xml version="1.0" encoding="utf-8"?>
+<file path=ppt/slides/slide24.xml><?xml version="1.0" encoding="utf-8"?>
 <p:sld xmlns:a="http://schemas.openxmlformats.org/drawingml/2006/main" xmlns:r="http://schemas.openxmlformats.org/officeDocument/2006/relationships" xmlns:p="http://schemas.openxmlformats.org/presentationml/2006/main">
   <p:cSld>
     <p:spTree>
@@ -9332,7 +9843,7 @@
 </p:sld>
 </file>
 
-<file path=ppt/slides/slide22.xml><?xml version="1.0" encoding="utf-8"?>
+<file path=ppt/slides/slide25.xml><?xml version="1.0" encoding="utf-8"?>
 <p:sld xmlns:a="http://schemas.openxmlformats.org/drawingml/2006/main" xmlns:r="http://schemas.openxmlformats.org/officeDocument/2006/relationships" xmlns:p="http://schemas.openxmlformats.org/presentationml/2006/main">
   <p:cSld>
     <p:bg>
@@ -9664,347 +10175,6 @@
 </p:sld>
 </file>
 
-<file path=ppt/slides/slide23.xml><?xml version="1.0" encoding="utf-8"?>
-<p:sld xmlns:a="http://schemas.openxmlformats.org/drawingml/2006/main" xmlns:r="http://schemas.openxmlformats.org/officeDocument/2006/relationships" xmlns:p="http://schemas.openxmlformats.org/presentationml/2006/main">
-  <p:cSld>
-    <p:spTree>
-      <p:nvGrpSpPr>
-        <p:cNvPr id="1" name=""/>
-        <p:cNvGrpSpPr/>
-        <p:nvPr/>
-      </p:nvGrpSpPr>
-      <p:grpSpPr>
-        <a:xfrm>
-          <a:off x="0" y="0"/>
-          <a:ext cx="0" cy="0"/>
-          <a:chOff x="0" y="0"/>
-          <a:chExt cx="0" cy="0"/>
-        </a:xfrm>
-      </p:grpSpPr>
-      <p:sp>
-        <p:nvSpPr>
-          <p:cNvPr id="2" name="Title 1"/>
-          <p:cNvSpPr>
-            <a:spLocks noGrp="1"/>
-          </p:cNvSpPr>
-          <p:nvPr>
-            <p:ph type="title"/>
-          </p:nvPr>
-        </p:nvSpPr>
-        <p:spPr/>
-        <p:txBody>
-          <a:bodyPr/>
-          <a:lstStyle/>
-          <a:p>
-            <a:r>
-              <a:rPr lang="en-US" dirty="0" smtClean="0"/>
-              <a:t>Limit JavaScript</a:t>
-            </a:r>
-            <a:endParaRPr lang="en-US" dirty="0"/>
-          </a:p>
-        </p:txBody>
-      </p:sp>
-      <p:sp>
-        <p:nvSpPr>
-          <p:cNvPr id="3" name="Content Placeholder 2"/>
-          <p:cNvSpPr>
-            <a:spLocks noGrp="1"/>
-          </p:cNvSpPr>
-          <p:nvPr>
-            <p:ph sz="quarter" idx="10"/>
-          </p:nvPr>
-        </p:nvSpPr>
-        <p:spPr/>
-        <p:txBody>
-          <a:bodyPr/>
-          <a:lstStyle/>
-          <a:p>
-            <a:r>
-              <a:rPr lang="en-US" dirty="0" smtClean="0"/>
-              <a:t>Mobile devices lack the processing power of their larger relatives</a:t>
-            </a:r>
-          </a:p>
-          <a:p>
-            <a:r>
-              <a:rPr lang="en-US" dirty="0" smtClean="0"/>
-              <a:t>Complex scripts bring your page to a halt</a:t>
-            </a:r>
-          </a:p>
-          <a:p>
-            <a:r>
-              <a:rPr lang="en-US" dirty="0" smtClean="0"/>
-              <a:t>Pages can refresh</a:t>
-            </a:r>
-          </a:p>
-          <a:p>
-            <a:r>
-              <a:rPr lang="en-US" dirty="0" smtClean="0"/>
-              <a:t>Consider avoiding common libraries</a:t>
-            </a:r>
-          </a:p>
-          <a:p>
-            <a:pPr lvl="1"/>
-            <a:r>
-              <a:rPr lang="en-US" dirty="0" smtClean="0"/>
-              <a:t>jQuery</a:t>
-            </a:r>
-          </a:p>
-          <a:p>
-            <a:pPr lvl="1"/>
-            <a:r>
-              <a:rPr lang="en-US" dirty="0" smtClean="0"/>
-              <a:t>Bootstrap</a:t>
-            </a:r>
-          </a:p>
-          <a:p>
-            <a:r>
-              <a:rPr lang="en-US" dirty="0" smtClean="0"/>
-              <a:t>microjs.com for sourcing helper scripts</a:t>
-            </a:r>
-            <a:endParaRPr lang="en-US" dirty="0"/>
-          </a:p>
-        </p:txBody>
-      </p:sp>
-    </p:spTree>
-    <p:extLst>
-      <p:ext uri="{BB962C8B-B14F-4D97-AF65-F5344CB8AC3E}">
-        <p14:creationId xmlns:p14="http://schemas.microsoft.com/office/powerpoint/2010/main" val="2001083792"/>
-      </p:ext>
-    </p:extLst>
-  </p:cSld>
-  <p:clrMapOvr>
-    <a:masterClrMapping/>
-  </p:clrMapOvr>
-  <p:timing>
-    <p:tnLst>
-      <p:par>
-        <p:cTn id="1" dur="indefinite" restart="never" nodeType="tmRoot"/>
-      </p:par>
-    </p:tnLst>
-  </p:timing>
-</p:sld>
-</file>
-
-<file path=ppt/slides/slide24.xml><?xml version="1.0" encoding="utf-8"?>
-<p:sld xmlns:a="http://schemas.openxmlformats.org/drawingml/2006/main" xmlns:r="http://schemas.openxmlformats.org/officeDocument/2006/relationships" xmlns:p="http://schemas.openxmlformats.org/presentationml/2006/main">
-  <p:cSld>
-    <p:spTree>
-      <p:nvGrpSpPr>
-        <p:cNvPr id="1" name=""/>
-        <p:cNvGrpSpPr/>
-        <p:nvPr/>
-      </p:nvGrpSpPr>
-      <p:grpSpPr>
-        <a:xfrm>
-          <a:off x="0" y="0"/>
-          <a:ext cx="0" cy="0"/>
-          <a:chOff x="0" y="0"/>
-          <a:chExt cx="0" cy="0"/>
-        </a:xfrm>
-      </p:grpSpPr>
-      <p:sp>
-        <p:nvSpPr>
-          <p:cNvPr id="2" name="Title 1"/>
-          <p:cNvSpPr>
-            <a:spLocks noGrp="1"/>
-          </p:cNvSpPr>
-          <p:nvPr>
-            <p:ph type="title"/>
-          </p:nvPr>
-        </p:nvSpPr>
-        <p:spPr/>
-        <p:txBody>
-          <a:bodyPr/>
-          <a:lstStyle/>
-          <a:p>
-            <a:r>
-              <a:rPr lang="en-US" dirty="0" smtClean="0"/>
-              <a:t>Depend on CSS</a:t>
-            </a:r>
-            <a:endParaRPr lang="en-US" dirty="0"/>
-          </a:p>
-        </p:txBody>
-      </p:sp>
-      <p:sp>
-        <p:nvSpPr>
-          <p:cNvPr id="3" name="Content Placeholder 2"/>
-          <p:cNvSpPr>
-            <a:spLocks noGrp="1"/>
-          </p:cNvSpPr>
-          <p:nvPr>
-            <p:ph sz="quarter" idx="10"/>
-          </p:nvPr>
-        </p:nvSpPr>
-        <p:spPr/>
-        <p:txBody>
-          <a:bodyPr/>
-          <a:lstStyle/>
-          <a:p>
-            <a:r>
-              <a:rPr lang="en-US" dirty="0" smtClean="0"/>
-              <a:t>Media queries are your friend</a:t>
-            </a:r>
-          </a:p>
-          <a:p>
-            <a:r>
-              <a:rPr lang="en-US" dirty="0" smtClean="0"/>
-              <a:t>Target device sizes without scripts</a:t>
-            </a:r>
-            <a:endParaRPr lang="en-US" dirty="0"/>
-          </a:p>
-        </p:txBody>
-      </p:sp>
-    </p:spTree>
-    <p:extLst>
-      <p:ext uri="{BB962C8B-B14F-4D97-AF65-F5344CB8AC3E}">
-        <p14:creationId xmlns:p14="http://schemas.microsoft.com/office/powerpoint/2010/main" val="1544054854"/>
-      </p:ext>
-    </p:extLst>
-  </p:cSld>
-  <p:clrMapOvr>
-    <a:masterClrMapping/>
-  </p:clrMapOvr>
-  <p:timing>
-    <p:tnLst>
-      <p:par>
-        <p:cTn id="1" dur="indefinite" restart="never" nodeType="tmRoot"/>
-      </p:par>
-    </p:tnLst>
-  </p:timing>
-</p:sld>
-</file>
-
-<file path=ppt/slides/slide25.xml><?xml version="1.0" encoding="utf-8"?>
-<p:sld xmlns:a="http://schemas.openxmlformats.org/drawingml/2006/main" xmlns:r="http://schemas.openxmlformats.org/officeDocument/2006/relationships" xmlns:p="http://schemas.openxmlformats.org/presentationml/2006/main">
-  <p:cSld>
-    <p:spTree>
-      <p:nvGrpSpPr>
-        <p:cNvPr id="1" name=""/>
-        <p:cNvGrpSpPr/>
-        <p:nvPr/>
-      </p:nvGrpSpPr>
-      <p:grpSpPr>
-        <a:xfrm>
-          <a:off x="0" y="0"/>
-          <a:ext cx="0" cy="0"/>
-          <a:chOff x="0" y="0"/>
-          <a:chExt cx="0" cy="0"/>
-        </a:xfrm>
-      </p:grpSpPr>
-      <p:sp>
-        <p:nvSpPr>
-          <p:cNvPr id="2" name="Title 1"/>
-          <p:cNvSpPr>
-            <a:spLocks noGrp="1"/>
-          </p:cNvSpPr>
-          <p:nvPr>
-            <p:ph type="title"/>
-          </p:nvPr>
-        </p:nvSpPr>
-        <p:spPr/>
-        <p:txBody>
-          <a:bodyPr/>
-          <a:lstStyle/>
-          <a:p>
-            <a:r>
-              <a:rPr lang="en-US" dirty="0" smtClean="0"/>
-              <a:t>Streamline everything</a:t>
-            </a:r>
-            <a:endParaRPr lang="en-US" dirty="0"/>
-          </a:p>
-        </p:txBody>
-      </p:sp>
-      <p:sp>
-        <p:nvSpPr>
-          <p:cNvPr id="3" name="Content Placeholder 2"/>
-          <p:cNvSpPr>
-            <a:spLocks noGrp="1"/>
-          </p:cNvSpPr>
-          <p:nvPr>
-            <p:ph sz="quarter" idx="10"/>
-          </p:nvPr>
-        </p:nvSpPr>
-        <p:spPr/>
-        <p:txBody>
-          <a:bodyPr/>
-          <a:lstStyle/>
-          <a:p>
-            <a:r>
-              <a:rPr lang="en-US" dirty="0" smtClean="0"/>
-              <a:t>Right-size images</a:t>
-            </a:r>
-          </a:p>
-          <a:p>
-            <a:pPr lvl="1"/>
-            <a:r>
-              <a:rPr lang="en-US" dirty="0" smtClean="0">
-                <a:latin typeface="Consolas" panose="020B0609020204030204" pitchFamily="49" charset="0"/>
-                <a:cs typeface="Consolas" panose="020B0609020204030204" pitchFamily="49" charset="0"/>
-              </a:rPr>
-              <a:t>style="width:200px"</a:t>
-            </a:r>
-            <a:r>
-              <a:rPr lang="en-US" dirty="0" smtClean="0"/>
-              <a:t> still sends the entire picture</a:t>
-            </a:r>
-          </a:p>
-          <a:p>
-            <a:r>
-              <a:rPr lang="en-US" dirty="0" smtClean="0"/>
-              <a:t>Use bundling and minification</a:t>
-            </a:r>
-          </a:p>
-          <a:p>
-            <a:pPr lvl="1"/>
-            <a:r>
-              <a:rPr lang="en-US" dirty="0" smtClean="0"/>
-              <a:t>Bundling sends multiple files as one</a:t>
-            </a:r>
-          </a:p>
-          <a:p>
-            <a:pPr lvl="1"/>
-            <a:r>
-              <a:rPr lang="en-US" dirty="0" smtClean="0"/>
-              <a:t>Minification removes anything that makes JavaScript and CSS </a:t>
-            </a:r>
-            <a:r>
-              <a:rPr lang="en-US" dirty="0" smtClean="0"/>
-              <a:t>readable</a:t>
-            </a:r>
-          </a:p>
-          <a:p>
-            <a:r>
-              <a:rPr lang="en-US" dirty="0" smtClean="0"/>
-              <a:t>Use CDNs to improve </a:t>
-            </a:r>
-            <a:r>
-              <a:rPr lang="en-US" smtClean="0"/>
-              <a:t>cache usage</a:t>
-            </a:r>
-            <a:endParaRPr lang="en-US" dirty="0"/>
-          </a:p>
-        </p:txBody>
-      </p:sp>
-    </p:spTree>
-    <p:extLst>
-      <p:ext uri="{BB962C8B-B14F-4D97-AF65-F5344CB8AC3E}">
-        <p14:creationId xmlns:p14="http://schemas.microsoft.com/office/powerpoint/2010/main" val="633069823"/>
-      </p:ext>
-    </p:extLst>
-  </p:cSld>
-  <p:clrMapOvr>
-    <a:masterClrMapping/>
-  </p:clrMapOvr>
-  <p:timing>
-    <p:tnLst>
-      <p:par>
-        <p:cTn id="1" dur="indefinite" restart="never" nodeType="tmRoot"/>
-      </p:par>
-    </p:tnLst>
-  </p:timing>
-</p:sld>
-</file>
-
 <file path=ppt/slides/slide26.xml><?xml version="1.0" encoding="utf-8"?>
 <p:sld xmlns:a="http://schemas.openxmlformats.org/drawingml/2006/main" xmlns:r="http://schemas.openxmlformats.org/officeDocument/2006/relationships" xmlns:p="http://schemas.openxmlformats.org/presentationml/2006/main">
   <p:cSld>
@@ -10024,7 +10194,7 @@
       </p:grpSpPr>
       <p:sp>
         <p:nvSpPr>
-          <p:cNvPr id="4" name="Title 3"/>
+          <p:cNvPr id="2" name="Title 1"/>
           <p:cNvSpPr>
             <a:spLocks noGrp="1"/>
           </p:cNvSpPr>
@@ -10039,7 +10209,68 @@
           <a:p>
             <a:r>
               <a:rPr lang="en-US" dirty="0" smtClean="0"/>
-              <a:t>Bundling and minification</a:t>
+              <a:t>Limit JavaScript</a:t>
+            </a:r>
+            <a:endParaRPr lang="en-US" dirty="0"/>
+          </a:p>
+        </p:txBody>
+      </p:sp>
+      <p:sp>
+        <p:nvSpPr>
+          <p:cNvPr id="3" name="Content Placeholder 2"/>
+          <p:cNvSpPr>
+            <a:spLocks noGrp="1"/>
+          </p:cNvSpPr>
+          <p:nvPr>
+            <p:ph sz="quarter" idx="10"/>
+          </p:nvPr>
+        </p:nvSpPr>
+        <p:spPr/>
+        <p:txBody>
+          <a:bodyPr/>
+          <a:lstStyle/>
+          <a:p>
+            <a:r>
+              <a:rPr lang="en-US" dirty="0" smtClean="0"/>
+              <a:t>Mobile devices lack the processing power of their larger relatives</a:t>
+            </a:r>
+          </a:p>
+          <a:p>
+            <a:r>
+              <a:rPr lang="en-US" dirty="0" smtClean="0"/>
+              <a:t>Complex scripts bring your page to a halt</a:t>
+            </a:r>
+          </a:p>
+          <a:p>
+            <a:r>
+              <a:rPr lang="en-US" dirty="0" smtClean="0"/>
+              <a:t>Pages can refresh</a:t>
+            </a:r>
+          </a:p>
+          <a:p>
+            <a:r>
+              <a:rPr lang="en-US" dirty="0" smtClean="0"/>
+              <a:t>Consider avoiding common libraries</a:t>
+            </a:r>
+          </a:p>
+          <a:p>
+            <a:pPr lvl="1"/>
+            <a:r>
+              <a:rPr lang="en-US" dirty="0" smtClean="0"/>
+              <a:t>jQuery</a:t>
+            </a:r>
+          </a:p>
+          <a:p>
+            <a:pPr lvl="1"/>
+            <a:r>
+              <a:rPr lang="en-US" dirty="0" smtClean="0"/>
+              <a:t>Bootstrap</a:t>
+            </a:r>
+          </a:p>
+          <a:p>
+            <a:r>
+              <a:rPr lang="en-US" dirty="0" smtClean="0"/>
+              <a:t>microjs.com for sourcing helper scripts</a:t>
             </a:r>
             <a:endParaRPr lang="en-US" dirty="0"/>
           </a:p>
@@ -10048,7 +10279,7 @@
     </p:spTree>
     <p:extLst>
       <p:ext uri="{BB962C8B-B14F-4D97-AF65-F5344CB8AC3E}">
-        <p14:creationId xmlns:p14="http://schemas.microsoft.com/office/powerpoint/2010/main" val="3671033742"/>
+        <p14:creationId xmlns:p14="http://schemas.microsoft.com/office/powerpoint/2010/main" val="2001083792"/>
       </p:ext>
     </p:extLst>
   </p:cSld>
@@ -10084,7 +10315,7 @@
       </p:grpSpPr>
       <p:sp>
         <p:nvSpPr>
-          <p:cNvPr id="3" name="Title 2"/>
+          <p:cNvPr id="2" name="Title 1"/>
           <p:cNvSpPr>
             <a:spLocks noGrp="1"/>
           </p:cNvSpPr>
@@ -10099,7 +10330,7 @@
           <a:p>
             <a:r>
               <a:rPr lang="en-US" dirty="0" smtClean="0"/>
-              <a:t>Determine what's important</a:t>
+              <a:t>Depend on CSS</a:t>
             </a:r>
             <a:endParaRPr lang="en-US" dirty="0"/>
           </a:p>
@@ -10107,7 +10338,7 @@
       </p:sp>
       <p:sp>
         <p:nvSpPr>
-          <p:cNvPr id="4" name="Content Placeholder 3"/>
+          <p:cNvPr id="3" name="Content Placeholder 2"/>
           <p:cNvSpPr>
             <a:spLocks noGrp="1"/>
           </p:cNvSpPr>
@@ -10122,34 +10353,13 @@
           <a:p>
             <a:r>
               <a:rPr lang="en-US" dirty="0" smtClean="0"/>
-              <a:t>Focus on core functionality</a:t>
-            </a:r>
-          </a:p>
-          <a:p>
-            <a:pPr lvl="1"/>
-            <a:r>
-              <a:rPr lang="en-US" dirty="0" smtClean="0"/>
-              <a:t>Not everything form the desktop site needs to be available</a:t>
-            </a:r>
-          </a:p>
-          <a:p>
-            <a:r>
-              <a:rPr lang="en-US" dirty="0" smtClean="0"/>
-              <a:t>How information is surfaced on a mobile site is different</a:t>
-            </a:r>
-          </a:p>
-          <a:p>
-            <a:pPr lvl="1"/>
-            <a:r>
-              <a:rPr lang="en-US" dirty="0" smtClean="0"/>
-              <a:t>Core elements at the top</a:t>
-            </a:r>
-          </a:p>
-          <a:p>
-            <a:pPr lvl="1"/>
-            <a:r>
-              <a:rPr lang="en-US" dirty="0" smtClean="0"/>
-              <a:t>Optional information below</a:t>
+              <a:t>Media queries are your friend</a:t>
+            </a:r>
+          </a:p>
+          <a:p>
+            <a:r>
+              <a:rPr lang="en-US" dirty="0" smtClean="0"/>
+              <a:t>Target device sizes without scripts</a:t>
             </a:r>
             <a:endParaRPr lang="en-US" dirty="0"/>
           </a:p>
@@ -10158,7 +10368,7 @@
     </p:spTree>
     <p:extLst>
       <p:ext uri="{BB962C8B-B14F-4D97-AF65-F5344CB8AC3E}">
-        <p14:creationId xmlns:p14="http://schemas.microsoft.com/office/powerpoint/2010/main" val="3941399237"/>
+        <p14:creationId xmlns:p14="http://schemas.microsoft.com/office/powerpoint/2010/main" val="1544054854"/>
       </p:ext>
     </p:extLst>
   </p:cSld>
@@ -10194,648 +10404,89 @@
       </p:grpSpPr>
       <p:sp>
         <p:nvSpPr>
-          <p:cNvPr id="4" name="TextBox 3"/>
-          <p:cNvSpPr txBox="1"/>
-          <p:nvPr/>
-        </p:nvSpPr>
-        <p:spPr>
-          <a:xfrm>
-            <a:off x="4596384" y="414528"/>
-            <a:ext cx="2168992" cy="584775"/>
-          </a:xfrm>
-          <a:prstGeom prst="rect">
-            <a:avLst/>
-          </a:prstGeom>
-          <a:noFill/>
-        </p:spPr>
-        <p:txBody>
-          <a:bodyPr wrap="none" rtlCol="0">
-            <a:spAutoFit/>
-          </a:bodyPr>
+          <p:cNvPr id="2" name="Title 1"/>
+          <p:cNvSpPr>
+            <a:spLocks noGrp="1"/>
+          </p:cNvSpPr>
+          <p:nvPr>
+            <p:ph type="title"/>
+          </p:nvPr>
+        </p:nvSpPr>
+        <p:spPr/>
+        <p:txBody>
+          <a:bodyPr/>
           <a:lstStyle/>
           <a:p>
             <a:r>
-              <a:rPr lang="en-US" sz="3200" dirty="0" smtClean="0"/>
-              <a:t>Frayed Knot</a:t>
-            </a:r>
-            <a:endParaRPr lang="en-US" sz="3200" dirty="0"/>
-          </a:p>
-        </p:txBody>
-      </p:sp>
-      <p:pic>
-        <p:nvPicPr>
-          <p:cNvPr id="5" name="Picture 4"/>
-          <p:cNvPicPr>
-            <a:picLocks noChangeAspect="1"/>
-          </p:cNvPicPr>
-          <p:nvPr/>
-        </p:nvPicPr>
-        <p:blipFill>
-          <a:blip r:embed="rId2">
-            <a:extLst>
-              <a:ext uri="{28A0092B-C50C-407E-A947-70E740481C1C}">
-                <a14:useLocalDpi xmlns:a14="http://schemas.microsoft.com/office/drawing/2010/main" val="0"/>
-              </a:ext>
-            </a:extLst>
-          </a:blip>
-          <a:stretch>
-            <a:fillRect/>
-          </a:stretch>
-        </p:blipFill>
-        <p:spPr>
-          <a:xfrm>
-            <a:off x="1385931" y="1253299"/>
-            <a:ext cx="4294949" cy="1916621"/>
-          </a:xfrm>
-          <a:prstGeom prst="rect">
-            <a:avLst/>
-          </a:prstGeom>
-        </p:spPr>
-      </p:pic>
-      <p:sp>
-        <p:nvSpPr>
-          <p:cNvPr id="6" name="TextBox 5"/>
-          <p:cNvSpPr txBox="1"/>
-          <p:nvPr/>
-        </p:nvSpPr>
-        <p:spPr>
-          <a:xfrm>
-            <a:off x="6120385" y="1365504"/>
-            <a:ext cx="5193791" cy="3970318"/>
-          </a:xfrm>
-          <a:prstGeom prst="rect">
-            <a:avLst/>
-          </a:prstGeom>
-          <a:noFill/>
-        </p:spPr>
-        <p:txBody>
-          <a:bodyPr wrap="square" rtlCol="0">
-            <a:spAutoFit/>
-          </a:bodyPr>
+              <a:rPr lang="en-US" dirty="0" smtClean="0"/>
+              <a:t>Streamline everything</a:t>
+            </a:r>
+            <a:endParaRPr lang="en-US" dirty="0"/>
+          </a:p>
+        </p:txBody>
+      </p:sp>
+      <p:sp>
+        <p:nvSpPr>
+          <p:cNvPr id="3" name="Content Placeholder 2"/>
+          <p:cNvSpPr>
+            <a:spLocks noGrp="1"/>
+          </p:cNvSpPr>
+          <p:nvPr>
+            <p:ph sz="quarter" idx="10"/>
+          </p:nvPr>
+        </p:nvSpPr>
+        <p:spPr/>
+        <p:txBody>
+          <a:bodyPr/>
           <a:lstStyle/>
           <a:p>
             <a:r>
-              <a:rPr lang="en-US" b="1" dirty="0" smtClean="0"/>
-              <a:t>Shoelace Knot</a:t>
-            </a:r>
-          </a:p>
-          <a:p>
-            <a:endParaRPr lang="en-US" dirty="0"/>
-          </a:p>
-          <a:p>
-            <a:r>
-              <a:rPr lang="en-US" dirty="0"/>
-              <a:t>Lorem ipsum dolor sit </a:t>
-            </a:r>
-            <a:r>
-              <a:rPr lang="en-US" dirty="0" err="1"/>
-              <a:t>amet</a:t>
-            </a:r>
-            <a:r>
-              <a:rPr lang="en-US" dirty="0"/>
-              <a:t>, </a:t>
-            </a:r>
-            <a:r>
-              <a:rPr lang="en-US" dirty="0" err="1"/>
-              <a:t>consectetur</a:t>
-            </a:r>
-            <a:r>
-              <a:rPr lang="en-US" dirty="0"/>
-              <a:t> </a:t>
-            </a:r>
-            <a:r>
-              <a:rPr lang="en-US" dirty="0" err="1"/>
-              <a:t>adipiscing</a:t>
-            </a:r>
-            <a:r>
-              <a:rPr lang="en-US" dirty="0"/>
-              <a:t> </a:t>
-            </a:r>
-            <a:r>
-              <a:rPr lang="en-US" dirty="0" err="1"/>
-              <a:t>elit</a:t>
-            </a:r>
-            <a:r>
-              <a:rPr lang="en-US" dirty="0"/>
-              <a:t>. </a:t>
-            </a:r>
-            <a:r>
-              <a:rPr lang="en-US" dirty="0" err="1"/>
-              <a:t>Nunc</a:t>
-            </a:r>
-            <a:r>
-              <a:rPr lang="en-US" dirty="0"/>
-              <a:t> et lacus vitae </a:t>
-            </a:r>
-            <a:r>
-              <a:rPr lang="en-US" dirty="0" err="1"/>
-              <a:t>augue</a:t>
-            </a:r>
-            <a:r>
-              <a:rPr lang="en-US" dirty="0"/>
-              <a:t> </a:t>
-            </a:r>
-            <a:r>
-              <a:rPr lang="en-US" dirty="0" err="1"/>
-              <a:t>fermentum</a:t>
-            </a:r>
-            <a:r>
-              <a:rPr lang="en-US" dirty="0"/>
-              <a:t> </a:t>
-            </a:r>
-            <a:r>
-              <a:rPr lang="en-US" dirty="0" err="1"/>
-              <a:t>lobortis</a:t>
-            </a:r>
-            <a:r>
-              <a:rPr lang="en-US" dirty="0"/>
-              <a:t>. </a:t>
-            </a:r>
-            <a:r>
-              <a:rPr lang="en-US" dirty="0" err="1"/>
-              <a:t>Mauris</a:t>
-            </a:r>
-            <a:r>
-              <a:rPr lang="en-US" dirty="0"/>
-              <a:t> </a:t>
-            </a:r>
-            <a:r>
-              <a:rPr lang="en-US" dirty="0" err="1"/>
-              <a:t>congue</a:t>
-            </a:r>
-            <a:r>
-              <a:rPr lang="en-US" dirty="0"/>
-              <a:t>, </a:t>
-            </a:r>
-            <a:r>
-              <a:rPr lang="en-US" dirty="0" err="1"/>
-              <a:t>purus</a:t>
-            </a:r>
-            <a:r>
-              <a:rPr lang="en-US" dirty="0"/>
-              <a:t> ac </a:t>
-            </a:r>
-            <a:r>
-              <a:rPr lang="en-US" dirty="0" err="1"/>
-              <a:t>lobortis</a:t>
-            </a:r>
-            <a:r>
-              <a:rPr lang="en-US" dirty="0"/>
-              <a:t> </a:t>
-            </a:r>
-            <a:r>
-              <a:rPr lang="en-US" dirty="0" err="1"/>
-              <a:t>aliquet</a:t>
-            </a:r>
-            <a:r>
-              <a:rPr lang="en-US" dirty="0"/>
-              <a:t>, </a:t>
-            </a:r>
-            <a:r>
-              <a:rPr lang="en-US" dirty="0" err="1"/>
-              <a:t>eros</a:t>
-            </a:r>
-            <a:r>
-              <a:rPr lang="en-US" dirty="0"/>
-              <a:t> </a:t>
-            </a:r>
-            <a:r>
-              <a:rPr lang="en-US" dirty="0" err="1"/>
-              <a:t>elit</a:t>
-            </a:r>
-            <a:r>
-              <a:rPr lang="en-US" dirty="0"/>
-              <a:t> </a:t>
-            </a:r>
-            <a:r>
-              <a:rPr lang="en-US" dirty="0" err="1"/>
-              <a:t>imperdiet</a:t>
-            </a:r>
-            <a:r>
-              <a:rPr lang="en-US" dirty="0"/>
-              <a:t> </a:t>
-            </a:r>
-            <a:r>
-              <a:rPr lang="en-US" dirty="0" err="1"/>
-              <a:t>elit</a:t>
-            </a:r>
-            <a:r>
-              <a:rPr lang="en-US" dirty="0"/>
-              <a:t>, </a:t>
-            </a:r>
-            <a:r>
-              <a:rPr lang="en-US" dirty="0" err="1"/>
-              <a:t>nec</a:t>
-            </a:r>
-            <a:r>
-              <a:rPr lang="en-US" dirty="0"/>
-              <a:t> </a:t>
-            </a:r>
-            <a:r>
-              <a:rPr lang="en-US" dirty="0" err="1"/>
-              <a:t>egestas</a:t>
-            </a:r>
-            <a:r>
-              <a:rPr lang="en-US" dirty="0"/>
-              <a:t> </a:t>
-            </a:r>
-            <a:r>
-              <a:rPr lang="en-US" dirty="0" err="1"/>
-              <a:t>tortor</a:t>
-            </a:r>
-            <a:r>
-              <a:rPr lang="en-US" dirty="0"/>
-              <a:t> nisi non </a:t>
-            </a:r>
-            <a:r>
-              <a:rPr lang="en-US" dirty="0" err="1"/>
-              <a:t>nisl</a:t>
-            </a:r>
-            <a:r>
-              <a:rPr lang="en-US" dirty="0"/>
-              <a:t>. </a:t>
-            </a:r>
-            <a:r>
-              <a:rPr lang="en-US" dirty="0" err="1"/>
-              <a:t>Ut</a:t>
-            </a:r>
-            <a:r>
-              <a:rPr lang="en-US" dirty="0"/>
-              <a:t> </a:t>
-            </a:r>
-            <a:r>
-              <a:rPr lang="en-US" dirty="0" err="1"/>
-              <a:t>suscipit</a:t>
-            </a:r>
-            <a:r>
-              <a:rPr lang="en-US" dirty="0"/>
-              <a:t> </a:t>
-            </a:r>
-            <a:r>
-              <a:rPr lang="en-US" dirty="0" err="1"/>
-              <a:t>rutrum</a:t>
-            </a:r>
-            <a:r>
-              <a:rPr lang="en-US" dirty="0"/>
-              <a:t> mi et gravida. Nam </a:t>
-            </a:r>
-            <a:r>
-              <a:rPr lang="en-US" dirty="0" err="1"/>
-              <a:t>ullamcorper</a:t>
-            </a:r>
-            <a:r>
-              <a:rPr lang="en-US" dirty="0"/>
-              <a:t> </a:t>
-            </a:r>
-            <a:r>
-              <a:rPr lang="en-US" dirty="0" err="1"/>
-              <a:t>leo</a:t>
-            </a:r>
-            <a:r>
-              <a:rPr lang="en-US" dirty="0"/>
-              <a:t> </a:t>
-            </a:r>
-            <a:r>
-              <a:rPr lang="en-US" dirty="0" err="1"/>
-              <a:t>nisl</a:t>
-            </a:r>
-            <a:r>
-              <a:rPr lang="en-US" dirty="0"/>
-              <a:t>, non </a:t>
-            </a:r>
-            <a:r>
-              <a:rPr lang="en-US" dirty="0" err="1"/>
-              <a:t>scelerisque</a:t>
-            </a:r>
-            <a:r>
-              <a:rPr lang="en-US" dirty="0"/>
-              <a:t> libero </a:t>
-            </a:r>
-            <a:r>
-              <a:rPr lang="en-US" dirty="0" err="1"/>
-              <a:t>laoreet</a:t>
-            </a:r>
-            <a:r>
-              <a:rPr lang="en-US" dirty="0"/>
-              <a:t> a. </a:t>
-            </a:r>
-            <a:r>
-              <a:rPr lang="en-US" dirty="0" err="1"/>
-              <a:t>Suspendisse</a:t>
-            </a:r>
-            <a:r>
-              <a:rPr lang="en-US" dirty="0"/>
-              <a:t> </a:t>
-            </a:r>
-            <a:r>
-              <a:rPr lang="en-US" dirty="0" err="1"/>
-              <a:t>sed</a:t>
-            </a:r>
-            <a:r>
-              <a:rPr lang="en-US" dirty="0"/>
-              <a:t> </a:t>
-            </a:r>
-            <a:r>
-              <a:rPr lang="en-US" dirty="0" err="1"/>
-              <a:t>tellus</a:t>
-            </a:r>
-            <a:r>
-              <a:rPr lang="en-US" dirty="0"/>
-              <a:t> </a:t>
-            </a:r>
-            <a:r>
-              <a:rPr lang="en-US" dirty="0" err="1"/>
-              <a:t>tortor</a:t>
-            </a:r>
-            <a:r>
-              <a:rPr lang="en-US" dirty="0"/>
-              <a:t>. </a:t>
-            </a:r>
-            <a:r>
-              <a:rPr lang="en-US" dirty="0" err="1"/>
-              <a:t>Praesent</a:t>
-            </a:r>
-            <a:r>
-              <a:rPr lang="en-US" dirty="0"/>
-              <a:t> </a:t>
-            </a:r>
-            <a:r>
-              <a:rPr lang="en-US" dirty="0" err="1"/>
-              <a:t>eu</a:t>
-            </a:r>
-            <a:r>
-              <a:rPr lang="en-US" dirty="0"/>
-              <a:t> </a:t>
-            </a:r>
-            <a:r>
-              <a:rPr lang="en-US" dirty="0" err="1"/>
-              <a:t>tristique</a:t>
-            </a:r>
-            <a:r>
-              <a:rPr lang="en-US" dirty="0"/>
-              <a:t> diam. </a:t>
-            </a:r>
-            <a:r>
-              <a:rPr lang="en-US" dirty="0" err="1"/>
-              <a:t>Cras</a:t>
-            </a:r>
-            <a:r>
-              <a:rPr lang="en-US" dirty="0"/>
-              <a:t> </a:t>
-            </a:r>
-            <a:r>
-              <a:rPr lang="en-US" dirty="0" err="1"/>
-              <a:t>pretium</a:t>
-            </a:r>
-            <a:r>
-              <a:rPr lang="en-US" dirty="0"/>
-              <a:t>, </a:t>
-            </a:r>
-            <a:r>
-              <a:rPr lang="en-US" dirty="0" err="1"/>
-              <a:t>massa</a:t>
-            </a:r>
-            <a:r>
-              <a:rPr lang="en-US" dirty="0"/>
-              <a:t> sit </a:t>
-            </a:r>
-            <a:r>
-              <a:rPr lang="en-US" dirty="0" err="1"/>
-              <a:t>amet</a:t>
-            </a:r>
-            <a:r>
-              <a:rPr lang="en-US" dirty="0"/>
-              <a:t> </a:t>
-            </a:r>
-            <a:r>
-              <a:rPr lang="en-US" dirty="0" err="1"/>
-              <a:t>lacinia</a:t>
-            </a:r>
-            <a:r>
-              <a:rPr lang="en-US" dirty="0"/>
-              <a:t> </a:t>
-            </a:r>
-            <a:r>
-              <a:rPr lang="en-US" dirty="0" err="1"/>
-              <a:t>pulvinar</a:t>
-            </a:r>
-            <a:r>
-              <a:rPr lang="en-US" dirty="0"/>
-              <a:t>, magna </a:t>
-            </a:r>
-            <a:r>
-              <a:rPr lang="en-US" dirty="0" err="1"/>
-              <a:t>tortor</a:t>
-            </a:r>
-            <a:r>
-              <a:rPr lang="en-US" dirty="0"/>
-              <a:t> </a:t>
-            </a:r>
-            <a:r>
-              <a:rPr lang="en-US" dirty="0" err="1"/>
-              <a:t>rhoncus</a:t>
-            </a:r>
-            <a:r>
-              <a:rPr lang="en-US" dirty="0"/>
-              <a:t> </a:t>
-            </a:r>
-            <a:r>
-              <a:rPr lang="en-US" dirty="0" err="1"/>
-              <a:t>nisl</a:t>
-            </a:r>
-            <a:r>
-              <a:rPr lang="en-US" dirty="0"/>
-              <a:t>, a </a:t>
-            </a:r>
-            <a:r>
-              <a:rPr lang="en-US" dirty="0" err="1"/>
-              <a:t>aliquet</a:t>
-            </a:r>
-            <a:r>
-              <a:rPr lang="en-US" dirty="0"/>
-              <a:t> ante </a:t>
-            </a:r>
-            <a:r>
-              <a:rPr lang="en-US" dirty="0" err="1"/>
-              <a:t>elit</a:t>
-            </a:r>
-            <a:r>
-              <a:rPr lang="en-US" dirty="0"/>
-              <a:t> </a:t>
-            </a:r>
-            <a:r>
-              <a:rPr lang="en-US" dirty="0" err="1"/>
-              <a:t>nec</a:t>
-            </a:r>
-            <a:r>
-              <a:rPr lang="en-US" dirty="0"/>
-              <a:t> libero. </a:t>
-            </a:r>
-            <a:r>
-              <a:rPr lang="en-US" dirty="0" err="1"/>
-              <a:t>Aliquam</a:t>
-            </a:r>
-            <a:r>
-              <a:rPr lang="en-US" dirty="0"/>
-              <a:t> id </a:t>
-            </a:r>
-            <a:r>
-              <a:rPr lang="en-US" dirty="0" err="1"/>
-              <a:t>neque</a:t>
-            </a:r>
-            <a:r>
-              <a:rPr lang="en-US" dirty="0"/>
-              <a:t> gravida </a:t>
-            </a:r>
-            <a:r>
-              <a:rPr lang="en-US" dirty="0" err="1"/>
-              <a:t>purus</a:t>
-            </a:r>
-            <a:r>
-              <a:rPr lang="en-US" dirty="0"/>
-              <a:t> </a:t>
-            </a:r>
-            <a:r>
-              <a:rPr lang="en-US" dirty="0" err="1"/>
-              <a:t>sollicitudin</a:t>
-            </a:r>
-            <a:r>
-              <a:rPr lang="en-US" dirty="0"/>
-              <a:t> </a:t>
-            </a:r>
-            <a:r>
-              <a:rPr lang="en-US" dirty="0" err="1"/>
-              <a:t>facilisis</a:t>
-            </a:r>
-            <a:r>
-              <a:rPr lang="en-US" dirty="0"/>
-              <a:t> a id magna. Class </a:t>
-            </a:r>
-            <a:r>
-              <a:rPr lang="en-US" dirty="0" err="1"/>
-              <a:t>aptent</a:t>
-            </a:r>
-            <a:r>
-              <a:rPr lang="en-US" dirty="0"/>
-              <a:t> </a:t>
-            </a:r>
-            <a:r>
-              <a:rPr lang="en-US" dirty="0" err="1"/>
-              <a:t>taciti</a:t>
-            </a:r>
-            <a:r>
-              <a:rPr lang="en-US" dirty="0"/>
-              <a:t> </a:t>
-            </a:r>
-            <a:r>
-              <a:rPr lang="en-US" dirty="0" err="1"/>
-              <a:t>sociosqu</a:t>
-            </a:r>
-            <a:r>
-              <a:rPr lang="en-US" dirty="0"/>
-              <a:t> ad </a:t>
-            </a:r>
-            <a:r>
-              <a:rPr lang="en-US" dirty="0" err="1"/>
-              <a:t>litora</a:t>
-            </a:r>
-            <a:r>
-              <a:rPr lang="en-US" dirty="0"/>
-              <a:t> </a:t>
-            </a:r>
-            <a:r>
-              <a:rPr lang="en-US" dirty="0" err="1"/>
-              <a:t>torquent</a:t>
-            </a:r>
-            <a:r>
-              <a:rPr lang="en-US" dirty="0"/>
-              <a:t> per </a:t>
-            </a:r>
-            <a:r>
-              <a:rPr lang="en-US" dirty="0" err="1"/>
-              <a:t>conubia</a:t>
-            </a:r>
-            <a:r>
-              <a:rPr lang="en-US" dirty="0"/>
-              <a:t> nostra, per </a:t>
-            </a:r>
-            <a:r>
-              <a:rPr lang="en-US" dirty="0" err="1"/>
-              <a:t>inceptos</a:t>
-            </a:r>
-            <a:r>
-              <a:rPr lang="en-US" dirty="0"/>
-              <a:t> </a:t>
-            </a:r>
-            <a:r>
-              <a:rPr lang="en-US" dirty="0" err="1"/>
-              <a:t>himenaeos</a:t>
-            </a:r>
-            <a:r>
-              <a:rPr lang="en-US" dirty="0"/>
-              <a:t>. </a:t>
-            </a:r>
-          </a:p>
-        </p:txBody>
-      </p:sp>
-      <p:sp>
-        <p:nvSpPr>
-          <p:cNvPr id="8" name="TextBox 7"/>
-          <p:cNvSpPr txBox="1"/>
-          <p:nvPr/>
-        </p:nvSpPr>
-        <p:spPr>
-          <a:xfrm>
-            <a:off x="1385931" y="3755136"/>
-            <a:ext cx="2640018" cy="1477328"/>
-          </a:xfrm>
-          <a:prstGeom prst="rect">
-            <a:avLst/>
-          </a:prstGeom>
-          <a:noFill/>
-        </p:spPr>
-        <p:txBody>
-          <a:bodyPr wrap="none" rtlCol="0">
-            <a:spAutoFit/>
-          </a:bodyPr>
-          <a:lstStyle/>
-          <a:p>
-            <a:r>
-              <a:rPr lang="en-US" b="1" dirty="0" smtClean="0"/>
-              <a:t>Instructions</a:t>
-            </a:r>
-          </a:p>
-          <a:p>
-            <a:endParaRPr lang="en-US" dirty="0" smtClean="0"/>
-          </a:p>
-          <a:p>
-            <a:pPr marL="342900" indent="-342900">
-              <a:buFont typeface="+mj-lt"/>
-              <a:buAutoNum type="arabicPeriod"/>
-            </a:pPr>
-            <a:r>
-              <a:rPr lang="en-US" dirty="0" smtClean="0"/>
-              <a:t>Form loop at each end</a:t>
-            </a:r>
-          </a:p>
-          <a:p>
-            <a:pPr marL="342900" indent="-342900">
-              <a:buFont typeface="+mj-lt"/>
-              <a:buAutoNum type="arabicPeriod"/>
-            </a:pPr>
-            <a:r>
-              <a:rPr lang="en-US" dirty="0" smtClean="0"/>
-              <a:t>Join two loops</a:t>
-            </a:r>
-          </a:p>
-          <a:p>
-            <a:pPr marL="342900" indent="-342900">
-              <a:buFont typeface="+mj-lt"/>
-              <a:buAutoNum type="arabicPeriod"/>
-            </a:pPr>
-            <a:r>
-              <a:rPr lang="en-US" dirty="0" smtClean="0"/>
-              <a:t>Pull tight</a:t>
+              <a:rPr lang="en-US" dirty="0" smtClean="0"/>
+              <a:t>Right-size images</a:t>
+            </a:r>
+          </a:p>
+          <a:p>
+            <a:pPr lvl="1"/>
+            <a:r>
+              <a:rPr lang="en-US" dirty="0" smtClean="0">
+                <a:latin typeface="Consolas" panose="020B0609020204030204" pitchFamily="49" charset="0"/>
+                <a:cs typeface="Consolas" panose="020B0609020204030204" pitchFamily="49" charset="0"/>
+              </a:rPr>
+              <a:t>style="width:200px"</a:t>
+            </a:r>
+            <a:r>
+              <a:rPr lang="en-US" dirty="0" smtClean="0"/>
+              <a:t> still sends the entire picture</a:t>
+            </a:r>
+          </a:p>
+          <a:p>
+            <a:r>
+              <a:rPr lang="en-US" dirty="0" smtClean="0"/>
+              <a:t>Use bundling and minification</a:t>
+            </a:r>
+          </a:p>
+          <a:p>
+            <a:pPr lvl="1"/>
+            <a:r>
+              <a:rPr lang="en-US" dirty="0" smtClean="0"/>
+              <a:t>Bundling sends multiple files as one</a:t>
+            </a:r>
+          </a:p>
+          <a:p>
+            <a:pPr lvl="1"/>
+            <a:r>
+              <a:rPr lang="en-US" dirty="0" smtClean="0"/>
+              <a:t>Minification removes anything that makes JavaScript and CSS readable</a:t>
+            </a:r>
+          </a:p>
+          <a:p>
+            <a:r>
+              <a:rPr lang="en-US" dirty="0" smtClean="0"/>
+              <a:t>Use CDNs to improve </a:t>
+            </a:r>
+            <a:r>
+              <a:rPr lang="en-US" smtClean="0"/>
+              <a:t>cache usage</a:t>
             </a:r>
             <a:endParaRPr lang="en-US" dirty="0"/>
           </a:p>
@@ -10844,7 +10495,7 @@
     </p:spTree>
     <p:extLst>
       <p:ext uri="{BB962C8B-B14F-4D97-AF65-F5344CB8AC3E}">
-        <p14:creationId xmlns:p14="http://schemas.microsoft.com/office/powerpoint/2010/main" val="3125024547"/>
+        <p14:creationId xmlns:p14="http://schemas.microsoft.com/office/powerpoint/2010/main" val="633069823"/>
       </p:ext>
     </p:extLst>
   </p:cSld>
@@ -10880,686 +10531,31 @@
       </p:grpSpPr>
       <p:sp>
         <p:nvSpPr>
-          <p:cNvPr id="4" name="TextBox 3"/>
-          <p:cNvSpPr txBox="1"/>
-          <p:nvPr/>
-        </p:nvSpPr>
-        <p:spPr>
-          <a:xfrm>
-            <a:off x="4596384" y="414528"/>
-            <a:ext cx="2168992" cy="584775"/>
-          </a:xfrm>
-          <a:prstGeom prst="rect">
-            <a:avLst/>
-          </a:prstGeom>
-          <a:noFill/>
-        </p:spPr>
-        <p:txBody>
-          <a:bodyPr wrap="none" rtlCol="0">
-            <a:spAutoFit/>
-          </a:bodyPr>
+          <p:cNvPr id="4" name="Title 3"/>
+          <p:cNvSpPr>
+            <a:spLocks noGrp="1"/>
+          </p:cNvSpPr>
+          <p:nvPr>
+            <p:ph type="title"/>
+          </p:nvPr>
+        </p:nvSpPr>
+        <p:spPr/>
+        <p:txBody>
+          <a:bodyPr/>
           <a:lstStyle/>
           <a:p>
             <a:r>
-              <a:rPr lang="en-US" sz="3200" dirty="0" smtClean="0"/>
-              <a:t>Frayed Knot</a:t>
-            </a:r>
-            <a:endParaRPr lang="en-US" sz="3200" dirty="0"/>
-          </a:p>
-        </p:txBody>
-      </p:sp>
-      <p:pic>
-        <p:nvPicPr>
-          <p:cNvPr id="5" name="Picture 4"/>
-          <p:cNvPicPr>
-            <a:picLocks noChangeAspect="1"/>
-          </p:cNvPicPr>
-          <p:nvPr/>
-        </p:nvPicPr>
-        <p:blipFill>
-          <a:blip r:embed="rId2">
-            <a:extLst>
-              <a:ext uri="{28A0092B-C50C-407E-A947-70E740481C1C}">
-                <a14:useLocalDpi xmlns:a14="http://schemas.microsoft.com/office/drawing/2010/main" val="0"/>
-              </a:ext>
-            </a:extLst>
-          </a:blip>
-          <a:stretch>
-            <a:fillRect/>
-          </a:stretch>
-        </p:blipFill>
-        <p:spPr>
-          <a:xfrm>
-            <a:off x="3641451" y="1650568"/>
-            <a:ext cx="4294949" cy="1916621"/>
-          </a:xfrm>
-          <a:prstGeom prst="rect">
-            <a:avLst/>
-          </a:prstGeom>
-        </p:spPr>
-      </p:pic>
-      <p:sp>
-        <p:nvSpPr>
-          <p:cNvPr id="6" name="TextBox 5"/>
-          <p:cNvSpPr txBox="1"/>
-          <p:nvPr/>
-        </p:nvSpPr>
-        <p:spPr>
-          <a:xfrm>
-            <a:off x="3755137" y="5035296"/>
-            <a:ext cx="4535423" cy="3970318"/>
-          </a:xfrm>
-          <a:prstGeom prst="rect">
-            <a:avLst/>
-          </a:prstGeom>
-          <a:noFill/>
-        </p:spPr>
-        <p:txBody>
-          <a:bodyPr wrap="square" rtlCol="0">
-            <a:spAutoFit/>
-          </a:bodyPr>
-          <a:lstStyle/>
-          <a:p>
-            <a:r>
-              <a:rPr lang="en-US" dirty="0" smtClean="0"/>
-              <a:t>Lorem </a:t>
-            </a:r>
-            <a:r>
-              <a:rPr lang="en-US" dirty="0"/>
-              <a:t>ipsum dolor sit </a:t>
-            </a:r>
-            <a:r>
-              <a:rPr lang="en-US" dirty="0" err="1"/>
-              <a:t>amet</a:t>
-            </a:r>
-            <a:r>
-              <a:rPr lang="en-US" dirty="0"/>
-              <a:t>, </a:t>
-            </a:r>
-            <a:r>
-              <a:rPr lang="en-US" dirty="0" err="1"/>
-              <a:t>consectetur</a:t>
-            </a:r>
-            <a:r>
-              <a:rPr lang="en-US" dirty="0"/>
-              <a:t> </a:t>
-            </a:r>
-            <a:r>
-              <a:rPr lang="en-US" dirty="0" err="1"/>
-              <a:t>adipiscing</a:t>
-            </a:r>
-            <a:r>
-              <a:rPr lang="en-US" dirty="0"/>
-              <a:t> </a:t>
-            </a:r>
-            <a:r>
-              <a:rPr lang="en-US" dirty="0" err="1"/>
-              <a:t>elit</a:t>
-            </a:r>
-            <a:r>
-              <a:rPr lang="en-US" dirty="0"/>
-              <a:t>. </a:t>
-            </a:r>
-            <a:r>
-              <a:rPr lang="en-US" dirty="0" err="1"/>
-              <a:t>Nunc</a:t>
-            </a:r>
-            <a:r>
-              <a:rPr lang="en-US" dirty="0"/>
-              <a:t> et lacus vitae </a:t>
-            </a:r>
-            <a:r>
-              <a:rPr lang="en-US" dirty="0" err="1"/>
-              <a:t>augue</a:t>
-            </a:r>
-            <a:r>
-              <a:rPr lang="en-US" dirty="0"/>
-              <a:t> </a:t>
-            </a:r>
-            <a:r>
-              <a:rPr lang="en-US" dirty="0" err="1"/>
-              <a:t>fermentum</a:t>
-            </a:r>
-            <a:r>
-              <a:rPr lang="en-US" dirty="0"/>
-              <a:t> </a:t>
-            </a:r>
-            <a:r>
-              <a:rPr lang="en-US" dirty="0" err="1"/>
-              <a:t>lobortis</a:t>
-            </a:r>
-            <a:r>
-              <a:rPr lang="en-US" dirty="0"/>
-              <a:t>. </a:t>
-            </a:r>
-            <a:r>
-              <a:rPr lang="en-US" dirty="0" err="1"/>
-              <a:t>Mauris</a:t>
-            </a:r>
-            <a:r>
-              <a:rPr lang="en-US" dirty="0"/>
-              <a:t> </a:t>
-            </a:r>
-            <a:r>
-              <a:rPr lang="en-US" dirty="0" err="1"/>
-              <a:t>congue</a:t>
-            </a:r>
-            <a:r>
-              <a:rPr lang="en-US" dirty="0"/>
-              <a:t>, </a:t>
-            </a:r>
-            <a:r>
-              <a:rPr lang="en-US" dirty="0" err="1"/>
-              <a:t>purus</a:t>
-            </a:r>
-            <a:r>
-              <a:rPr lang="en-US" dirty="0"/>
-              <a:t> ac </a:t>
-            </a:r>
-            <a:r>
-              <a:rPr lang="en-US" dirty="0" err="1"/>
-              <a:t>lobortis</a:t>
-            </a:r>
-            <a:r>
-              <a:rPr lang="en-US" dirty="0"/>
-              <a:t> </a:t>
-            </a:r>
-            <a:r>
-              <a:rPr lang="en-US" dirty="0" err="1"/>
-              <a:t>aliquet</a:t>
-            </a:r>
-            <a:r>
-              <a:rPr lang="en-US" dirty="0"/>
-              <a:t>, </a:t>
-            </a:r>
-            <a:r>
-              <a:rPr lang="en-US" dirty="0" err="1"/>
-              <a:t>eros</a:t>
-            </a:r>
-            <a:r>
-              <a:rPr lang="en-US" dirty="0"/>
-              <a:t> </a:t>
-            </a:r>
-            <a:r>
-              <a:rPr lang="en-US" dirty="0" err="1"/>
-              <a:t>elit</a:t>
-            </a:r>
-            <a:r>
-              <a:rPr lang="en-US" dirty="0"/>
-              <a:t> </a:t>
-            </a:r>
-            <a:r>
-              <a:rPr lang="en-US" dirty="0" err="1"/>
-              <a:t>imperdiet</a:t>
-            </a:r>
-            <a:r>
-              <a:rPr lang="en-US" dirty="0"/>
-              <a:t> </a:t>
-            </a:r>
-            <a:r>
-              <a:rPr lang="en-US" dirty="0" err="1"/>
-              <a:t>elit</a:t>
-            </a:r>
-            <a:r>
-              <a:rPr lang="en-US" dirty="0"/>
-              <a:t>, </a:t>
-            </a:r>
-            <a:r>
-              <a:rPr lang="en-US" dirty="0" err="1"/>
-              <a:t>nec</a:t>
-            </a:r>
-            <a:r>
-              <a:rPr lang="en-US" dirty="0"/>
-              <a:t> </a:t>
-            </a:r>
-            <a:r>
-              <a:rPr lang="en-US" dirty="0" err="1"/>
-              <a:t>egestas</a:t>
-            </a:r>
-            <a:r>
-              <a:rPr lang="en-US" dirty="0"/>
-              <a:t> </a:t>
-            </a:r>
-            <a:r>
-              <a:rPr lang="en-US" dirty="0" err="1"/>
-              <a:t>tortor</a:t>
-            </a:r>
-            <a:r>
-              <a:rPr lang="en-US" dirty="0"/>
-              <a:t> nisi non </a:t>
-            </a:r>
-            <a:r>
-              <a:rPr lang="en-US" dirty="0" err="1"/>
-              <a:t>nisl</a:t>
-            </a:r>
-            <a:r>
-              <a:rPr lang="en-US" dirty="0"/>
-              <a:t>. </a:t>
-            </a:r>
-            <a:r>
-              <a:rPr lang="en-US" dirty="0" err="1"/>
-              <a:t>Ut</a:t>
-            </a:r>
-            <a:r>
-              <a:rPr lang="en-US" dirty="0"/>
-              <a:t> </a:t>
-            </a:r>
-            <a:r>
-              <a:rPr lang="en-US" dirty="0" err="1"/>
-              <a:t>suscipit</a:t>
-            </a:r>
-            <a:r>
-              <a:rPr lang="en-US" dirty="0"/>
-              <a:t> </a:t>
-            </a:r>
-            <a:r>
-              <a:rPr lang="en-US" dirty="0" err="1"/>
-              <a:t>rutrum</a:t>
-            </a:r>
-            <a:r>
-              <a:rPr lang="en-US" dirty="0"/>
-              <a:t> mi et gravida. Nam </a:t>
-            </a:r>
-            <a:r>
-              <a:rPr lang="en-US" dirty="0" err="1"/>
-              <a:t>ullamcorper</a:t>
-            </a:r>
-            <a:r>
-              <a:rPr lang="en-US" dirty="0"/>
-              <a:t> </a:t>
-            </a:r>
-            <a:r>
-              <a:rPr lang="en-US" dirty="0" err="1"/>
-              <a:t>leo</a:t>
-            </a:r>
-            <a:r>
-              <a:rPr lang="en-US" dirty="0"/>
-              <a:t> </a:t>
-            </a:r>
-            <a:r>
-              <a:rPr lang="en-US" dirty="0" err="1"/>
-              <a:t>nisl</a:t>
-            </a:r>
-            <a:r>
-              <a:rPr lang="en-US" dirty="0"/>
-              <a:t>, non </a:t>
-            </a:r>
-            <a:r>
-              <a:rPr lang="en-US" dirty="0" err="1"/>
-              <a:t>scelerisque</a:t>
-            </a:r>
-            <a:r>
-              <a:rPr lang="en-US" dirty="0"/>
-              <a:t> libero </a:t>
-            </a:r>
-            <a:r>
-              <a:rPr lang="en-US" dirty="0" err="1"/>
-              <a:t>laoreet</a:t>
-            </a:r>
-            <a:r>
-              <a:rPr lang="en-US" dirty="0"/>
-              <a:t> a. </a:t>
-            </a:r>
-            <a:r>
-              <a:rPr lang="en-US" dirty="0" err="1"/>
-              <a:t>Suspendisse</a:t>
-            </a:r>
-            <a:r>
-              <a:rPr lang="en-US" dirty="0"/>
-              <a:t> </a:t>
-            </a:r>
-            <a:r>
-              <a:rPr lang="en-US" dirty="0" err="1"/>
-              <a:t>sed</a:t>
-            </a:r>
-            <a:r>
-              <a:rPr lang="en-US" dirty="0"/>
-              <a:t> </a:t>
-            </a:r>
-            <a:r>
-              <a:rPr lang="en-US" dirty="0" err="1"/>
-              <a:t>tellus</a:t>
-            </a:r>
-            <a:r>
-              <a:rPr lang="en-US" dirty="0"/>
-              <a:t> </a:t>
-            </a:r>
-            <a:r>
-              <a:rPr lang="en-US" dirty="0" err="1"/>
-              <a:t>tortor</a:t>
-            </a:r>
-            <a:r>
-              <a:rPr lang="en-US" dirty="0"/>
-              <a:t>. </a:t>
-            </a:r>
-            <a:r>
-              <a:rPr lang="en-US" dirty="0" err="1"/>
-              <a:t>Praesent</a:t>
-            </a:r>
-            <a:r>
-              <a:rPr lang="en-US" dirty="0"/>
-              <a:t> </a:t>
-            </a:r>
-            <a:r>
-              <a:rPr lang="en-US" dirty="0" err="1"/>
-              <a:t>eu</a:t>
-            </a:r>
-            <a:r>
-              <a:rPr lang="en-US" dirty="0"/>
-              <a:t> </a:t>
-            </a:r>
-            <a:r>
-              <a:rPr lang="en-US" dirty="0" err="1"/>
-              <a:t>tristique</a:t>
-            </a:r>
-            <a:r>
-              <a:rPr lang="en-US" dirty="0"/>
-              <a:t> diam. </a:t>
-            </a:r>
-            <a:r>
-              <a:rPr lang="en-US" dirty="0" err="1"/>
-              <a:t>Cras</a:t>
-            </a:r>
-            <a:r>
-              <a:rPr lang="en-US" dirty="0"/>
-              <a:t> </a:t>
-            </a:r>
-            <a:r>
-              <a:rPr lang="en-US" dirty="0" err="1"/>
-              <a:t>pretium</a:t>
-            </a:r>
-            <a:r>
-              <a:rPr lang="en-US" dirty="0"/>
-              <a:t>, </a:t>
-            </a:r>
-            <a:r>
-              <a:rPr lang="en-US" dirty="0" err="1"/>
-              <a:t>massa</a:t>
-            </a:r>
-            <a:r>
-              <a:rPr lang="en-US" dirty="0"/>
-              <a:t> sit </a:t>
-            </a:r>
-            <a:r>
-              <a:rPr lang="en-US" dirty="0" err="1"/>
-              <a:t>amet</a:t>
-            </a:r>
-            <a:r>
-              <a:rPr lang="en-US" dirty="0"/>
-              <a:t> </a:t>
-            </a:r>
-            <a:r>
-              <a:rPr lang="en-US" dirty="0" err="1"/>
-              <a:t>lacinia</a:t>
-            </a:r>
-            <a:r>
-              <a:rPr lang="en-US" dirty="0"/>
-              <a:t> </a:t>
-            </a:r>
-            <a:r>
-              <a:rPr lang="en-US" dirty="0" err="1"/>
-              <a:t>pulvinar</a:t>
-            </a:r>
-            <a:r>
-              <a:rPr lang="en-US" dirty="0"/>
-              <a:t>, magna </a:t>
-            </a:r>
-            <a:r>
-              <a:rPr lang="en-US" dirty="0" err="1"/>
-              <a:t>tortor</a:t>
-            </a:r>
-            <a:r>
-              <a:rPr lang="en-US" dirty="0"/>
-              <a:t> </a:t>
-            </a:r>
-            <a:r>
-              <a:rPr lang="en-US" dirty="0" err="1"/>
-              <a:t>rhoncus</a:t>
-            </a:r>
-            <a:r>
-              <a:rPr lang="en-US" dirty="0"/>
-              <a:t> </a:t>
-            </a:r>
-            <a:r>
-              <a:rPr lang="en-US" dirty="0" err="1"/>
-              <a:t>nisl</a:t>
-            </a:r>
-            <a:r>
-              <a:rPr lang="en-US" dirty="0"/>
-              <a:t>, a </a:t>
-            </a:r>
-            <a:r>
-              <a:rPr lang="en-US" dirty="0" err="1"/>
-              <a:t>aliquet</a:t>
-            </a:r>
-            <a:r>
-              <a:rPr lang="en-US" dirty="0"/>
-              <a:t> ante </a:t>
-            </a:r>
-            <a:r>
-              <a:rPr lang="en-US" dirty="0" err="1"/>
-              <a:t>elit</a:t>
-            </a:r>
-            <a:r>
-              <a:rPr lang="en-US" dirty="0"/>
-              <a:t> </a:t>
-            </a:r>
-            <a:r>
-              <a:rPr lang="en-US" dirty="0" err="1"/>
-              <a:t>nec</a:t>
-            </a:r>
-            <a:r>
-              <a:rPr lang="en-US" dirty="0"/>
-              <a:t> libero. </a:t>
-            </a:r>
-            <a:r>
-              <a:rPr lang="en-US" dirty="0" err="1"/>
-              <a:t>Aliquam</a:t>
-            </a:r>
-            <a:r>
-              <a:rPr lang="en-US" dirty="0"/>
-              <a:t> id </a:t>
-            </a:r>
-            <a:r>
-              <a:rPr lang="en-US" dirty="0" err="1"/>
-              <a:t>neque</a:t>
-            </a:r>
-            <a:r>
-              <a:rPr lang="en-US" dirty="0"/>
-              <a:t> gravida </a:t>
-            </a:r>
-            <a:r>
-              <a:rPr lang="en-US" dirty="0" err="1"/>
-              <a:t>purus</a:t>
-            </a:r>
-            <a:r>
-              <a:rPr lang="en-US" dirty="0"/>
-              <a:t> </a:t>
-            </a:r>
-            <a:r>
-              <a:rPr lang="en-US" dirty="0" err="1"/>
-              <a:t>sollicitudin</a:t>
-            </a:r>
-            <a:r>
-              <a:rPr lang="en-US" dirty="0"/>
-              <a:t> </a:t>
-            </a:r>
-            <a:r>
-              <a:rPr lang="en-US" dirty="0" err="1"/>
-              <a:t>facilisis</a:t>
-            </a:r>
-            <a:r>
-              <a:rPr lang="en-US" dirty="0"/>
-              <a:t> a id magna. Class </a:t>
-            </a:r>
-            <a:r>
-              <a:rPr lang="en-US" dirty="0" err="1"/>
-              <a:t>aptent</a:t>
-            </a:r>
-            <a:r>
-              <a:rPr lang="en-US" dirty="0"/>
-              <a:t> </a:t>
-            </a:r>
-            <a:r>
-              <a:rPr lang="en-US" dirty="0" err="1"/>
-              <a:t>taciti</a:t>
-            </a:r>
-            <a:r>
-              <a:rPr lang="en-US" dirty="0"/>
-              <a:t> </a:t>
-            </a:r>
-            <a:r>
-              <a:rPr lang="en-US" dirty="0" err="1"/>
-              <a:t>sociosqu</a:t>
-            </a:r>
-            <a:r>
-              <a:rPr lang="en-US" dirty="0"/>
-              <a:t> ad </a:t>
-            </a:r>
-            <a:r>
-              <a:rPr lang="en-US" dirty="0" err="1"/>
-              <a:t>litora</a:t>
-            </a:r>
-            <a:r>
-              <a:rPr lang="en-US" dirty="0"/>
-              <a:t> </a:t>
-            </a:r>
-            <a:r>
-              <a:rPr lang="en-US" dirty="0" err="1"/>
-              <a:t>torquent</a:t>
-            </a:r>
-            <a:r>
-              <a:rPr lang="en-US" dirty="0"/>
-              <a:t> per </a:t>
-            </a:r>
-            <a:r>
-              <a:rPr lang="en-US" dirty="0" err="1"/>
-              <a:t>conubia</a:t>
-            </a:r>
-            <a:r>
-              <a:rPr lang="en-US" dirty="0"/>
-              <a:t> nostra, per </a:t>
-            </a:r>
-            <a:r>
-              <a:rPr lang="en-US" dirty="0" err="1"/>
-              <a:t>inceptos</a:t>
-            </a:r>
-            <a:r>
-              <a:rPr lang="en-US" dirty="0"/>
-              <a:t> </a:t>
-            </a:r>
-            <a:r>
-              <a:rPr lang="en-US" dirty="0" err="1"/>
-              <a:t>himenaeos</a:t>
-            </a:r>
-            <a:r>
-              <a:rPr lang="en-US" dirty="0"/>
-              <a:t>. </a:t>
-            </a:r>
-          </a:p>
-        </p:txBody>
-      </p:sp>
-      <p:sp>
-        <p:nvSpPr>
-          <p:cNvPr id="8" name="TextBox 7"/>
-          <p:cNvSpPr txBox="1"/>
-          <p:nvPr/>
-        </p:nvSpPr>
-        <p:spPr>
-          <a:xfrm>
-            <a:off x="3755137" y="3562579"/>
-            <a:ext cx="2640018" cy="1477328"/>
-          </a:xfrm>
-          <a:prstGeom prst="rect">
-            <a:avLst/>
-          </a:prstGeom>
-          <a:noFill/>
-        </p:spPr>
-        <p:txBody>
-          <a:bodyPr wrap="none" rtlCol="0">
-            <a:spAutoFit/>
-          </a:bodyPr>
-          <a:lstStyle/>
-          <a:p>
-            <a:r>
-              <a:rPr lang="en-US" b="1" dirty="0" smtClean="0"/>
-              <a:t>Instructions</a:t>
-            </a:r>
-          </a:p>
-          <a:p>
-            <a:endParaRPr lang="en-US" dirty="0" smtClean="0"/>
-          </a:p>
-          <a:p>
-            <a:pPr marL="342900" indent="-342900">
-              <a:buFont typeface="+mj-lt"/>
-              <a:buAutoNum type="arabicPeriod"/>
-            </a:pPr>
-            <a:r>
-              <a:rPr lang="en-US" dirty="0" smtClean="0"/>
-              <a:t>Form loop at each end</a:t>
-            </a:r>
-          </a:p>
-          <a:p>
-            <a:pPr marL="342900" indent="-342900">
-              <a:buFont typeface="+mj-lt"/>
-              <a:buAutoNum type="arabicPeriod"/>
-            </a:pPr>
-            <a:r>
-              <a:rPr lang="en-US" dirty="0" smtClean="0"/>
-              <a:t>Join two loops</a:t>
-            </a:r>
-          </a:p>
-          <a:p>
-            <a:pPr marL="342900" indent="-342900">
-              <a:buFont typeface="+mj-lt"/>
-              <a:buAutoNum type="arabicPeriod"/>
-            </a:pPr>
-            <a:r>
-              <a:rPr lang="en-US" dirty="0" smtClean="0"/>
-              <a:t>Pull tight</a:t>
+              <a:rPr lang="en-US" dirty="0" smtClean="0"/>
+              <a:t>Bundling and minification</a:t>
             </a:r>
             <a:endParaRPr lang="en-US" dirty="0"/>
-          </a:p>
-        </p:txBody>
-      </p:sp>
-      <p:sp>
-        <p:nvSpPr>
-          <p:cNvPr id="2" name="TextBox 1"/>
-          <p:cNvSpPr txBox="1"/>
-          <p:nvPr/>
-        </p:nvSpPr>
-        <p:spPr>
-          <a:xfrm>
-            <a:off x="5018169" y="1140269"/>
-            <a:ext cx="1541512" cy="369332"/>
-          </a:xfrm>
-          <a:prstGeom prst="rect">
-            <a:avLst/>
-          </a:prstGeom>
-          <a:noFill/>
-        </p:spPr>
-        <p:txBody>
-          <a:bodyPr wrap="none" rtlCol="0">
-            <a:spAutoFit/>
-          </a:bodyPr>
-          <a:lstStyle/>
-          <a:p>
-            <a:r>
-              <a:rPr lang="en-US" b="1" dirty="0"/>
-              <a:t>Shoelace </a:t>
-            </a:r>
-            <a:r>
-              <a:rPr lang="en-US" b="1" dirty="0" smtClean="0"/>
-              <a:t>Knot</a:t>
-            </a:r>
-            <a:endParaRPr lang="en-US" b="1" dirty="0"/>
           </a:p>
         </p:txBody>
       </p:sp>
     </p:spTree>
     <p:extLst>
       <p:ext uri="{BB962C8B-B14F-4D97-AF65-F5344CB8AC3E}">
-        <p14:creationId xmlns:p14="http://schemas.microsoft.com/office/powerpoint/2010/main" val="3134418485"/>
+        <p14:creationId xmlns:p14="http://schemas.microsoft.com/office/powerpoint/2010/main" val="3671033742"/>
       </p:ext>
     </p:extLst>
   </p:cSld>
@@ -11785,7 +10781,7 @@
           <a:p>
             <a:r>
               <a:rPr lang="en-US" dirty="0" smtClean="0"/>
-              <a:t>Test, test, test</a:t>
+              <a:t>Determine what's important</a:t>
             </a:r>
             <a:endParaRPr lang="en-US" dirty="0"/>
           </a:p>
@@ -11808,13 +10804,34 @@
           <a:p>
             <a:r>
               <a:rPr lang="en-US" dirty="0" smtClean="0"/>
-              <a:t>Emulators help</a:t>
-            </a:r>
-          </a:p>
-          <a:p>
-            <a:r>
-              <a:rPr lang="en-US" dirty="0" smtClean="0"/>
-              <a:t>Consider physical devices</a:t>
+              <a:t>Focus on core functionality</a:t>
+            </a:r>
+          </a:p>
+          <a:p>
+            <a:pPr lvl="1"/>
+            <a:r>
+              <a:rPr lang="en-US" dirty="0" smtClean="0"/>
+              <a:t>Not everything form the desktop site needs to be available</a:t>
+            </a:r>
+          </a:p>
+          <a:p>
+            <a:r>
+              <a:rPr lang="en-US" dirty="0" smtClean="0"/>
+              <a:t>How information is surfaced on a mobile site is different</a:t>
+            </a:r>
+          </a:p>
+          <a:p>
+            <a:pPr lvl="1"/>
+            <a:r>
+              <a:rPr lang="en-US" dirty="0" smtClean="0"/>
+              <a:t>Core elements at the top</a:t>
+            </a:r>
+          </a:p>
+          <a:p>
+            <a:pPr lvl="1"/>
+            <a:r>
+              <a:rPr lang="en-US" dirty="0" smtClean="0"/>
+              <a:t>Optional information below</a:t>
             </a:r>
             <a:endParaRPr lang="en-US" dirty="0"/>
           </a:p>
@@ -11823,7 +10840,7 @@
     </p:spTree>
     <p:extLst>
       <p:ext uri="{BB962C8B-B14F-4D97-AF65-F5344CB8AC3E}">
-        <p14:creationId xmlns:p14="http://schemas.microsoft.com/office/powerpoint/2010/main" val="1683714017"/>
+        <p14:creationId xmlns:p14="http://schemas.microsoft.com/office/powerpoint/2010/main" val="3941399237"/>
       </p:ext>
     </p:extLst>
   </p:cSld>
@@ -11859,6 +10876,1496 @@
       </p:grpSpPr>
       <p:sp>
         <p:nvSpPr>
+          <p:cNvPr id="4" name="TextBox 3"/>
+          <p:cNvSpPr txBox="1"/>
+          <p:nvPr/>
+        </p:nvSpPr>
+        <p:spPr>
+          <a:xfrm>
+            <a:off x="4596384" y="414528"/>
+            <a:ext cx="2168992" cy="584775"/>
+          </a:xfrm>
+          <a:prstGeom prst="rect">
+            <a:avLst/>
+          </a:prstGeom>
+          <a:noFill/>
+        </p:spPr>
+        <p:txBody>
+          <a:bodyPr wrap="none" rtlCol="0">
+            <a:spAutoFit/>
+          </a:bodyPr>
+          <a:lstStyle/>
+          <a:p>
+            <a:r>
+              <a:rPr lang="en-US" sz="3200" dirty="0" smtClean="0"/>
+              <a:t>Frayed Knot</a:t>
+            </a:r>
+            <a:endParaRPr lang="en-US" sz="3200" dirty="0"/>
+          </a:p>
+        </p:txBody>
+      </p:sp>
+      <p:pic>
+        <p:nvPicPr>
+          <p:cNvPr id="5" name="Picture 4"/>
+          <p:cNvPicPr>
+            <a:picLocks noChangeAspect="1"/>
+          </p:cNvPicPr>
+          <p:nvPr/>
+        </p:nvPicPr>
+        <p:blipFill>
+          <a:blip r:embed="rId2">
+            <a:extLst>
+              <a:ext uri="{28A0092B-C50C-407E-A947-70E740481C1C}">
+                <a14:useLocalDpi xmlns:a14="http://schemas.microsoft.com/office/drawing/2010/main" val="0"/>
+              </a:ext>
+            </a:extLst>
+          </a:blip>
+          <a:stretch>
+            <a:fillRect/>
+          </a:stretch>
+        </p:blipFill>
+        <p:spPr>
+          <a:xfrm>
+            <a:off x="1385931" y="1253299"/>
+            <a:ext cx="4294949" cy="1916621"/>
+          </a:xfrm>
+          <a:prstGeom prst="rect">
+            <a:avLst/>
+          </a:prstGeom>
+        </p:spPr>
+      </p:pic>
+      <p:sp>
+        <p:nvSpPr>
+          <p:cNvPr id="6" name="TextBox 5"/>
+          <p:cNvSpPr txBox="1"/>
+          <p:nvPr/>
+        </p:nvSpPr>
+        <p:spPr>
+          <a:xfrm>
+            <a:off x="6120385" y="1365504"/>
+            <a:ext cx="5193791" cy="3970318"/>
+          </a:xfrm>
+          <a:prstGeom prst="rect">
+            <a:avLst/>
+          </a:prstGeom>
+          <a:noFill/>
+        </p:spPr>
+        <p:txBody>
+          <a:bodyPr wrap="square" rtlCol="0">
+            <a:spAutoFit/>
+          </a:bodyPr>
+          <a:lstStyle/>
+          <a:p>
+            <a:r>
+              <a:rPr lang="en-US" b="1" dirty="0" smtClean="0"/>
+              <a:t>Shoelace Knot</a:t>
+            </a:r>
+          </a:p>
+          <a:p>
+            <a:endParaRPr lang="en-US" dirty="0"/>
+          </a:p>
+          <a:p>
+            <a:r>
+              <a:rPr lang="en-US" dirty="0"/>
+              <a:t>Lorem ipsum dolor sit </a:t>
+            </a:r>
+            <a:r>
+              <a:rPr lang="en-US" dirty="0" err="1"/>
+              <a:t>amet</a:t>
+            </a:r>
+            <a:r>
+              <a:rPr lang="en-US" dirty="0"/>
+              <a:t>, </a:t>
+            </a:r>
+            <a:r>
+              <a:rPr lang="en-US" dirty="0" err="1"/>
+              <a:t>consectetur</a:t>
+            </a:r>
+            <a:r>
+              <a:rPr lang="en-US" dirty="0"/>
+              <a:t> </a:t>
+            </a:r>
+            <a:r>
+              <a:rPr lang="en-US" dirty="0" err="1"/>
+              <a:t>adipiscing</a:t>
+            </a:r>
+            <a:r>
+              <a:rPr lang="en-US" dirty="0"/>
+              <a:t> </a:t>
+            </a:r>
+            <a:r>
+              <a:rPr lang="en-US" dirty="0" err="1"/>
+              <a:t>elit</a:t>
+            </a:r>
+            <a:r>
+              <a:rPr lang="en-US" dirty="0"/>
+              <a:t>. </a:t>
+            </a:r>
+            <a:r>
+              <a:rPr lang="en-US" dirty="0" err="1"/>
+              <a:t>Nunc</a:t>
+            </a:r>
+            <a:r>
+              <a:rPr lang="en-US" dirty="0"/>
+              <a:t> et lacus vitae </a:t>
+            </a:r>
+            <a:r>
+              <a:rPr lang="en-US" dirty="0" err="1"/>
+              <a:t>augue</a:t>
+            </a:r>
+            <a:r>
+              <a:rPr lang="en-US" dirty="0"/>
+              <a:t> </a:t>
+            </a:r>
+            <a:r>
+              <a:rPr lang="en-US" dirty="0" err="1"/>
+              <a:t>fermentum</a:t>
+            </a:r>
+            <a:r>
+              <a:rPr lang="en-US" dirty="0"/>
+              <a:t> </a:t>
+            </a:r>
+            <a:r>
+              <a:rPr lang="en-US" dirty="0" err="1"/>
+              <a:t>lobortis</a:t>
+            </a:r>
+            <a:r>
+              <a:rPr lang="en-US" dirty="0"/>
+              <a:t>. </a:t>
+            </a:r>
+            <a:r>
+              <a:rPr lang="en-US" dirty="0" err="1"/>
+              <a:t>Mauris</a:t>
+            </a:r>
+            <a:r>
+              <a:rPr lang="en-US" dirty="0"/>
+              <a:t> </a:t>
+            </a:r>
+            <a:r>
+              <a:rPr lang="en-US" dirty="0" err="1"/>
+              <a:t>congue</a:t>
+            </a:r>
+            <a:r>
+              <a:rPr lang="en-US" dirty="0"/>
+              <a:t>, </a:t>
+            </a:r>
+            <a:r>
+              <a:rPr lang="en-US" dirty="0" err="1"/>
+              <a:t>purus</a:t>
+            </a:r>
+            <a:r>
+              <a:rPr lang="en-US" dirty="0"/>
+              <a:t> ac </a:t>
+            </a:r>
+            <a:r>
+              <a:rPr lang="en-US" dirty="0" err="1"/>
+              <a:t>lobortis</a:t>
+            </a:r>
+            <a:r>
+              <a:rPr lang="en-US" dirty="0"/>
+              <a:t> </a:t>
+            </a:r>
+            <a:r>
+              <a:rPr lang="en-US" dirty="0" err="1"/>
+              <a:t>aliquet</a:t>
+            </a:r>
+            <a:r>
+              <a:rPr lang="en-US" dirty="0"/>
+              <a:t>, </a:t>
+            </a:r>
+            <a:r>
+              <a:rPr lang="en-US" dirty="0" err="1"/>
+              <a:t>eros</a:t>
+            </a:r>
+            <a:r>
+              <a:rPr lang="en-US" dirty="0"/>
+              <a:t> </a:t>
+            </a:r>
+            <a:r>
+              <a:rPr lang="en-US" dirty="0" err="1"/>
+              <a:t>elit</a:t>
+            </a:r>
+            <a:r>
+              <a:rPr lang="en-US" dirty="0"/>
+              <a:t> </a:t>
+            </a:r>
+            <a:r>
+              <a:rPr lang="en-US" dirty="0" err="1"/>
+              <a:t>imperdiet</a:t>
+            </a:r>
+            <a:r>
+              <a:rPr lang="en-US" dirty="0"/>
+              <a:t> </a:t>
+            </a:r>
+            <a:r>
+              <a:rPr lang="en-US" dirty="0" err="1"/>
+              <a:t>elit</a:t>
+            </a:r>
+            <a:r>
+              <a:rPr lang="en-US" dirty="0"/>
+              <a:t>, </a:t>
+            </a:r>
+            <a:r>
+              <a:rPr lang="en-US" dirty="0" err="1"/>
+              <a:t>nec</a:t>
+            </a:r>
+            <a:r>
+              <a:rPr lang="en-US" dirty="0"/>
+              <a:t> </a:t>
+            </a:r>
+            <a:r>
+              <a:rPr lang="en-US" dirty="0" err="1"/>
+              <a:t>egestas</a:t>
+            </a:r>
+            <a:r>
+              <a:rPr lang="en-US" dirty="0"/>
+              <a:t> </a:t>
+            </a:r>
+            <a:r>
+              <a:rPr lang="en-US" dirty="0" err="1"/>
+              <a:t>tortor</a:t>
+            </a:r>
+            <a:r>
+              <a:rPr lang="en-US" dirty="0"/>
+              <a:t> nisi non </a:t>
+            </a:r>
+            <a:r>
+              <a:rPr lang="en-US" dirty="0" err="1"/>
+              <a:t>nisl</a:t>
+            </a:r>
+            <a:r>
+              <a:rPr lang="en-US" dirty="0"/>
+              <a:t>. </a:t>
+            </a:r>
+            <a:r>
+              <a:rPr lang="en-US" dirty="0" err="1"/>
+              <a:t>Ut</a:t>
+            </a:r>
+            <a:r>
+              <a:rPr lang="en-US" dirty="0"/>
+              <a:t> </a:t>
+            </a:r>
+            <a:r>
+              <a:rPr lang="en-US" dirty="0" err="1"/>
+              <a:t>suscipit</a:t>
+            </a:r>
+            <a:r>
+              <a:rPr lang="en-US" dirty="0"/>
+              <a:t> </a:t>
+            </a:r>
+            <a:r>
+              <a:rPr lang="en-US" dirty="0" err="1"/>
+              <a:t>rutrum</a:t>
+            </a:r>
+            <a:r>
+              <a:rPr lang="en-US" dirty="0"/>
+              <a:t> mi et gravida. Nam </a:t>
+            </a:r>
+            <a:r>
+              <a:rPr lang="en-US" dirty="0" err="1"/>
+              <a:t>ullamcorper</a:t>
+            </a:r>
+            <a:r>
+              <a:rPr lang="en-US" dirty="0"/>
+              <a:t> </a:t>
+            </a:r>
+            <a:r>
+              <a:rPr lang="en-US" dirty="0" err="1"/>
+              <a:t>leo</a:t>
+            </a:r>
+            <a:r>
+              <a:rPr lang="en-US" dirty="0"/>
+              <a:t> </a:t>
+            </a:r>
+            <a:r>
+              <a:rPr lang="en-US" dirty="0" err="1"/>
+              <a:t>nisl</a:t>
+            </a:r>
+            <a:r>
+              <a:rPr lang="en-US" dirty="0"/>
+              <a:t>, non </a:t>
+            </a:r>
+            <a:r>
+              <a:rPr lang="en-US" dirty="0" err="1"/>
+              <a:t>scelerisque</a:t>
+            </a:r>
+            <a:r>
+              <a:rPr lang="en-US" dirty="0"/>
+              <a:t> libero </a:t>
+            </a:r>
+            <a:r>
+              <a:rPr lang="en-US" dirty="0" err="1"/>
+              <a:t>laoreet</a:t>
+            </a:r>
+            <a:r>
+              <a:rPr lang="en-US" dirty="0"/>
+              <a:t> a. </a:t>
+            </a:r>
+            <a:r>
+              <a:rPr lang="en-US" dirty="0" err="1"/>
+              <a:t>Suspendisse</a:t>
+            </a:r>
+            <a:r>
+              <a:rPr lang="en-US" dirty="0"/>
+              <a:t> </a:t>
+            </a:r>
+            <a:r>
+              <a:rPr lang="en-US" dirty="0" err="1"/>
+              <a:t>sed</a:t>
+            </a:r>
+            <a:r>
+              <a:rPr lang="en-US" dirty="0"/>
+              <a:t> </a:t>
+            </a:r>
+            <a:r>
+              <a:rPr lang="en-US" dirty="0" err="1"/>
+              <a:t>tellus</a:t>
+            </a:r>
+            <a:r>
+              <a:rPr lang="en-US" dirty="0"/>
+              <a:t> </a:t>
+            </a:r>
+            <a:r>
+              <a:rPr lang="en-US" dirty="0" err="1"/>
+              <a:t>tortor</a:t>
+            </a:r>
+            <a:r>
+              <a:rPr lang="en-US" dirty="0"/>
+              <a:t>. </a:t>
+            </a:r>
+            <a:r>
+              <a:rPr lang="en-US" dirty="0" err="1"/>
+              <a:t>Praesent</a:t>
+            </a:r>
+            <a:r>
+              <a:rPr lang="en-US" dirty="0"/>
+              <a:t> </a:t>
+            </a:r>
+            <a:r>
+              <a:rPr lang="en-US" dirty="0" err="1"/>
+              <a:t>eu</a:t>
+            </a:r>
+            <a:r>
+              <a:rPr lang="en-US" dirty="0"/>
+              <a:t> </a:t>
+            </a:r>
+            <a:r>
+              <a:rPr lang="en-US" dirty="0" err="1"/>
+              <a:t>tristique</a:t>
+            </a:r>
+            <a:r>
+              <a:rPr lang="en-US" dirty="0"/>
+              <a:t> diam. </a:t>
+            </a:r>
+            <a:r>
+              <a:rPr lang="en-US" dirty="0" err="1"/>
+              <a:t>Cras</a:t>
+            </a:r>
+            <a:r>
+              <a:rPr lang="en-US" dirty="0"/>
+              <a:t> </a:t>
+            </a:r>
+            <a:r>
+              <a:rPr lang="en-US" dirty="0" err="1"/>
+              <a:t>pretium</a:t>
+            </a:r>
+            <a:r>
+              <a:rPr lang="en-US" dirty="0"/>
+              <a:t>, </a:t>
+            </a:r>
+            <a:r>
+              <a:rPr lang="en-US" dirty="0" err="1"/>
+              <a:t>massa</a:t>
+            </a:r>
+            <a:r>
+              <a:rPr lang="en-US" dirty="0"/>
+              <a:t> sit </a:t>
+            </a:r>
+            <a:r>
+              <a:rPr lang="en-US" dirty="0" err="1"/>
+              <a:t>amet</a:t>
+            </a:r>
+            <a:r>
+              <a:rPr lang="en-US" dirty="0"/>
+              <a:t> </a:t>
+            </a:r>
+            <a:r>
+              <a:rPr lang="en-US" dirty="0" err="1"/>
+              <a:t>lacinia</a:t>
+            </a:r>
+            <a:r>
+              <a:rPr lang="en-US" dirty="0"/>
+              <a:t> </a:t>
+            </a:r>
+            <a:r>
+              <a:rPr lang="en-US" dirty="0" err="1"/>
+              <a:t>pulvinar</a:t>
+            </a:r>
+            <a:r>
+              <a:rPr lang="en-US" dirty="0"/>
+              <a:t>, magna </a:t>
+            </a:r>
+            <a:r>
+              <a:rPr lang="en-US" dirty="0" err="1"/>
+              <a:t>tortor</a:t>
+            </a:r>
+            <a:r>
+              <a:rPr lang="en-US" dirty="0"/>
+              <a:t> </a:t>
+            </a:r>
+            <a:r>
+              <a:rPr lang="en-US" dirty="0" err="1"/>
+              <a:t>rhoncus</a:t>
+            </a:r>
+            <a:r>
+              <a:rPr lang="en-US" dirty="0"/>
+              <a:t> </a:t>
+            </a:r>
+            <a:r>
+              <a:rPr lang="en-US" dirty="0" err="1"/>
+              <a:t>nisl</a:t>
+            </a:r>
+            <a:r>
+              <a:rPr lang="en-US" dirty="0"/>
+              <a:t>, a </a:t>
+            </a:r>
+            <a:r>
+              <a:rPr lang="en-US" dirty="0" err="1"/>
+              <a:t>aliquet</a:t>
+            </a:r>
+            <a:r>
+              <a:rPr lang="en-US" dirty="0"/>
+              <a:t> ante </a:t>
+            </a:r>
+            <a:r>
+              <a:rPr lang="en-US" dirty="0" err="1"/>
+              <a:t>elit</a:t>
+            </a:r>
+            <a:r>
+              <a:rPr lang="en-US" dirty="0"/>
+              <a:t> </a:t>
+            </a:r>
+            <a:r>
+              <a:rPr lang="en-US" dirty="0" err="1"/>
+              <a:t>nec</a:t>
+            </a:r>
+            <a:r>
+              <a:rPr lang="en-US" dirty="0"/>
+              <a:t> libero. </a:t>
+            </a:r>
+            <a:r>
+              <a:rPr lang="en-US" dirty="0" err="1"/>
+              <a:t>Aliquam</a:t>
+            </a:r>
+            <a:r>
+              <a:rPr lang="en-US" dirty="0"/>
+              <a:t> id </a:t>
+            </a:r>
+            <a:r>
+              <a:rPr lang="en-US" dirty="0" err="1"/>
+              <a:t>neque</a:t>
+            </a:r>
+            <a:r>
+              <a:rPr lang="en-US" dirty="0"/>
+              <a:t> gravida </a:t>
+            </a:r>
+            <a:r>
+              <a:rPr lang="en-US" dirty="0" err="1"/>
+              <a:t>purus</a:t>
+            </a:r>
+            <a:r>
+              <a:rPr lang="en-US" dirty="0"/>
+              <a:t> </a:t>
+            </a:r>
+            <a:r>
+              <a:rPr lang="en-US" dirty="0" err="1"/>
+              <a:t>sollicitudin</a:t>
+            </a:r>
+            <a:r>
+              <a:rPr lang="en-US" dirty="0"/>
+              <a:t> </a:t>
+            </a:r>
+            <a:r>
+              <a:rPr lang="en-US" dirty="0" err="1"/>
+              <a:t>facilisis</a:t>
+            </a:r>
+            <a:r>
+              <a:rPr lang="en-US" dirty="0"/>
+              <a:t> a id magna. Class </a:t>
+            </a:r>
+            <a:r>
+              <a:rPr lang="en-US" dirty="0" err="1"/>
+              <a:t>aptent</a:t>
+            </a:r>
+            <a:r>
+              <a:rPr lang="en-US" dirty="0"/>
+              <a:t> </a:t>
+            </a:r>
+            <a:r>
+              <a:rPr lang="en-US" dirty="0" err="1"/>
+              <a:t>taciti</a:t>
+            </a:r>
+            <a:r>
+              <a:rPr lang="en-US" dirty="0"/>
+              <a:t> </a:t>
+            </a:r>
+            <a:r>
+              <a:rPr lang="en-US" dirty="0" err="1"/>
+              <a:t>sociosqu</a:t>
+            </a:r>
+            <a:r>
+              <a:rPr lang="en-US" dirty="0"/>
+              <a:t> ad </a:t>
+            </a:r>
+            <a:r>
+              <a:rPr lang="en-US" dirty="0" err="1"/>
+              <a:t>litora</a:t>
+            </a:r>
+            <a:r>
+              <a:rPr lang="en-US" dirty="0"/>
+              <a:t> </a:t>
+            </a:r>
+            <a:r>
+              <a:rPr lang="en-US" dirty="0" err="1"/>
+              <a:t>torquent</a:t>
+            </a:r>
+            <a:r>
+              <a:rPr lang="en-US" dirty="0"/>
+              <a:t> per </a:t>
+            </a:r>
+            <a:r>
+              <a:rPr lang="en-US" dirty="0" err="1"/>
+              <a:t>conubia</a:t>
+            </a:r>
+            <a:r>
+              <a:rPr lang="en-US" dirty="0"/>
+              <a:t> nostra, per </a:t>
+            </a:r>
+            <a:r>
+              <a:rPr lang="en-US" dirty="0" err="1"/>
+              <a:t>inceptos</a:t>
+            </a:r>
+            <a:r>
+              <a:rPr lang="en-US" dirty="0"/>
+              <a:t> </a:t>
+            </a:r>
+            <a:r>
+              <a:rPr lang="en-US" dirty="0" err="1"/>
+              <a:t>himenaeos</a:t>
+            </a:r>
+            <a:r>
+              <a:rPr lang="en-US" dirty="0"/>
+              <a:t>. </a:t>
+            </a:r>
+          </a:p>
+        </p:txBody>
+      </p:sp>
+      <p:sp>
+        <p:nvSpPr>
+          <p:cNvPr id="8" name="TextBox 7"/>
+          <p:cNvSpPr txBox="1"/>
+          <p:nvPr/>
+        </p:nvSpPr>
+        <p:spPr>
+          <a:xfrm>
+            <a:off x="1385931" y="3755136"/>
+            <a:ext cx="2640018" cy="1477328"/>
+          </a:xfrm>
+          <a:prstGeom prst="rect">
+            <a:avLst/>
+          </a:prstGeom>
+          <a:noFill/>
+        </p:spPr>
+        <p:txBody>
+          <a:bodyPr wrap="none" rtlCol="0">
+            <a:spAutoFit/>
+          </a:bodyPr>
+          <a:lstStyle/>
+          <a:p>
+            <a:r>
+              <a:rPr lang="en-US" b="1" dirty="0" smtClean="0"/>
+              <a:t>Instructions</a:t>
+            </a:r>
+          </a:p>
+          <a:p>
+            <a:endParaRPr lang="en-US" dirty="0" smtClean="0"/>
+          </a:p>
+          <a:p>
+            <a:pPr marL="342900" indent="-342900">
+              <a:buFont typeface="+mj-lt"/>
+              <a:buAutoNum type="arabicPeriod"/>
+            </a:pPr>
+            <a:r>
+              <a:rPr lang="en-US" dirty="0" smtClean="0"/>
+              <a:t>Form loop at each end</a:t>
+            </a:r>
+          </a:p>
+          <a:p>
+            <a:pPr marL="342900" indent="-342900">
+              <a:buFont typeface="+mj-lt"/>
+              <a:buAutoNum type="arabicPeriod"/>
+            </a:pPr>
+            <a:r>
+              <a:rPr lang="en-US" dirty="0" smtClean="0"/>
+              <a:t>Join two loops</a:t>
+            </a:r>
+          </a:p>
+          <a:p>
+            <a:pPr marL="342900" indent="-342900">
+              <a:buFont typeface="+mj-lt"/>
+              <a:buAutoNum type="arabicPeriod"/>
+            </a:pPr>
+            <a:r>
+              <a:rPr lang="en-US" dirty="0" smtClean="0"/>
+              <a:t>Pull tight</a:t>
+            </a:r>
+            <a:endParaRPr lang="en-US" dirty="0"/>
+          </a:p>
+        </p:txBody>
+      </p:sp>
+    </p:spTree>
+    <p:extLst>
+      <p:ext uri="{BB962C8B-B14F-4D97-AF65-F5344CB8AC3E}">
+        <p14:creationId xmlns:p14="http://schemas.microsoft.com/office/powerpoint/2010/main" val="3125024547"/>
+      </p:ext>
+    </p:extLst>
+  </p:cSld>
+  <p:clrMapOvr>
+    <a:masterClrMapping/>
+  </p:clrMapOvr>
+  <p:timing>
+    <p:tnLst>
+      <p:par>
+        <p:cTn id="1" dur="indefinite" restart="never" nodeType="tmRoot"/>
+      </p:par>
+    </p:tnLst>
+  </p:timing>
+</p:sld>
+</file>
+
+<file path=ppt/slides/slide32.xml><?xml version="1.0" encoding="utf-8"?>
+<p:sld xmlns:a="http://schemas.openxmlformats.org/drawingml/2006/main" xmlns:r="http://schemas.openxmlformats.org/officeDocument/2006/relationships" xmlns:p="http://schemas.openxmlformats.org/presentationml/2006/main">
+  <p:cSld>
+    <p:spTree>
+      <p:nvGrpSpPr>
+        <p:cNvPr id="1" name=""/>
+        <p:cNvGrpSpPr/>
+        <p:nvPr/>
+      </p:nvGrpSpPr>
+      <p:grpSpPr>
+        <a:xfrm>
+          <a:off x="0" y="0"/>
+          <a:ext cx="0" cy="0"/>
+          <a:chOff x="0" y="0"/>
+          <a:chExt cx="0" cy="0"/>
+        </a:xfrm>
+      </p:grpSpPr>
+      <p:sp>
+        <p:nvSpPr>
+          <p:cNvPr id="4" name="TextBox 3"/>
+          <p:cNvSpPr txBox="1"/>
+          <p:nvPr/>
+        </p:nvSpPr>
+        <p:spPr>
+          <a:xfrm>
+            <a:off x="4596384" y="414528"/>
+            <a:ext cx="2168992" cy="584775"/>
+          </a:xfrm>
+          <a:prstGeom prst="rect">
+            <a:avLst/>
+          </a:prstGeom>
+          <a:noFill/>
+        </p:spPr>
+        <p:txBody>
+          <a:bodyPr wrap="none" rtlCol="0">
+            <a:spAutoFit/>
+          </a:bodyPr>
+          <a:lstStyle/>
+          <a:p>
+            <a:r>
+              <a:rPr lang="en-US" sz="3200" dirty="0" smtClean="0"/>
+              <a:t>Frayed Knot</a:t>
+            </a:r>
+            <a:endParaRPr lang="en-US" sz="3200" dirty="0"/>
+          </a:p>
+        </p:txBody>
+      </p:sp>
+      <p:pic>
+        <p:nvPicPr>
+          <p:cNvPr id="5" name="Picture 4"/>
+          <p:cNvPicPr>
+            <a:picLocks noChangeAspect="1"/>
+          </p:cNvPicPr>
+          <p:nvPr/>
+        </p:nvPicPr>
+        <p:blipFill>
+          <a:blip r:embed="rId2">
+            <a:extLst>
+              <a:ext uri="{28A0092B-C50C-407E-A947-70E740481C1C}">
+                <a14:useLocalDpi xmlns:a14="http://schemas.microsoft.com/office/drawing/2010/main" val="0"/>
+              </a:ext>
+            </a:extLst>
+          </a:blip>
+          <a:stretch>
+            <a:fillRect/>
+          </a:stretch>
+        </p:blipFill>
+        <p:spPr>
+          <a:xfrm>
+            <a:off x="3641451" y="1650568"/>
+            <a:ext cx="4294949" cy="1916621"/>
+          </a:xfrm>
+          <a:prstGeom prst="rect">
+            <a:avLst/>
+          </a:prstGeom>
+        </p:spPr>
+      </p:pic>
+      <p:sp>
+        <p:nvSpPr>
+          <p:cNvPr id="6" name="TextBox 5"/>
+          <p:cNvSpPr txBox="1"/>
+          <p:nvPr/>
+        </p:nvSpPr>
+        <p:spPr>
+          <a:xfrm>
+            <a:off x="3755137" y="5035296"/>
+            <a:ext cx="4535423" cy="3970318"/>
+          </a:xfrm>
+          <a:prstGeom prst="rect">
+            <a:avLst/>
+          </a:prstGeom>
+          <a:noFill/>
+        </p:spPr>
+        <p:txBody>
+          <a:bodyPr wrap="square" rtlCol="0">
+            <a:spAutoFit/>
+          </a:bodyPr>
+          <a:lstStyle/>
+          <a:p>
+            <a:r>
+              <a:rPr lang="en-US" dirty="0" smtClean="0"/>
+              <a:t>Lorem </a:t>
+            </a:r>
+            <a:r>
+              <a:rPr lang="en-US" dirty="0"/>
+              <a:t>ipsum dolor sit </a:t>
+            </a:r>
+            <a:r>
+              <a:rPr lang="en-US" dirty="0" err="1"/>
+              <a:t>amet</a:t>
+            </a:r>
+            <a:r>
+              <a:rPr lang="en-US" dirty="0"/>
+              <a:t>, </a:t>
+            </a:r>
+            <a:r>
+              <a:rPr lang="en-US" dirty="0" err="1"/>
+              <a:t>consectetur</a:t>
+            </a:r>
+            <a:r>
+              <a:rPr lang="en-US" dirty="0"/>
+              <a:t> </a:t>
+            </a:r>
+            <a:r>
+              <a:rPr lang="en-US" dirty="0" err="1"/>
+              <a:t>adipiscing</a:t>
+            </a:r>
+            <a:r>
+              <a:rPr lang="en-US" dirty="0"/>
+              <a:t> </a:t>
+            </a:r>
+            <a:r>
+              <a:rPr lang="en-US" dirty="0" err="1"/>
+              <a:t>elit</a:t>
+            </a:r>
+            <a:r>
+              <a:rPr lang="en-US" dirty="0"/>
+              <a:t>. </a:t>
+            </a:r>
+            <a:r>
+              <a:rPr lang="en-US" dirty="0" err="1"/>
+              <a:t>Nunc</a:t>
+            </a:r>
+            <a:r>
+              <a:rPr lang="en-US" dirty="0"/>
+              <a:t> et lacus vitae </a:t>
+            </a:r>
+            <a:r>
+              <a:rPr lang="en-US" dirty="0" err="1"/>
+              <a:t>augue</a:t>
+            </a:r>
+            <a:r>
+              <a:rPr lang="en-US" dirty="0"/>
+              <a:t> </a:t>
+            </a:r>
+            <a:r>
+              <a:rPr lang="en-US" dirty="0" err="1"/>
+              <a:t>fermentum</a:t>
+            </a:r>
+            <a:r>
+              <a:rPr lang="en-US" dirty="0"/>
+              <a:t> </a:t>
+            </a:r>
+            <a:r>
+              <a:rPr lang="en-US" dirty="0" err="1"/>
+              <a:t>lobortis</a:t>
+            </a:r>
+            <a:r>
+              <a:rPr lang="en-US" dirty="0"/>
+              <a:t>. </a:t>
+            </a:r>
+            <a:r>
+              <a:rPr lang="en-US" dirty="0" err="1"/>
+              <a:t>Mauris</a:t>
+            </a:r>
+            <a:r>
+              <a:rPr lang="en-US" dirty="0"/>
+              <a:t> </a:t>
+            </a:r>
+            <a:r>
+              <a:rPr lang="en-US" dirty="0" err="1"/>
+              <a:t>congue</a:t>
+            </a:r>
+            <a:r>
+              <a:rPr lang="en-US" dirty="0"/>
+              <a:t>, </a:t>
+            </a:r>
+            <a:r>
+              <a:rPr lang="en-US" dirty="0" err="1"/>
+              <a:t>purus</a:t>
+            </a:r>
+            <a:r>
+              <a:rPr lang="en-US" dirty="0"/>
+              <a:t> ac </a:t>
+            </a:r>
+            <a:r>
+              <a:rPr lang="en-US" dirty="0" err="1"/>
+              <a:t>lobortis</a:t>
+            </a:r>
+            <a:r>
+              <a:rPr lang="en-US" dirty="0"/>
+              <a:t> </a:t>
+            </a:r>
+            <a:r>
+              <a:rPr lang="en-US" dirty="0" err="1"/>
+              <a:t>aliquet</a:t>
+            </a:r>
+            <a:r>
+              <a:rPr lang="en-US" dirty="0"/>
+              <a:t>, </a:t>
+            </a:r>
+            <a:r>
+              <a:rPr lang="en-US" dirty="0" err="1"/>
+              <a:t>eros</a:t>
+            </a:r>
+            <a:r>
+              <a:rPr lang="en-US" dirty="0"/>
+              <a:t> </a:t>
+            </a:r>
+            <a:r>
+              <a:rPr lang="en-US" dirty="0" err="1"/>
+              <a:t>elit</a:t>
+            </a:r>
+            <a:r>
+              <a:rPr lang="en-US" dirty="0"/>
+              <a:t> </a:t>
+            </a:r>
+            <a:r>
+              <a:rPr lang="en-US" dirty="0" err="1"/>
+              <a:t>imperdiet</a:t>
+            </a:r>
+            <a:r>
+              <a:rPr lang="en-US" dirty="0"/>
+              <a:t> </a:t>
+            </a:r>
+            <a:r>
+              <a:rPr lang="en-US" dirty="0" err="1"/>
+              <a:t>elit</a:t>
+            </a:r>
+            <a:r>
+              <a:rPr lang="en-US" dirty="0"/>
+              <a:t>, </a:t>
+            </a:r>
+            <a:r>
+              <a:rPr lang="en-US" dirty="0" err="1"/>
+              <a:t>nec</a:t>
+            </a:r>
+            <a:r>
+              <a:rPr lang="en-US" dirty="0"/>
+              <a:t> </a:t>
+            </a:r>
+            <a:r>
+              <a:rPr lang="en-US" dirty="0" err="1"/>
+              <a:t>egestas</a:t>
+            </a:r>
+            <a:r>
+              <a:rPr lang="en-US" dirty="0"/>
+              <a:t> </a:t>
+            </a:r>
+            <a:r>
+              <a:rPr lang="en-US" dirty="0" err="1"/>
+              <a:t>tortor</a:t>
+            </a:r>
+            <a:r>
+              <a:rPr lang="en-US" dirty="0"/>
+              <a:t> nisi non </a:t>
+            </a:r>
+            <a:r>
+              <a:rPr lang="en-US" dirty="0" err="1"/>
+              <a:t>nisl</a:t>
+            </a:r>
+            <a:r>
+              <a:rPr lang="en-US" dirty="0"/>
+              <a:t>. </a:t>
+            </a:r>
+            <a:r>
+              <a:rPr lang="en-US" dirty="0" err="1"/>
+              <a:t>Ut</a:t>
+            </a:r>
+            <a:r>
+              <a:rPr lang="en-US" dirty="0"/>
+              <a:t> </a:t>
+            </a:r>
+            <a:r>
+              <a:rPr lang="en-US" dirty="0" err="1"/>
+              <a:t>suscipit</a:t>
+            </a:r>
+            <a:r>
+              <a:rPr lang="en-US" dirty="0"/>
+              <a:t> </a:t>
+            </a:r>
+            <a:r>
+              <a:rPr lang="en-US" dirty="0" err="1"/>
+              <a:t>rutrum</a:t>
+            </a:r>
+            <a:r>
+              <a:rPr lang="en-US" dirty="0"/>
+              <a:t> mi et gravida. Nam </a:t>
+            </a:r>
+            <a:r>
+              <a:rPr lang="en-US" dirty="0" err="1"/>
+              <a:t>ullamcorper</a:t>
+            </a:r>
+            <a:r>
+              <a:rPr lang="en-US" dirty="0"/>
+              <a:t> </a:t>
+            </a:r>
+            <a:r>
+              <a:rPr lang="en-US" dirty="0" err="1"/>
+              <a:t>leo</a:t>
+            </a:r>
+            <a:r>
+              <a:rPr lang="en-US" dirty="0"/>
+              <a:t> </a:t>
+            </a:r>
+            <a:r>
+              <a:rPr lang="en-US" dirty="0" err="1"/>
+              <a:t>nisl</a:t>
+            </a:r>
+            <a:r>
+              <a:rPr lang="en-US" dirty="0"/>
+              <a:t>, non </a:t>
+            </a:r>
+            <a:r>
+              <a:rPr lang="en-US" dirty="0" err="1"/>
+              <a:t>scelerisque</a:t>
+            </a:r>
+            <a:r>
+              <a:rPr lang="en-US" dirty="0"/>
+              <a:t> libero </a:t>
+            </a:r>
+            <a:r>
+              <a:rPr lang="en-US" dirty="0" err="1"/>
+              <a:t>laoreet</a:t>
+            </a:r>
+            <a:r>
+              <a:rPr lang="en-US" dirty="0"/>
+              <a:t> a. </a:t>
+            </a:r>
+            <a:r>
+              <a:rPr lang="en-US" dirty="0" err="1"/>
+              <a:t>Suspendisse</a:t>
+            </a:r>
+            <a:r>
+              <a:rPr lang="en-US" dirty="0"/>
+              <a:t> </a:t>
+            </a:r>
+            <a:r>
+              <a:rPr lang="en-US" dirty="0" err="1"/>
+              <a:t>sed</a:t>
+            </a:r>
+            <a:r>
+              <a:rPr lang="en-US" dirty="0"/>
+              <a:t> </a:t>
+            </a:r>
+            <a:r>
+              <a:rPr lang="en-US" dirty="0" err="1"/>
+              <a:t>tellus</a:t>
+            </a:r>
+            <a:r>
+              <a:rPr lang="en-US" dirty="0"/>
+              <a:t> </a:t>
+            </a:r>
+            <a:r>
+              <a:rPr lang="en-US" dirty="0" err="1"/>
+              <a:t>tortor</a:t>
+            </a:r>
+            <a:r>
+              <a:rPr lang="en-US" dirty="0"/>
+              <a:t>. </a:t>
+            </a:r>
+            <a:r>
+              <a:rPr lang="en-US" dirty="0" err="1"/>
+              <a:t>Praesent</a:t>
+            </a:r>
+            <a:r>
+              <a:rPr lang="en-US" dirty="0"/>
+              <a:t> </a:t>
+            </a:r>
+            <a:r>
+              <a:rPr lang="en-US" dirty="0" err="1"/>
+              <a:t>eu</a:t>
+            </a:r>
+            <a:r>
+              <a:rPr lang="en-US" dirty="0"/>
+              <a:t> </a:t>
+            </a:r>
+            <a:r>
+              <a:rPr lang="en-US" dirty="0" err="1"/>
+              <a:t>tristique</a:t>
+            </a:r>
+            <a:r>
+              <a:rPr lang="en-US" dirty="0"/>
+              <a:t> diam. </a:t>
+            </a:r>
+            <a:r>
+              <a:rPr lang="en-US" dirty="0" err="1"/>
+              <a:t>Cras</a:t>
+            </a:r>
+            <a:r>
+              <a:rPr lang="en-US" dirty="0"/>
+              <a:t> </a:t>
+            </a:r>
+            <a:r>
+              <a:rPr lang="en-US" dirty="0" err="1"/>
+              <a:t>pretium</a:t>
+            </a:r>
+            <a:r>
+              <a:rPr lang="en-US" dirty="0"/>
+              <a:t>, </a:t>
+            </a:r>
+            <a:r>
+              <a:rPr lang="en-US" dirty="0" err="1"/>
+              <a:t>massa</a:t>
+            </a:r>
+            <a:r>
+              <a:rPr lang="en-US" dirty="0"/>
+              <a:t> sit </a:t>
+            </a:r>
+            <a:r>
+              <a:rPr lang="en-US" dirty="0" err="1"/>
+              <a:t>amet</a:t>
+            </a:r>
+            <a:r>
+              <a:rPr lang="en-US" dirty="0"/>
+              <a:t> </a:t>
+            </a:r>
+            <a:r>
+              <a:rPr lang="en-US" dirty="0" err="1"/>
+              <a:t>lacinia</a:t>
+            </a:r>
+            <a:r>
+              <a:rPr lang="en-US" dirty="0"/>
+              <a:t> </a:t>
+            </a:r>
+            <a:r>
+              <a:rPr lang="en-US" dirty="0" err="1"/>
+              <a:t>pulvinar</a:t>
+            </a:r>
+            <a:r>
+              <a:rPr lang="en-US" dirty="0"/>
+              <a:t>, magna </a:t>
+            </a:r>
+            <a:r>
+              <a:rPr lang="en-US" dirty="0" err="1"/>
+              <a:t>tortor</a:t>
+            </a:r>
+            <a:r>
+              <a:rPr lang="en-US" dirty="0"/>
+              <a:t> </a:t>
+            </a:r>
+            <a:r>
+              <a:rPr lang="en-US" dirty="0" err="1"/>
+              <a:t>rhoncus</a:t>
+            </a:r>
+            <a:r>
+              <a:rPr lang="en-US" dirty="0"/>
+              <a:t> </a:t>
+            </a:r>
+            <a:r>
+              <a:rPr lang="en-US" dirty="0" err="1"/>
+              <a:t>nisl</a:t>
+            </a:r>
+            <a:r>
+              <a:rPr lang="en-US" dirty="0"/>
+              <a:t>, a </a:t>
+            </a:r>
+            <a:r>
+              <a:rPr lang="en-US" dirty="0" err="1"/>
+              <a:t>aliquet</a:t>
+            </a:r>
+            <a:r>
+              <a:rPr lang="en-US" dirty="0"/>
+              <a:t> ante </a:t>
+            </a:r>
+            <a:r>
+              <a:rPr lang="en-US" dirty="0" err="1"/>
+              <a:t>elit</a:t>
+            </a:r>
+            <a:r>
+              <a:rPr lang="en-US" dirty="0"/>
+              <a:t> </a:t>
+            </a:r>
+            <a:r>
+              <a:rPr lang="en-US" dirty="0" err="1"/>
+              <a:t>nec</a:t>
+            </a:r>
+            <a:r>
+              <a:rPr lang="en-US" dirty="0"/>
+              <a:t> libero. </a:t>
+            </a:r>
+            <a:r>
+              <a:rPr lang="en-US" dirty="0" err="1"/>
+              <a:t>Aliquam</a:t>
+            </a:r>
+            <a:r>
+              <a:rPr lang="en-US" dirty="0"/>
+              <a:t> id </a:t>
+            </a:r>
+            <a:r>
+              <a:rPr lang="en-US" dirty="0" err="1"/>
+              <a:t>neque</a:t>
+            </a:r>
+            <a:r>
+              <a:rPr lang="en-US" dirty="0"/>
+              <a:t> gravida </a:t>
+            </a:r>
+            <a:r>
+              <a:rPr lang="en-US" dirty="0" err="1"/>
+              <a:t>purus</a:t>
+            </a:r>
+            <a:r>
+              <a:rPr lang="en-US" dirty="0"/>
+              <a:t> </a:t>
+            </a:r>
+            <a:r>
+              <a:rPr lang="en-US" dirty="0" err="1"/>
+              <a:t>sollicitudin</a:t>
+            </a:r>
+            <a:r>
+              <a:rPr lang="en-US" dirty="0"/>
+              <a:t> </a:t>
+            </a:r>
+            <a:r>
+              <a:rPr lang="en-US" dirty="0" err="1"/>
+              <a:t>facilisis</a:t>
+            </a:r>
+            <a:r>
+              <a:rPr lang="en-US" dirty="0"/>
+              <a:t> a id magna. Class </a:t>
+            </a:r>
+            <a:r>
+              <a:rPr lang="en-US" dirty="0" err="1"/>
+              <a:t>aptent</a:t>
+            </a:r>
+            <a:r>
+              <a:rPr lang="en-US" dirty="0"/>
+              <a:t> </a:t>
+            </a:r>
+            <a:r>
+              <a:rPr lang="en-US" dirty="0" err="1"/>
+              <a:t>taciti</a:t>
+            </a:r>
+            <a:r>
+              <a:rPr lang="en-US" dirty="0"/>
+              <a:t> </a:t>
+            </a:r>
+            <a:r>
+              <a:rPr lang="en-US" dirty="0" err="1"/>
+              <a:t>sociosqu</a:t>
+            </a:r>
+            <a:r>
+              <a:rPr lang="en-US" dirty="0"/>
+              <a:t> ad </a:t>
+            </a:r>
+            <a:r>
+              <a:rPr lang="en-US" dirty="0" err="1"/>
+              <a:t>litora</a:t>
+            </a:r>
+            <a:r>
+              <a:rPr lang="en-US" dirty="0"/>
+              <a:t> </a:t>
+            </a:r>
+            <a:r>
+              <a:rPr lang="en-US" dirty="0" err="1"/>
+              <a:t>torquent</a:t>
+            </a:r>
+            <a:r>
+              <a:rPr lang="en-US" dirty="0"/>
+              <a:t> per </a:t>
+            </a:r>
+            <a:r>
+              <a:rPr lang="en-US" dirty="0" err="1"/>
+              <a:t>conubia</a:t>
+            </a:r>
+            <a:r>
+              <a:rPr lang="en-US" dirty="0"/>
+              <a:t> nostra, per </a:t>
+            </a:r>
+            <a:r>
+              <a:rPr lang="en-US" dirty="0" err="1"/>
+              <a:t>inceptos</a:t>
+            </a:r>
+            <a:r>
+              <a:rPr lang="en-US" dirty="0"/>
+              <a:t> </a:t>
+            </a:r>
+            <a:r>
+              <a:rPr lang="en-US" dirty="0" err="1"/>
+              <a:t>himenaeos</a:t>
+            </a:r>
+            <a:r>
+              <a:rPr lang="en-US" dirty="0"/>
+              <a:t>. </a:t>
+            </a:r>
+          </a:p>
+        </p:txBody>
+      </p:sp>
+      <p:sp>
+        <p:nvSpPr>
+          <p:cNvPr id="8" name="TextBox 7"/>
+          <p:cNvSpPr txBox="1"/>
+          <p:nvPr/>
+        </p:nvSpPr>
+        <p:spPr>
+          <a:xfrm>
+            <a:off x="3755137" y="3562579"/>
+            <a:ext cx="2640018" cy="1477328"/>
+          </a:xfrm>
+          <a:prstGeom prst="rect">
+            <a:avLst/>
+          </a:prstGeom>
+          <a:noFill/>
+        </p:spPr>
+        <p:txBody>
+          <a:bodyPr wrap="none" rtlCol="0">
+            <a:spAutoFit/>
+          </a:bodyPr>
+          <a:lstStyle/>
+          <a:p>
+            <a:r>
+              <a:rPr lang="en-US" b="1" dirty="0" smtClean="0"/>
+              <a:t>Instructions</a:t>
+            </a:r>
+          </a:p>
+          <a:p>
+            <a:endParaRPr lang="en-US" dirty="0" smtClean="0"/>
+          </a:p>
+          <a:p>
+            <a:pPr marL="342900" indent="-342900">
+              <a:buFont typeface="+mj-lt"/>
+              <a:buAutoNum type="arabicPeriod"/>
+            </a:pPr>
+            <a:r>
+              <a:rPr lang="en-US" dirty="0" smtClean="0"/>
+              <a:t>Form loop at each end</a:t>
+            </a:r>
+          </a:p>
+          <a:p>
+            <a:pPr marL="342900" indent="-342900">
+              <a:buFont typeface="+mj-lt"/>
+              <a:buAutoNum type="arabicPeriod"/>
+            </a:pPr>
+            <a:r>
+              <a:rPr lang="en-US" dirty="0" smtClean="0"/>
+              <a:t>Join two loops</a:t>
+            </a:r>
+          </a:p>
+          <a:p>
+            <a:pPr marL="342900" indent="-342900">
+              <a:buFont typeface="+mj-lt"/>
+              <a:buAutoNum type="arabicPeriod"/>
+            </a:pPr>
+            <a:r>
+              <a:rPr lang="en-US" dirty="0" smtClean="0"/>
+              <a:t>Pull tight</a:t>
+            </a:r>
+            <a:endParaRPr lang="en-US" dirty="0"/>
+          </a:p>
+        </p:txBody>
+      </p:sp>
+      <p:sp>
+        <p:nvSpPr>
+          <p:cNvPr id="2" name="TextBox 1"/>
+          <p:cNvSpPr txBox="1"/>
+          <p:nvPr/>
+        </p:nvSpPr>
+        <p:spPr>
+          <a:xfrm>
+            <a:off x="5018169" y="1140269"/>
+            <a:ext cx="1541512" cy="369332"/>
+          </a:xfrm>
+          <a:prstGeom prst="rect">
+            <a:avLst/>
+          </a:prstGeom>
+          <a:noFill/>
+        </p:spPr>
+        <p:txBody>
+          <a:bodyPr wrap="none" rtlCol="0">
+            <a:spAutoFit/>
+          </a:bodyPr>
+          <a:lstStyle/>
+          <a:p>
+            <a:r>
+              <a:rPr lang="en-US" b="1" dirty="0"/>
+              <a:t>Shoelace </a:t>
+            </a:r>
+            <a:r>
+              <a:rPr lang="en-US" b="1" dirty="0" smtClean="0"/>
+              <a:t>Knot</a:t>
+            </a:r>
+            <a:endParaRPr lang="en-US" b="1" dirty="0"/>
+          </a:p>
+        </p:txBody>
+      </p:sp>
+    </p:spTree>
+    <p:extLst>
+      <p:ext uri="{BB962C8B-B14F-4D97-AF65-F5344CB8AC3E}">
+        <p14:creationId xmlns:p14="http://schemas.microsoft.com/office/powerpoint/2010/main" val="3134418485"/>
+      </p:ext>
+    </p:extLst>
+  </p:cSld>
+  <p:clrMapOvr>
+    <a:masterClrMapping/>
+  </p:clrMapOvr>
+  <p:timing>
+    <p:tnLst>
+      <p:par>
+        <p:cTn id="1" dur="indefinite" restart="never" nodeType="tmRoot"/>
+      </p:par>
+    </p:tnLst>
+  </p:timing>
+</p:sld>
+</file>
+
+<file path=ppt/slides/slide33.xml><?xml version="1.0" encoding="utf-8"?>
+<p:sld xmlns:a="http://schemas.openxmlformats.org/drawingml/2006/main" xmlns:r="http://schemas.openxmlformats.org/officeDocument/2006/relationships" xmlns:p="http://schemas.openxmlformats.org/presentationml/2006/main">
+  <p:cSld>
+    <p:spTree>
+      <p:nvGrpSpPr>
+        <p:cNvPr id="1" name=""/>
+        <p:cNvGrpSpPr/>
+        <p:nvPr/>
+      </p:nvGrpSpPr>
+      <p:grpSpPr>
+        <a:xfrm>
+          <a:off x="0" y="0"/>
+          <a:ext cx="0" cy="0"/>
+          <a:chOff x="0" y="0"/>
+          <a:chExt cx="0" cy="0"/>
+        </a:xfrm>
+      </p:grpSpPr>
+      <p:sp>
+        <p:nvSpPr>
+          <p:cNvPr id="3" name="Title 2"/>
+          <p:cNvSpPr>
+            <a:spLocks noGrp="1"/>
+          </p:cNvSpPr>
+          <p:nvPr>
+            <p:ph type="title"/>
+          </p:nvPr>
+        </p:nvSpPr>
+        <p:spPr/>
+        <p:txBody>
+          <a:bodyPr/>
+          <a:lstStyle/>
+          <a:p>
+            <a:r>
+              <a:rPr lang="en-US" dirty="0" smtClean="0"/>
+              <a:t>Test, test, test</a:t>
+            </a:r>
+            <a:endParaRPr lang="en-US" dirty="0"/>
+          </a:p>
+        </p:txBody>
+      </p:sp>
+      <p:sp>
+        <p:nvSpPr>
+          <p:cNvPr id="4" name="Content Placeholder 3"/>
+          <p:cNvSpPr>
+            <a:spLocks noGrp="1"/>
+          </p:cNvSpPr>
+          <p:nvPr>
+            <p:ph sz="quarter" idx="10"/>
+          </p:nvPr>
+        </p:nvSpPr>
+        <p:spPr/>
+        <p:txBody>
+          <a:bodyPr/>
+          <a:lstStyle/>
+          <a:p>
+            <a:r>
+              <a:rPr lang="en-US" dirty="0" smtClean="0"/>
+              <a:t>Emulators help</a:t>
+            </a:r>
+          </a:p>
+          <a:p>
+            <a:r>
+              <a:rPr lang="en-US" dirty="0" smtClean="0"/>
+              <a:t>Consider physical devices</a:t>
+            </a:r>
+            <a:endParaRPr lang="en-US" dirty="0"/>
+          </a:p>
+        </p:txBody>
+      </p:sp>
+    </p:spTree>
+    <p:extLst>
+      <p:ext uri="{BB962C8B-B14F-4D97-AF65-F5344CB8AC3E}">
+        <p14:creationId xmlns:p14="http://schemas.microsoft.com/office/powerpoint/2010/main" val="1683714017"/>
+      </p:ext>
+    </p:extLst>
+  </p:cSld>
+  <p:clrMapOvr>
+    <a:masterClrMapping/>
+  </p:clrMapOvr>
+  <p:timing>
+    <p:tnLst>
+      <p:par>
+        <p:cTn id="1" dur="indefinite" restart="never" nodeType="tmRoot"/>
+      </p:par>
+    </p:tnLst>
+  </p:timing>
+</p:sld>
+</file>
+
+<file path=ppt/slides/slide34.xml><?xml version="1.0" encoding="utf-8"?>
+<p:sld xmlns:a="http://schemas.openxmlformats.org/drawingml/2006/main" xmlns:r="http://schemas.openxmlformats.org/officeDocument/2006/relationships" xmlns:p="http://schemas.openxmlformats.org/presentationml/2006/main">
+  <p:cSld>
+    <p:spTree>
+      <p:nvGrpSpPr>
+        <p:cNvPr id="1" name=""/>
+        <p:cNvGrpSpPr/>
+        <p:nvPr/>
+      </p:nvGrpSpPr>
+      <p:grpSpPr>
+        <a:xfrm>
+          <a:off x="0" y="0"/>
+          <a:ext cx="0" cy="0"/>
+          <a:chOff x="0" y="0"/>
+          <a:chExt cx="0" cy="0"/>
+        </a:xfrm>
+      </p:grpSpPr>
+      <p:sp>
+        <p:nvSpPr>
           <p:cNvPr id="2" name="Text Placeholder 1"/>
           <p:cNvSpPr>
             <a:spLocks noGrp="1"/>
@@ -11927,7 +12434,7 @@
 </p:sld>
 </file>
 
-<file path=ppt/slides/slide32.xml><?xml version="1.0" encoding="utf-8"?>
+<file path=ppt/slides/slide35.xml><?xml version="1.0" encoding="utf-8"?>
 <p:sld xmlns:a="http://schemas.openxmlformats.org/drawingml/2006/main" xmlns:r="http://schemas.openxmlformats.org/officeDocument/2006/relationships" xmlns:p="http://schemas.openxmlformats.org/presentationml/2006/main">
   <p:cSld>
     <p:bg>
@@ -12124,7 +12631,7 @@
 </p:sld>
 </file>
 
-<file path=ppt/slides/slide33.xml><?xml version="1.0" encoding="utf-8"?>
+<file path=ppt/slides/slide36.xml><?xml version="1.0" encoding="utf-8"?>
 <p:sld xmlns:a="http://schemas.openxmlformats.org/drawingml/2006/main" xmlns:r="http://schemas.openxmlformats.org/officeDocument/2006/relationships" xmlns:p="http://schemas.openxmlformats.org/presentationml/2006/main">
   <p:cSld>
     <p:spTree>
@@ -12180,9 +12687,24 @@
           <a:lstStyle/>
           <a:p>
             <a:r>
-              <a:rPr lang="en-US" dirty="0"/>
-              <a:t>http://wtfmobileweb.com/</a:t>
-            </a:r>
+              <a:rPr lang="en-US" dirty="0">
+                <a:hlinkClick r:id="rId2"/>
+              </a:rPr>
+              <a:t>http://</a:t>
+            </a:r>
+            <a:r>
+              <a:rPr lang="en-US" dirty="0" smtClean="0">
+                <a:hlinkClick r:id="rId2"/>
+              </a:rPr>
+              <a:t>wtfmobilewebf.com</a:t>
+            </a:r>
+            <a:r>
+              <a:rPr lang="en-US" dirty="0">
+                <a:hlinkClick r:id="rId2"/>
+              </a:rPr>
+              <a:t>/</a:t>
+            </a:r>
+            <a:endParaRPr lang="en-US" dirty="0"/>
           </a:p>
         </p:txBody>
       </p:sp>
@@ -12206,7 +12728,7 @@
 </p:sld>
 </file>
 
-<file path=ppt/slides/slide34.xml><?xml version="1.0" encoding="utf-8"?>
+<file path=ppt/slides/slide37.xml><?xml version="1.0" encoding="utf-8"?>
 <p:sld xmlns:a="http://schemas.openxmlformats.org/drawingml/2006/main" xmlns:r="http://schemas.openxmlformats.org/officeDocument/2006/relationships" xmlns:p="http://schemas.openxmlformats.org/presentationml/2006/main">
   <p:cSld>
     <p:spTree>
@@ -12307,22 +12829,14 @@
           <a:p>
             <a:pPr lvl="1"/>
             <a:r>
-              <a:rPr lang="en-US" dirty="0" smtClean="0">
-                <a:solidFill>
-                  <a:srgbClr val="FF0000"/>
-                </a:solidFill>
-              </a:rPr>
+              <a:rPr lang="en-US" dirty="0" smtClean="0"/>
               <a:t>Beginner to intermediate web platform experience</a:t>
             </a:r>
           </a:p>
           <a:p>
             <a:pPr lvl="1"/>
             <a:r>
-              <a:rPr lang="en-US" dirty="0" smtClean="0">
-                <a:solidFill>
-                  <a:srgbClr val="FF0000"/>
-                </a:solidFill>
-              </a:rPr>
+              <a:rPr lang="en-US" dirty="0" smtClean="0"/>
               <a:t>Those looking for latest in modern web platform</a:t>
             </a:r>
           </a:p>
@@ -12335,43 +12849,24 @@
           <a:p>
             <a:pPr lvl="1"/>
             <a:r>
-              <a:rPr lang="en-US" dirty="0" smtClean="0">
-                <a:solidFill>
-                  <a:srgbClr val="FF0000"/>
-                </a:solidFill>
-              </a:rPr>
-              <a:t>microsoftvirtualacademy.com (mva.ms)</a:t>
+              <a:rPr lang="en-US" dirty="0" smtClean="0"/>
+              <a:t>Basic understanding of web platform (HTML/CSS/JavaScript)</a:t>
             </a:r>
           </a:p>
           <a:p>
             <a:pPr lvl="1"/>
             <a:r>
-              <a:rPr lang="en-US" dirty="0" smtClean="0">
-                <a:solidFill>
-                  <a:srgbClr val="FF0000"/>
-                </a:solidFill>
-              </a:rPr>
-              <a:t>codecademy.com</a:t>
-            </a:r>
-            <a:endParaRPr lang="en-US" dirty="0">
-              <a:solidFill>
-                <a:srgbClr val="FF0000"/>
-              </a:solidFill>
-            </a:endParaRPr>
-          </a:p>
-          <a:p>
-            <a:pPr lvl="1"/>
-            <a:r>
-              <a:rPr lang="en-US" dirty="0" smtClean="0">
-                <a:solidFill>
-                  <a:srgbClr val="FF0000"/>
-                </a:solidFill>
-              </a:rPr>
-              <a:t>code.org/learn</a:t>
-            </a:r>
-          </a:p>
-          <a:p>
-            <a:pPr lvl="1"/>
+              <a:rPr lang="en-US" dirty="0" smtClean="0"/>
+              <a:t>microsoftvirtualacademy.com </a:t>
+            </a:r>
+            <a:r>
+              <a:rPr lang="en-US" dirty="0" smtClean="0"/>
+              <a:t>(mva.ms</a:t>
+            </a:r>
+            <a:r>
+              <a:rPr lang="en-US" dirty="0" smtClean="0"/>
+              <a:t>)</a:t>
+            </a:r>
             <a:endParaRPr lang="en-US" dirty="0"/>
           </a:p>
           <a:p>
@@ -12504,12 +12999,12 @@
               <a:t>Enter this code: </a:t>
             </a:r>
             <a:r>
-              <a:rPr lang="en-US" b="1" dirty="0" smtClean="0">
+              <a:rPr lang="en-US" b="1" dirty="0" err="1" smtClean="0">
                 <a:solidFill>
                   <a:srgbClr val="FF0000"/>
                 </a:solidFill>
               </a:rPr>
-              <a:t>DevUnivWinAppsHTML1</a:t>
+              <a:t>MobileWeb</a:t>
             </a:r>
             <a:r>
               <a:rPr lang="en-US" dirty="0" smtClean="0">
@@ -12517,7 +13012,31 @@
                   <a:srgbClr val="FF0000"/>
                 </a:solidFill>
               </a:rPr>
-              <a:t> (expires 9/26/2014)</a:t>
+              <a:t> </a:t>
+            </a:r>
+            <a:r>
+              <a:rPr lang="en-US" dirty="0" smtClean="0">
+                <a:solidFill>
+                  <a:srgbClr val="FF0000"/>
+                </a:solidFill>
+              </a:rPr>
+              <a:t>(expires </a:t>
+            </a:r>
+            <a:r>
+              <a:rPr lang="en-US" dirty="0" smtClean="0">
+                <a:solidFill>
+                  <a:srgbClr val="FF0000"/>
+                </a:solidFill>
+              </a:rPr>
+              <a:t>11/22/2014</a:t>
+            </a:r>
+            <a:r>
+              <a:rPr lang="en-US" dirty="0" smtClean="0">
+                <a:solidFill>
+                  <a:srgbClr val="FF0000"/>
+                </a:solidFill>
+              </a:rPr>
+              <a:t>)</a:t>
             </a:r>
             <a:endParaRPr lang="en-US" dirty="0">
               <a:solidFill>
@@ -12678,14 +13197,14 @@
                 <a:gridCol w="5762625">
                   <a:extLst>
                     <a:ext uri="{9D8B030D-6E8A-4147-A177-3AD203B41FA5}">
-                      <a16:colId xmlns:a16="http://schemas.microsoft.com/office/drawing/2014/main" xmlns="" val="1632794655"/>
+                      <a16:colId xmlns="" xmlns:a16="http://schemas.microsoft.com/office/drawing/2014/main" val="1632794655"/>
                     </a:ext>
                   </a:extLst>
                 </a:gridCol>
                 <a:gridCol w="5762625">
                   <a:extLst>
                     <a:ext uri="{9D8B030D-6E8A-4147-A177-3AD203B41FA5}">
-                      <a16:colId xmlns:a16="http://schemas.microsoft.com/office/drawing/2014/main" xmlns="" val="2011313899"/>
+                      <a16:colId xmlns="" xmlns:a16="http://schemas.microsoft.com/office/drawing/2014/main" val="2011313899"/>
                     </a:ext>
                   </a:extLst>
                 </a:gridCol>
@@ -12723,7 +13242,7 @@
                 </a:tc>
                 <a:extLst>
                   <a:ext uri="{0D108BD9-81ED-4DB2-BD59-A6C34878D82A}">
-                    <a16:rowId xmlns:a16="http://schemas.microsoft.com/office/drawing/2014/main" xmlns="" val="1789177411"/>
+                    <a16:rowId xmlns="" xmlns:a16="http://schemas.microsoft.com/office/drawing/2014/main" val="1789177411"/>
                   </a:ext>
                 </a:extLst>
               </a:tr>
@@ -12784,7 +13303,7 @@
                 </a:tc>
                 <a:extLst>
                   <a:ext uri="{0D108BD9-81ED-4DB2-BD59-A6C34878D82A}">
-                    <a16:rowId xmlns:a16="http://schemas.microsoft.com/office/drawing/2014/main" xmlns="" val="3842815335"/>
+                    <a16:rowId xmlns="" xmlns:a16="http://schemas.microsoft.com/office/drawing/2014/main" val="3842815335"/>
                   </a:ext>
                 </a:extLst>
               </a:tr>
@@ -12831,7 +13350,7 @@
                 </a:tc>
                 <a:extLst>
                   <a:ext uri="{0D108BD9-81ED-4DB2-BD59-A6C34878D82A}">
-                    <a16:rowId xmlns:a16="http://schemas.microsoft.com/office/drawing/2014/main" xmlns="" val="321066646"/>
+                    <a16:rowId xmlns="" xmlns:a16="http://schemas.microsoft.com/office/drawing/2014/main" val="321066646"/>
                   </a:ext>
                 </a:extLst>
               </a:tr>
@@ -12902,7 +13421,7 @@
                 </a:tc>
                 <a:extLst>
                   <a:ext uri="{0D108BD9-81ED-4DB2-BD59-A6C34878D82A}">
-                    <a16:rowId xmlns:a16="http://schemas.microsoft.com/office/drawing/2014/main" xmlns="" val="3812060533"/>
+                    <a16:rowId xmlns="" xmlns:a16="http://schemas.microsoft.com/office/drawing/2014/main" val="3812060533"/>
                   </a:ext>
                 </a:extLst>
               </a:tr>
@@ -14894,18 +15413,18 @@
 </file>
 
 <file path=customXml/item1.xml><?xml version="1.0" encoding="utf-8"?>
+<p:properties xmlns:p="http://schemas.microsoft.com/office/2006/metadata/properties" xmlns:xsi="http://www.w3.org/2001/XMLSchema-instance" xmlns:pc="http://schemas.microsoft.com/office/infopath/2007/PartnerControls">
+  <documentManagement/>
+</p:properties>
+</file>
+
+<file path=customXml/item2.xml><?xml version="1.0" encoding="utf-8"?>
 <?mso-contentType ?>
 <FormTemplates xmlns="http://schemas.microsoft.com/sharepoint/v3/contenttype/forms">
   <Display>DocumentLibraryForm</Display>
   <Edit>DocumentLibraryForm</Edit>
   <New>DocumentLibraryForm</New>
 </FormTemplates>
-</file>
-
-<file path=customXml/item2.xml><?xml version="1.0" encoding="utf-8"?>
-<p:properties xmlns:p="http://schemas.microsoft.com/office/2006/metadata/properties" xmlns:xsi="http://www.w3.org/2001/XMLSchema-instance" xmlns:pc="http://schemas.microsoft.com/office/infopath/2007/PartnerControls">
-  <documentManagement/>
-</p:properties>
 </file>
 
 <file path=customXml/item3.xml><?xml version="1.0" encoding="utf-8"?>
@@ -15049,25 +15568,25 @@
 </file>
 
 <file path=customXml/itemProps1.xml><?xml version="1.0" encoding="utf-8"?>
-<ds:datastoreItem xmlns:ds="http://schemas.openxmlformats.org/officeDocument/2006/customXml" ds:itemID="{B0CA13EC-1D3C-4D6F-8D1C-E8A452CFC79A}">
+<ds:datastoreItem xmlns:ds="http://schemas.openxmlformats.org/officeDocument/2006/customXml" ds:itemID="{7025FDD9-4C58-4084-9F89-0E6ADD6FFF55}">
   <ds:schemaRefs>
-    <ds:schemaRef ds:uri="http://schemas.microsoft.com/sharepoint/v3/contenttype/forms"/>
+    <ds:schemaRef ds:uri="http://schemas.microsoft.com/office/2006/metadata/properties"/>
+    <ds:schemaRef ds:uri="http://purl.org/dc/terms/"/>
+    <ds:schemaRef ds:uri="http://schemas.openxmlformats.org/package/2006/metadata/core-properties"/>
+    <ds:schemaRef ds:uri="http://schemas.microsoft.com/office/2006/documentManagement/types"/>
+    <ds:schemaRef ds:uri="http://schemas.microsoft.com/office/infopath/2007/PartnerControls"/>
+    <ds:schemaRef ds:uri="ecd1fa32-ae44-48d6-80a1-71a52da60b4a"/>
+    <ds:schemaRef ds:uri="http://purl.org/dc/elements/1.1/"/>
+    <ds:schemaRef ds:uri="http://www.w3.org/XML/1998/namespace"/>
+    <ds:schemaRef ds:uri="http://purl.org/dc/dcmitype/"/>
   </ds:schemaRefs>
 </ds:datastoreItem>
 </file>
 
 <file path=customXml/itemProps2.xml><?xml version="1.0" encoding="utf-8"?>
-<ds:datastoreItem xmlns:ds="http://schemas.openxmlformats.org/officeDocument/2006/customXml" ds:itemID="{7025FDD9-4C58-4084-9F89-0E6ADD6FFF55}">
+<ds:datastoreItem xmlns:ds="http://schemas.openxmlformats.org/officeDocument/2006/customXml" ds:itemID="{B0CA13EC-1D3C-4D6F-8D1C-E8A452CFC79A}">
   <ds:schemaRefs>
-    <ds:schemaRef ds:uri="http://purl.org/dc/elements/1.1/"/>
-    <ds:schemaRef ds:uri="http://schemas.microsoft.com/office/2006/documentManagement/types"/>
-    <ds:schemaRef ds:uri="http://schemas.openxmlformats.org/package/2006/metadata/core-properties"/>
-    <ds:schemaRef ds:uri="http://purl.org/dc/dcmitype/"/>
-    <ds:schemaRef ds:uri="http://schemas.microsoft.com/office/infopath/2007/PartnerControls"/>
-    <ds:schemaRef ds:uri="http://schemas.microsoft.com/office/2006/metadata/properties"/>
-    <ds:schemaRef ds:uri="http://purl.org/dc/terms/"/>
-    <ds:schemaRef ds:uri="ecd1fa32-ae44-48d6-80a1-71a52da60b4a"/>
-    <ds:schemaRef ds:uri="http://www.w3.org/XML/1998/namespace"/>
+    <ds:schemaRef ds:uri="http://schemas.microsoft.com/sharepoint/v3/contenttype/forms"/>
   </ds:schemaRefs>
 </ds:datastoreItem>
 </file>

</xml_diff>

<commit_message>
add minor touch to M7 deck
</commit_message>
<xml_diff>
--- a/Slides/M1 Designing.pptx
+++ b/Slides/M1 Designing.pptx
@@ -293,7 +293,7 @@
           <a:p>
             <a:fld id="{312E7B4A-039C-48A2-9B2C-AF16AA3873D8}" type="datetimeFigureOut">
               <a:rPr lang="en-US" smtClean="0"/>
-              <a:t>10/20/2014</a:t>
+              <a:t>10/22/2014</a:t>
             </a:fld>
             <a:endParaRPr lang="en-US"/>
           </a:p>
@@ -458,7 +458,7 @@
           <a:p>
             <a:fld id="{DA005A0C-54D9-45AA-87D4-C551D08DFCE1}" type="datetimeFigureOut">
               <a:rPr lang="en-US" smtClean="0"/>
-              <a:t>10/20/2014</a:t>
+              <a:t>10/22/2014</a:t>
             </a:fld>
             <a:endParaRPr lang="en-US"/>
           </a:p>
@@ -8041,6 +8041,13 @@
       <p:transition spd="slow"/>
     </mc:Fallback>
   </mc:AlternateContent>
+  <p:timing>
+    <p:tnLst>
+      <p:par>
+        <p:cTn id="1" dur="indefinite" restart="never" nodeType="tmRoot"/>
+      </p:par>
+    </p:tnLst>
+  </p:timing>
 </p:sld>
 </file>
 
@@ -8094,6 +8101,13 @@
   <p:clrMapOvr>
     <a:masterClrMapping/>
   </p:clrMapOvr>
+  <p:timing>
+    <p:tnLst>
+      <p:par>
+        <p:cTn id="1" dur="indefinite" restart="never" nodeType="tmRoot"/>
+      </p:par>
+    </p:tnLst>
+  </p:timing>
 </p:sld>
 </file>
 
@@ -8132,22 +8146,46 @@
           <a:lstStyle/>
           <a:p>
             <a:r>
-              <a:rPr lang="en-GB" dirty="0" smtClean="0"/>
+              <a:rPr lang="en-GB" dirty="0" smtClean="0">
+                <a:hlinkClick r:id="rId3"/>
+              </a:rPr>
               <a:t>azure.microsoft.com/</a:t>
             </a:r>
             <a:r>
-              <a:rPr lang="en-GB" dirty="0" err="1" smtClean="0"/>
+              <a:rPr lang="en-GB" dirty="0" err="1" smtClean="0">
+                <a:hlinkClick r:id="rId3"/>
+              </a:rPr>
               <a:t>en</a:t>
             </a:r>
             <a:r>
-              <a:rPr lang="en-GB" dirty="0" smtClean="0"/>
+              <a:rPr lang="en-GB" dirty="0" smtClean="0">
+                <a:hlinkClick r:id="rId3"/>
+              </a:rPr>
               <a:t>-us/develop/mobile/reference</a:t>
             </a:r>
-          </a:p>
-          <a:p>
-            <a:r>
-              <a:rPr lang="en-GB" dirty="0" smtClean="0"/>
+            <a:endParaRPr lang="en-GB" dirty="0" smtClean="0"/>
+          </a:p>
+          <a:p>
+            <a:r>
+              <a:rPr lang="en-GB" dirty="0" smtClean="0">
+                <a:hlinkClick r:id="rId4"/>
+              </a:rPr>
               <a:t>odata.org</a:t>
+            </a:r>
+            <a:endParaRPr lang="en-GB" dirty="0" smtClean="0"/>
+          </a:p>
+          <a:p>
+            <a:r>
+              <a:rPr lang="en-GB" dirty="0" smtClean="0">
+                <a:hlinkClick r:id="rId5"/>
+              </a:rPr>
+              <a:t>pragmatiqa.com/</a:t>
+            </a:r>
+            <a:r>
+              <a:rPr lang="en-GB" dirty="0" err="1" smtClean="0">
+                <a:hlinkClick r:id="rId5"/>
+              </a:rPr>
+              <a:t>EDMXGraph</a:t>
             </a:r>
             <a:endParaRPr lang="en-GB" dirty="0"/>
           </a:p>
@@ -13012,7 +13050,6 @@
               <a:rPr lang="en-US" dirty="0"/>
               <a:t>(expires 24 Nov 14)</a:t>
             </a:r>
-            <a:endParaRPr lang="en-US" dirty="0"/>
           </a:p>
         </p:txBody>
       </p:sp>
@@ -13167,14 +13204,14 @@
                 <a:gridCol w="5762625">
                   <a:extLst>
                     <a:ext uri="{9D8B030D-6E8A-4147-A177-3AD203B41FA5}">
-                      <a16:colId xmlns="" xmlns:a16="http://schemas.microsoft.com/office/drawing/2014/main" val="1632794655"/>
+                      <a16:colId xmlns:a16="http://schemas.microsoft.com/office/drawing/2014/main" xmlns="" val="1632794655"/>
                     </a:ext>
                   </a:extLst>
                 </a:gridCol>
                 <a:gridCol w="5762625">
                   <a:extLst>
                     <a:ext uri="{9D8B030D-6E8A-4147-A177-3AD203B41FA5}">
-                      <a16:colId xmlns="" xmlns:a16="http://schemas.microsoft.com/office/drawing/2014/main" val="2011313899"/>
+                      <a16:colId xmlns:a16="http://schemas.microsoft.com/office/drawing/2014/main" xmlns="" val="2011313899"/>
                     </a:ext>
                   </a:extLst>
                 </a:gridCol>
@@ -13212,7 +13249,7 @@
                 </a:tc>
                 <a:extLst>
                   <a:ext uri="{0D108BD9-81ED-4DB2-BD59-A6C34878D82A}">
-                    <a16:rowId xmlns="" xmlns:a16="http://schemas.microsoft.com/office/drawing/2014/main" val="1789177411"/>
+                    <a16:rowId xmlns:a16="http://schemas.microsoft.com/office/drawing/2014/main" xmlns="" val="1789177411"/>
                   </a:ext>
                 </a:extLst>
               </a:tr>
@@ -13273,7 +13310,7 @@
                 </a:tc>
                 <a:extLst>
                   <a:ext uri="{0D108BD9-81ED-4DB2-BD59-A6C34878D82A}">
-                    <a16:rowId xmlns="" xmlns:a16="http://schemas.microsoft.com/office/drawing/2014/main" val="3842815335"/>
+                    <a16:rowId xmlns:a16="http://schemas.microsoft.com/office/drawing/2014/main" xmlns="" val="3842815335"/>
                   </a:ext>
                 </a:extLst>
               </a:tr>
@@ -13320,7 +13357,7 @@
                 </a:tc>
                 <a:extLst>
                   <a:ext uri="{0D108BD9-81ED-4DB2-BD59-A6C34878D82A}">
-                    <a16:rowId xmlns="" xmlns:a16="http://schemas.microsoft.com/office/drawing/2014/main" val="321066646"/>
+                    <a16:rowId xmlns:a16="http://schemas.microsoft.com/office/drawing/2014/main" xmlns="" val="321066646"/>
                   </a:ext>
                 </a:extLst>
               </a:tr>
@@ -13391,7 +13428,7 @@
                 </a:tc>
                 <a:extLst>
                   <a:ext uri="{0D108BD9-81ED-4DB2-BD59-A6C34878D82A}">
-                    <a16:rowId xmlns="" xmlns:a16="http://schemas.microsoft.com/office/drawing/2014/main" val="3812060533"/>
+                    <a16:rowId xmlns:a16="http://schemas.microsoft.com/office/drawing/2014/main" xmlns="" val="3812060533"/>
                   </a:ext>
                 </a:extLst>
               </a:tr>
@@ -15383,6 +15420,12 @@
 </file>
 
 <file path=customXml/item1.xml><?xml version="1.0" encoding="utf-8"?>
+<p:properties xmlns:p="http://schemas.microsoft.com/office/2006/metadata/properties" xmlns:xsi="http://www.w3.org/2001/XMLSchema-instance" xmlns:pc="http://schemas.microsoft.com/office/infopath/2007/PartnerControls">
+  <documentManagement/>
+</p:properties>
+</file>
+
+<file path=customXml/item2.xml><?xml version="1.0" encoding="utf-8"?>
 <ct:contentTypeSchema xmlns:ct="http://schemas.microsoft.com/office/2006/metadata/contentType" xmlns:ma="http://schemas.microsoft.com/office/2006/metadata/properties/metaAttributes" ct:_="" ma:_="" ma:contentTypeName="Document" ma:contentTypeID="0x010100CF3CFFA86DA93345A891C3CCBC738F63" ma:contentTypeVersion="1" ma:contentTypeDescription="Create a new document." ma:contentTypeScope="" ma:versionID="060e45d69093970729cdde03e78aa3cc">
   <xsd:schema xmlns:xsd="http://www.w3.org/2001/XMLSchema" xmlns:xs="http://www.w3.org/2001/XMLSchema" xmlns:p="http://schemas.microsoft.com/office/2006/metadata/properties" xmlns:ns3="ecd1fa32-ae44-48d6-80a1-71a52da60b4a" targetNamespace="http://schemas.microsoft.com/office/2006/metadata/properties" ma:root="true" ma:fieldsID="2fc9741b54117334ed0e10932dac3600" ns3:_="">
     <xsd:import namespace="ecd1fa32-ae44-48d6-80a1-71a52da60b4a"/>
@@ -15522,12 +15565,6 @@
 </ct:contentTypeSchema>
 </file>
 
-<file path=customXml/item2.xml><?xml version="1.0" encoding="utf-8"?>
-<p:properties xmlns:p="http://schemas.microsoft.com/office/2006/metadata/properties" xmlns:xsi="http://www.w3.org/2001/XMLSchema-instance" xmlns:pc="http://schemas.microsoft.com/office/infopath/2007/PartnerControls">
-  <documentManagement/>
-</p:properties>
-</file>
-
 <file path=customXml/item3.xml><?xml version="1.0" encoding="utf-8"?>
 <?mso-contentType ?>
 <FormTemplates xmlns="http://schemas.microsoft.com/sharepoint/v3/contenttype/forms">
@@ -15538,6 +15575,22 @@
 </file>
 
 <file path=customXml/itemProps1.xml><?xml version="1.0" encoding="utf-8"?>
+<ds:datastoreItem xmlns:ds="http://schemas.openxmlformats.org/officeDocument/2006/customXml" ds:itemID="{7025FDD9-4C58-4084-9F89-0E6ADD6FFF55}">
+  <ds:schemaRefs>
+    <ds:schemaRef ds:uri="http://schemas.microsoft.com/office/2006/metadata/properties"/>
+    <ds:schemaRef ds:uri="http://purl.org/dc/terms/"/>
+    <ds:schemaRef ds:uri="http://schemas.openxmlformats.org/package/2006/metadata/core-properties"/>
+    <ds:schemaRef ds:uri="http://schemas.microsoft.com/office/2006/documentManagement/types"/>
+    <ds:schemaRef ds:uri="http://schemas.microsoft.com/office/infopath/2007/PartnerControls"/>
+    <ds:schemaRef ds:uri="ecd1fa32-ae44-48d6-80a1-71a52da60b4a"/>
+    <ds:schemaRef ds:uri="http://purl.org/dc/elements/1.1/"/>
+    <ds:schemaRef ds:uri="http://www.w3.org/XML/1998/namespace"/>
+    <ds:schemaRef ds:uri="http://purl.org/dc/dcmitype/"/>
+  </ds:schemaRefs>
+</ds:datastoreItem>
+</file>
+
+<file path=customXml/itemProps2.xml><?xml version="1.0" encoding="utf-8"?>
 <ds:datastoreItem xmlns:ds="http://schemas.openxmlformats.org/officeDocument/2006/customXml" ds:itemID="{A545FFDC-6555-4FAD-8A13-72F96FEB882E}">
   <ds:schemaRefs>
     <ds:schemaRef ds:uri="http://schemas.microsoft.com/office/2006/metadata/contentType"/>
@@ -15555,22 +15608,6 @@
 </ds:datastoreItem>
 </file>
 
-<file path=customXml/itemProps2.xml><?xml version="1.0" encoding="utf-8"?>
-<ds:datastoreItem xmlns:ds="http://schemas.openxmlformats.org/officeDocument/2006/customXml" ds:itemID="{7025FDD9-4C58-4084-9F89-0E6ADD6FFF55}">
-  <ds:schemaRefs>
-    <ds:schemaRef ds:uri="http://schemas.microsoft.com/office/2006/metadata/properties"/>
-    <ds:schemaRef ds:uri="http://purl.org/dc/terms/"/>
-    <ds:schemaRef ds:uri="http://schemas.openxmlformats.org/package/2006/metadata/core-properties"/>
-    <ds:schemaRef ds:uri="http://schemas.microsoft.com/office/2006/documentManagement/types"/>
-    <ds:schemaRef ds:uri="http://schemas.microsoft.com/office/infopath/2007/PartnerControls"/>
-    <ds:schemaRef ds:uri="ecd1fa32-ae44-48d6-80a1-71a52da60b4a"/>
-    <ds:schemaRef ds:uri="http://purl.org/dc/elements/1.1/"/>
-    <ds:schemaRef ds:uri="http://www.w3.org/XML/1998/namespace"/>
-    <ds:schemaRef ds:uri="http://purl.org/dc/dcmitype/"/>
-  </ds:schemaRefs>
-</ds:datastoreItem>
-</file>
-
 <file path=customXml/itemProps3.xml><?xml version="1.0" encoding="utf-8"?>
 <ds:datastoreItem xmlns:ds="http://schemas.openxmlformats.org/officeDocument/2006/customXml" ds:itemID="{B0CA13EC-1D3C-4D6F-8D1C-E8A452CFC79A}">
   <ds:schemaRefs>

</xml_diff>